<commit_message>
scc tweaks and tutorial ppt update
</commit_message>
<xml_diff>
--- a/Tutorials/scc2.0Protocols.pptx
+++ b/Tutorials/scc2.0Protocols.pptx
@@ -5,19 +5,20 @@
     <p:sldMasterId id="2147483660" r:id="rId4"/>
   </p:sldMasterIdLst>
   <p:notesMasterIdLst>
-    <p:notesMasterId r:id="rId15"/>
+    <p:notesMasterId r:id="rId16"/>
   </p:notesMasterIdLst>
   <p:sldIdLst>
     <p:sldId id="257" r:id="rId5"/>
-    <p:sldId id="262" r:id="rId6"/>
-    <p:sldId id="263" r:id="rId7"/>
-    <p:sldId id="269" r:id="rId8"/>
-    <p:sldId id="268" r:id="rId9"/>
-    <p:sldId id="270" r:id="rId10"/>
-    <p:sldId id="273" r:id="rId11"/>
-    <p:sldId id="266" r:id="rId12"/>
-    <p:sldId id="272" r:id="rId13"/>
-    <p:sldId id="261" r:id="rId14"/>
+    <p:sldId id="275" r:id="rId6"/>
+    <p:sldId id="274" r:id="rId7"/>
+    <p:sldId id="262" r:id="rId8"/>
+    <p:sldId id="263" r:id="rId9"/>
+    <p:sldId id="268" r:id="rId10"/>
+    <p:sldId id="270" r:id="rId11"/>
+    <p:sldId id="273" r:id="rId12"/>
+    <p:sldId id="266" r:id="rId13"/>
+    <p:sldId id="272" r:id="rId14"/>
+    <p:sldId id="261" r:id="rId15"/>
   </p:sldIdLst>
   <p:sldSz cx="12192000" cy="6858000"/>
   <p:notesSz cx="6858000" cy="9144000"/>
@@ -135,23 +136,414 @@
 <file path=ppt/changesInfos/changesInfo1.xml><?xml version="1.0" encoding="utf-8"?>
 <pc:chgInfo xmlns:a="http://schemas.openxmlformats.org/drawingml/2006/main" xmlns:r="http://schemas.openxmlformats.org/officeDocument/2006/relationships" xmlns:ac="http://schemas.microsoft.com/office/drawing/2013/main/command" xmlns:pc="http://schemas.microsoft.com/office/powerpoint/2013/main/command">
   <pc:docChgLst>
-    <pc:chgData name="Reeves, Christopher" userId="S::reevesc7@msu.edu::b49c9824-41eb-460f-b856-160cfa1dc613" providerId="AD" clId="Web-{427D9BEB-3C52-4813-B0B3-A0AA85CC2DFD}"/>
-    <pc:docChg chg="modSld">
-      <pc:chgData name="Reeves, Christopher" userId="S::reevesc7@msu.edu::b49c9824-41eb-460f-b856-160cfa1dc613" providerId="AD" clId="Web-{427D9BEB-3C52-4813-B0B3-A0AA85CC2DFD}" dt="2022-02-11T21:35:10.615" v="13" actId="20577"/>
+    <pc:chgData name="Chris Reeves" userId="b49c9824-41eb-460f-b856-160cfa1dc613" providerId="ADAL" clId="{C6DD1DB1-9BFA-4213-8AF4-C87E0CA105E0}"/>
+    <pc:docChg chg="undo custSel addSld delSld modSld sldOrd">
+      <pc:chgData name="Chris Reeves" userId="b49c9824-41eb-460f-b856-160cfa1dc613" providerId="ADAL" clId="{C6DD1DB1-9BFA-4213-8AF4-C87E0CA105E0}" dt="2022-05-02T20:54:53.407" v="4965" actId="1076"/>
       <pc:docMkLst>
         <pc:docMk/>
       </pc:docMkLst>
-      <pc:sldChg chg="modSp">
-        <pc:chgData name="Reeves, Christopher" userId="S::reevesc7@msu.edu::b49c9824-41eb-460f-b856-160cfa1dc613" providerId="AD" clId="Web-{427D9BEB-3C52-4813-B0B3-A0AA85CC2DFD}" dt="2022-02-11T21:35:10.615" v="13" actId="20577"/>
+      <pc:sldChg chg="modSp mod">
+        <pc:chgData name="Chris Reeves" userId="b49c9824-41eb-460f-b856-160cfa1dc613" providerId="ADAL" clId="{C6DD1DB1-9BFA-4213-8AF4-C87E0CA105E0}" dt="2022-05-02T19:29:22.592" v="118" actId="313"/>
         <pc:sldMkLst>
           <pc:docMk/>
           <pc:sldMk cId="4198178589" sldId="257"/>
         </pc:sldMkLst>
         <pc:spChg chg="mod">
-          <ac:chgData name="Reeves, Christopher" userId="S::reevesc7@msu.edu::b49c9824-41eb-460f-b856-160cfa1dc613" providerId="AD" clId="Web-{427D9BEB-3C52-4813-B0B3-A0AA85CC2DFD}" dt="2022-02-11T21:35:10.615" v="13" actId="20577"/>
+          <ac:chgData name="Chris Reeves" userId="b49c9824-41eb-460f-b856-160cfa1dc613" providerId="ADAL" clId="{C6DD1DB1-9BFA-4213-8AF4-C87E0CA105E0}" dt="2022-05-02T19:29:22.592" v="118" actId="313"/>
           <ac:spMkLst>
             <pc:docMk/>
             <pc:sldMk cId="4198178589" sldId="257"/>
+            <ac:spMk id="3" creationId="{F9E1C5AD-92AF-4AAB-8F58-2133C24B60C4}"/>
+          </ac:spMkLst>
+        </pc:spChg>
+      </pc:sldChg>
+      <pc:sldChg chg="modSp mod ord">
+        <pc:chgData name="Chris Reeves" userId="b49c9824-41eb-460f-b856-160cfa1dc613" providerId="ADAL" clId="{C6DD1DB1-9BFA-4213-8AF4-C87E0CA105E0}" dt="2022-05-02T20:27:07.574" v="4005"/>
+        <pc:sldMkLst>
+          <pc:docMk/>
+          <pc:sldMk cId="3683627749" sldId="261"/>
+        </pc:sldMkLst>
+        <pc:spChg chg="mod">
+          <ac:chgData name="Chris Reeves" userId="b49c9824-41eb-460f-b856-160cfa1dc613" providerId="ADAL" clId="{C6DD1DB1-9BFA-4213-8AF4-C87E0CA105E0}" dt="2022-05-02T20:26:41.799" v="4001" actId="20577"/>
+          <ac:spMkLst>
+            <pc:docMk/>
+            <pc:sldMk cId="3683627749" sldId="261"/>
+            <ac:spMk id="2" creationId="{93E913FC-AF7C-4F31-8CCF-0C042D810AED}"/>
+          </ac:spMkLst>
+        </pc:spChg>
+      </pc:sldChg>
+      <pc:sldChg chg="modSp mod">
+        <pc:chgData name="Chris Reeves" userId="b49c9824-41eb-460f-b856-160cfa1dc613" providerId="ADAL" clId="{C6DD1DB1-9BFA-4213-8AF4-C87E0CA105E0}" dt="2022-05-02T20:38:29.677" v="4231" actId="20577"/>
+        <pc:sldMkLst>
+          <pc:docMk/>
+          <pc:sldMk cId="2684212234" sldId="262"/>
+        </pc:sldMkLst>
+        <pc:spChg chg="mod">
+          <ac:chgData name="Chris Reeves" userId="b49c9824-41eb-460f-b856-160cfa1dc613" providerId="ADAL" clId="{C6DD1DB1-9BFA-4213-8AF4-C87E0CA105E0}" dt="2022-05-02T20:38:29.677" v="4231" actId="20577"/>
+          <ac:spMkLst>
+            <pc:docMk/>
+            <pc:sldMk cId="2684212234" sldId="262"/>
+            <ac:spMk id="3" creationId="{F9E1C5AD-92AF-4AAB-8F58-2133C24B60C4}"/>
+          </ac:spMkLst>
+        </pc:spChg>
+      </pc:sldChg>
+      <pc:sldChg chg="modSp mod">
+        <pc:chgData name="Chris Reeves" userId="b49c9824-41eb-460f-b856-160cfa1dc613" providerId="ADAL" clId="{C6DD1DB1-9BFA-4213-8AF4-C87E0CA105E0}" dt="2022-05-02T19:55:58.286" v="1299" actId="20577"/>
+        <pc:sldMkLst>
+          <pc:docMk/>
+          <pc:sldMk cId="2523626175" sldId="263"/>
+        </pc:sldMkLst>
+        <pc:spChg chg="mod">
+          <ac:chgData name="Chris Reeves" userId="b49c9824-41eb-460f-b856-160cfa1dc613" providerId="ADAL" clId="{C6DD1DB1-9BFA-4213-8AF4-C87E0CA105E0}" dt="2022-05-02T19:55:58.286" v="1299" actId="20577"/>
+          <ac:spMkLst>
+            <pc:docMk/>
+            <pc:sldMk cId="2523626175" sldId="263"/>
+            <ac:spMk id="3" creationId="{F9E1C5AD-92AF-4AAB-8F58-2133C24B60C4}"/>
+          </ac:spMkLst>
+        </pc:spChg>
+      </pc:sldChg>
+      <pc:sldChg chg="addSp delSp modSp mod">
+        <pc:chgData name="Chris Reeves" userId="b49c9824-41eb-460f-b856-160cfa1dc613" providerId="ADAL" clId="{C6DD1DB1-9BFA-4213-8AF4-C87E0CA105E0}" dt="2022-05-02T20:54:53.407" v="4965" actId="1076"/>
+        <pc:sldMkLst>
+          <pc:docMk/>
+          <pc:sldMk cId="1581745544" sldId="266"/>
+        </pc:sldMkLst>
+        <pc:spChg chg="mod">
+          <ac:chgData name="Chris Reeves" userId="b49c9824-41eb-460f-b856-160cfa1dc613" providerId="ADAL" clId="{C6DD1DB1-9BFA-4213-8AF4-C87E0CA105E0}" dt="2022-05-02T20:54:53.407" v="4965" actId="1076"/>
+          <ac:spMkLst>
+            <pc:docMk/>
+            <pc:sldMk cId="1581745544" sldId="266"/>
+            <ac:spMk id="3" creationId="{F9E1C5AD-92AF-4AAB-8F58-2133C24B60C4}"/>
+          </ac:spMkLst>
+        </pc:spChg>
+        <pc:picChg chg="add del mod">
+          <ac:chgData name="Chris Reeves" userId="b49c9824-41eb-460f-b856-160cfa1dc613" providerId="ADAL" clId="{C6DD1DB1-9BFA-4213-8AF4-C87E0CA105E0}" dt="2022-05-02T20:47:52.642" v="4602" actId="478"/>
+          <ac:picMkLst>
+            <pc:docMk/>
+            <pc:sldMk cId="1581745544" sldId="266"/>
+            <ac:picMk id="5" creationId="{BBA2D60F-454C-F8B5-70FC-598A80EDC038}"/>
+          </ac:picMkLst>
+        </pc:picChg>
+        <pc:picChg chg="add mod">
+          <ac:chgData name="Chris Reeves" userId="b49c9824-41eb-460f-b856-160cfa1dc613" providerId="ADAL" clId="{C6DD1DB1-9BFA-4213-8AF4-C87E0CA105E0}" dt="2022-05-02T20:48:26.466" v="4611" actId="1037"/>
+          <ac:picMkLst>
+            <pc:docMk/>
+            <pc:sldMk cId="1581745544" sldId="266"/>
+            <ac:picMk id="7" creationId="{712295E4-2C80-2F5B-4B16-6F647ABBABDE}"/>
+          </ac:picMkLst>
+        </pc:picChg>
+      </pc:sldChg>
+      <pc:sldChg chg="add del">
+        <pc:chgData name="Chris Reeves" userId="b49c9824-41eb-460f-b856-160cfa1dc613" providerId="ADAL" clId="{C6DD1DB1-9BFA-4213-8AF4-C87E0CA105E0}" dt="2022-05-02T20:17:49.554" v="3236" actId="2696"/>
+        <pc:sldMkLst>
+          <pc:docMk/>
+          <pc:sldMk cId="954009963" sldId="267"/>
+        </pc:sldMkLst>
+      </pc:sldChg>
+      <pc:sldChg chg="modSp add mod">
+        <pc:chgData name="Chris Reeves" userId="b49c9824-41eb-460f-b856-160cfa1dc613" providerId="ADAL" clId="{C6DD1DB1-9BFA-4213-8AF4-C87E0CA105E0}" dt="2022-05-02T20:06:08.750" v="2339" actId="20577"/>
+        <pc:sldMkLst>
+          <pc:docMk/>
+          <pc:sldMk cId="3454217184" sldId="268"/>
+        </pc:sldMkLst>
+        <pc:spChg chg="mod">
+          <ac:chgData name="Chris Reeves" userId="b49c9824-41eb-460f-b856-160cfa1dc613" providerId="ADAL" clId="{C6DD1DB1-9BFA-4213-8AF4-C87E0CA105E0}" dt="2022-05-02T19:56:33.620" v="1307" actId="20577"/>
+          <ac:spMkLst>
+            <pc:docMk/>
+            <pc:sldMk cId="3454217184" sldId="268"/>
+            <ac:spMk id="2" creationId="{93E913FC-AF7C-4F31-8CCF-0C042D810AED}"/>
+          </ac:spMkLst>
+        </pc:spChg>
+        <pc:spChg chg="mod">
+          <ac:chgData name="Chris Reeves" userId="b49c9824-41eb-460f-b856-160cfa1dc613" providerId="ADAL" clId="{C6DD1DB1-9BFA-4213-8AF4-C87E0CA105E0}" dt="2022-05-02T20:06:08.750" v="2339" actId="20577"/>
+          <ac:spMkLst>
+            <pc:docMk/>
+            <pc:sldMk cId="3454217184" sldId="268"/>
+            <ac:spMk id="3" creationId="{F9E1C5AD-92AF-4AAB-8F58-2133C24B60C4}"/>
+          </ac:spMkLst>
+        </pc:spChg>
+      </pc:sldChg>
+      <pc:sldChg chg="modSp add mod">
+        <pc:chgData name="Chris Reeves" userId="b49c9824-41eb-460f-b856-160cfa1dc613" providerId="ADAL" clId="{C6DD1DB1-9BFA-4213-8AF4-C87E0CA105E0}" dt="2022-05-02T20:17:36.595" v="3235" actId="27636"/>
+        <pc:sldMkLst>
+          <pc:docMk/>
+          <pc:sldMk cId="3284550745" sldId="269"/>
+        </pc:sldMkLst>
+        <pc:spChg chg="mod">
+          <ac:chgData name="Chris Reeves" userId="b49c9824-41eb-460f-b856-160cfa1dc613" providerId="ADAL" clId="{C6DD1DB1-9BFA-4213-8AF4-C87E0CA105E0}" dt="2022-05-02T20:17:36.595" v="3235" actId="27636"/>
+          <ac:spMkLst>
+            <pc:docMk/>
+            <pc:sldMk cId="3284550745" sldId="269"/>
+            <ac:spMk id="3" creationId="{F9E1C5AD-92AF-4AAB-8F58-2133C24B60C4}"/>
+          </ac:spMkLst>
+        </pc:spChg>
+      </pc:sldChg>
+      <pc:sldChg chg="modSp add mod">
+        <pc:chgData name="Chris Reeves" userId="b49c9824-41eb-460f-b856-160cfa1dc613" providerId="ADAL" clId="{C6DD1DB1-9BFA-4213-8AF4-C87E0CA105E0}" dt="2022-05-02T20:34:39.615" v="4098" actId="20577"/>
+        <pc:sldMkLst>
+          <pc:docMk/>
+          <pc:sldMk cId="3290658582" sldId="270"/>
+        </pc:sldMkLst>
+        <pc:spChg chg="mod">
+          <ac:chgData name="Chris Reeves" userId="b49c9824-41eb-460f-b856-160cfa1dc613" providerId="ADAL" clId="{C6DD1DB1-9BFA-4213-8AF4-C87E0CA105E0}" dt="2022-05-02T20:18:14.456" v="3253" actId="20577"/>
+          <ac:spMkLst>
+            <pc:docMk/>
+            <pc:sldMk cId="3290658582" sldId="270"/>
+            <ac:spMk id="2" creationId="{93E913FC-AF7C-4F31-8CCF-0C042D810AED}"/>
+          </ac:spMkLst>
+        </pc:spChg>
+        <pc:spChg chg="mod">
+          <ac:chgData name="Chris Reeves" userId="b49c9824-41eb-460f-b856-160cfa1dc613" providerId="ADAL" clId="{C6DD1DB1-9BFA-4213-8AF4-C87E0CA105E0}" dt="2022-05-02T20:34:39.615" v="4098" actId="20577"/>
+          <ac:spMkLst>
+            <pc:docMk/>
+            <pc:sldMk cId="3290658582" sldId="270"/>
+            <ac:spMk id="3" creationId="{F9E1C5AD-92AF-4AAB-8F58-2133C24B60C4}"/>
+          </ac:spMkLst>
+        </pc:spChg>
+      </pc:sldChg>
+      <pc:sldChg chg="delSp add del mod">
+        <pc:chgData name="Chris Reeves" userId="b49c9824-41eb-460f-b856-160cfa1dc613" providerId="ADAL" clId="{C6DD1DB1-9BFA-4213-8AF4-C87E0CA105E0}" dt="2022-05-02T20:49:05.616" v="4616" actId="2696"/>
+        <pc:sldMkLst>
+          <pc:docMk/>
+          <pc:sldMk cId="2445228223" sldId="271"/>
+        </pc:sldMkLst>
+        <pc:picChg chg="del">
+          <ac:chgData name="Chris Reeves" userId="b49c9824-41eb-460f-b856-160cfa1dc613" providerId="ADAL" clId="{C6DD1DB1-9BFA-4213-8AF4-C87E0CA105E0}" dt="2022-05-02T20:48:58.064" v="4614" actId="478"/>
+          <ac:picMkLst>
+            <pc:docMk/>
+            <pc:sldMk cId="2445228223" sldId="271"/>
+            <ac:picMk id="7" creationId="{712295E4-2C80-2F5B-4B16-6F647ABBABDE}"/>
+          </ac:picMkLst>
+        </pc:picChg>
+      </pc:sldChg>
+      <pc:sldChg chg="addSp delSp modSp new mod">
+        <pc:chgData name="Chris Reeves" userId="b49c9824-41eb-460f-b856-160cfa1dc613" providerId="ADAL" clId="{C6DD1DB1-9BFA-4213-8AF4-C87E0CA105E0}" dt="2022-05-02T20:54:42.510" v="4964" actId="1076"/>
+        <pc:sldMkLst>
+          <pc:docMk/>
+          <pc:sldMk cId="4262189219" sldId="272"/>
+        </pc:sldMkLst>
+        <pc:spChg chg="mod">
+          <ac:chgData name="Chris Reeves" userId="b49c9824-41eb-460f-b856-160cfa1dc613" providerId="ADAL" clId="{C6DD1DB1-9BFA-4213-8AF4-C87E0CA105E0}" dt="2022-05-02T20:49:13.279" v="4623" actId="20577"/>
+          <ac:spMkLst>
+            <pc:docMk/>
+            <pc:sldMk cId="4262189219" sldId="272"/>
+            <ac:spMk id="2" creationId="{87AE82EE-4424-0197-AD6A-625D41474F3F}"/>
+          </ac:spMkLst>
+        </pc:spChg>
+        <pc:spChg chg="add del mod">
+          <ac:chgData name="Chris Reeves" userId="b49c9824-41eb-460f-b856-160cfa1dc613" providerId="ADAL" clId="{C6DD1DB1-9BFA-4213-8AF4-C87E0CA105E0}" dt="2022-05-02T20:54:26.655" v="4963" actId="20577"/>
+          <ac:spMkLst>
+            <pc:docMk/>
+            <pc:sldMk cId="4262189219" sldId="272"/>
+            <ac:spMk id="3" creationId="{33014443-6033-F7C3-A071-D69CA0D5FDE5}"/>
+          </ac:spMkLst>
+        </pc:spChg>
+        <pc:picChg chg="add del mod">
+          <ac:chgData name="Chris Reeves" userId="b49c9824-41eb-460f-b856-160cfa1dc613" providerId="ADAL" clId="{C6DD1DB1-9BFA-4213-8AF4-C87E0CA105E0}" dt="2022-05-02T20:50:13.755" v="4628"/>
+          <ac:picMkLst>
+            <pc:docMk/>
+            <pc:sldMk cId="4262189219" sldId="272"/>
+            <ac:picMk id="5" creationId="{9BCA4540-9AF9-7EE9-A801-B05BD2815610}"/>
+          </ac:picMkLst>
+        </pc:picChg>
+        <pc:picChg chg="add del mod">
+          <ac:chgData name="Chris Reeves" userId="b49c9824-41eb-460f-b856-160cfa1dc613" providerId="ADAL" clId="{C6DD1DB1-9BFA-4213-8AF4-C87E0CA105E0}" dt="2022-05-02T20:51:47.730" v="4669" actId="478"/>
+          <ac:picMkLst>
+            <pc:docMk/>
+            <pc:sldMk cId="4262189219" sldId="272"/>
+            <ac:picMk id="7" creationId="{1F71A148-7D71-8787-DC35-C8ED99D7D576}"/>
+          </ac:picMkLst>
+        </pc:picChg>
+        <pc:picChg chg="add mod">
+          <ac:chgData name="Chris Reeves" userId="b49c9824-41eb-460f-b856-160cfa1dc613" providerId="ADAL" clId="{C6DD1DB1-9BFA-4213-8AF4-C87E0CA105E0}" dt="2022-05-02T20:54:42.510" v="4964" actId="1076"/>
+          <ac:picMkLst>
+            <pc:docMk/>
+            <pc:sldMk cId="4262189219" sldId="272"/>
+            <ac:picMk id="9" creationId="{21BD06D9-97EF-FBA7-0895-687CB72EBD7C}"/>
+          </ac:picMkLst>
+        </pc:picChg>
+      </pc:sldChg>
+    </pc:docChg>
+  </pc:docChgLst>
+  <pc:docChgLst>
+    <pc:chgData name="Olekanma, Doris" userId="S::olekanm1@msu.edu::812322f7-7fc0-49f2-9291-a96ee5858438" providerId="AD" clId="Web-{131E4309-D9F6-4934-AE7D-8A87FCABCA82}"/>
+    <pc:docChg chg="modSld">
+      <pc:chgData name="Olekanma, Doris" userId="S::olekanm1@msu.edu::812322f7-7fc0-49f2-9291-a96ee5858438" providerId="AD" clId="Web-{131E4309-D9F6-4934-AE7D-8A87FCABCA82}" dt="2022-02-01T16:32:12.749" v="13" actId="20577"/>
+      <pc:docMkLst>
+        <pc:docMk/>
+      </pc:docMkLst>
+      <pc:sldChg chg="modSp">
+        <pc:chgData name="Olekanma, Doris" userId="S::olekanm1@msu.edu::812322f7-7fc0-49f2-9291-a96ee5858438" providerId="AD" clId="Web-{131E4309-D9F6-4934-AE7D-8A87FCABCA82}" dt="2022-02-01T16:32:12.749" v="13" actId="20577"/>
+        <pc:sldMkLst>
+          <pc:docMk/>
+          <pc:sldMk cId="4198178589" sldId="257"/>
+        </pc:sldMkLst>
+        <pc:spChg chg="mod">
+          <ac:chgData name="Olekanma, Doris" userId="S::olekanm1@msu.edu::812322f7-7fc0-49f2-9291-a96ee5858438" providerId="AD" clId="Web-{131E4309-D9F6-4934-AE7D-8A87FCABCA82}" dt="2022-02-01T16:32:12.749" v="13" actId="20577"/>
+          <ac:spMkLst>
+            <pc:docMk/>
+            <pc:sldMk cId="4198178589" sldId="257"/>
+            <ac:spMk id="3" creationId="{F9E1C5AD-92AF-4AAB-8F58-2133C24B60C4}"/>
+          </ac:spMkLst>
+        </pc:spChg>
+      </pc:sldChg>
+    </pc:docChg>
+  </pc:docChgLst>
+  <pc:docChgLst>
+    <pc:chgData name="Chris Reeves" userId="b49c9824-41eb-460f-b856-160cfa1dc613" providerId="ADAL" clId="{4C7E7115-D8D0-43A3-B54C-FFB698348616}"/>
+    <pc:docChg chg="custSel delSld modSld">
+      <pc:chgData name="Chris Reeves" userId="b49c9824-41eb-460f-b856-160cfa1dc613" providerId="ADAL" clId="{4C7E7115-D8D0-43A3-B54C-FFB698348616}" dt="2022-02-08T22:27:34.975" v="221" actId="20577"/>
+      <pc:docMkLst>
+        <pc:docMk/>
+      </pc:docMkLst>
+      <pc:sldChg chg="modSp mod">
+        <pc:chgData name="Chris Reeves" userId="b49c9824-41eb-460f-b856-160cfa1dc613" providerId="ADAL" clId="{4C7E7115-D8D0-43A3-B54C-FFB698348616}" dt="2022-02-08T22:18:22.498" v="212" actId="27636"/>
+        <pc:sldMkLst>
+          <pc:docMk/>
+          <pc:sldMk cId="4198178589" sldId="257"/>
+        </pc:sldMkLst>
+        <pc:spChg chg="mod">
+          <ac:chgData name="Chris Reeves" userId="b49c9824-41eb-460f-b856-160cfa1dc613" providerId="ADAL" clId="{4C7E7115-D8D0-43A3-B54C-FFB698348616}" dt="2022-02-08T22:18:22.498" v="212" actId="27636"/>
+          <ac:spMkLst>
+            <pc:docMk/>
+            <pc:sldMk cId="4198178589" sldId="257"/>
+            <ac:spMk id="3" creationId="{F9E1C5AD-92AF-4AAB-8F58-2133C24B60C4}"/>
+          </ac:spMkLst>
+        </pc:spChg>
+      </pc:sldChg>
+      <pc:sldChg chg="modSp mod">
+        <pc:chgData name="Chris Reeves" userId="b49c9824-41eb-460f-b856-160cfa1dc613" providerId="ADAL" clId="{4C7E7115-D8D0-43A3-B54C-FFB698348616}" dt="2022-02-08T21:57:30.828" v="124" actId="20577"/>
+        <pc:sldMkLst>
+          <pc:docMk/>
+          <pc:sldMk cId="3683627749" sldId="261"/>
+        </pc:sldMkLst>
+        <pc:spChg chg="mod">
+          <ac:chgData name="Chris Reeves" userId="b49c9824-41eb-460f-b856-160cfa1dc613" providerId="ADAL" clId="{4C7E7115-D8D0-43A3-B54C-FFB698348616}" dt="2022-02-08T21:57:30.828" v="124" actId="20577"/>
+          <ac:spMkLst>
+            <pc:docMk/>
+            <pc:sldMk cId="3683627749" sldId="261"/>
+            <ac:spMk id="3" creationId="{F9E1C5AD-92AF-4AAB-8F58-2133C24B60C4}"/>
+          </ac:spMkLst>
+        </pc:spChg>
+      </pc:sldChg>
+      <pc:sldChg chg="modSp mod">
+        <pc:chgData name="Chris Reeves" userId="b49c9824-41eb-460f-b856-160cfa1dc613" providerId="ADAL" clId="{4C7E7115-D8D0-43A3-B54C-FFB698348616}" dt="2022-02-08T22:27:34.975" v="221" actId="20577"/>
+        <pc:sldMkLst>
+          <pc:docMk/>
+          <pc:sldMk cId="2684212234" sldId="262"/>
+        </pc:sldMkLst>
+        <pc:spChg chg="mod">
+          <ac:chgData name="Chris Reeves" userId="b49c9824-41eb-460f-b856-160cfa1dc613" providerId="ADAL" clId="{4C7E7115-D8D0-43A3-B54C-FFB698348616}" dt="2022-02-08T22:27:34.975" v="221" actId="20577"/>
+          <ac:spMkLst>
+            <pc:docMk/>
+            <pc:sldMk cId="2684212234" sldId="262"/>
+            <ac:spMk id="3" creationId="{F9E1C5AD-92AF-4AAB-8F58-2133C24B60C4}"/>
+          </ac:spMkLst>
+        </pc:spChg>
+      </pc:sldChg>
+      <pc:sldChg chg="modSp mod">
+        <pc:chgData name="Chris Reeves" userId="b49c9824-41eb-460f-b856-160cfa1dc613" providerId="ADAL" clId="{4C7E7115-D8D0-43A3-B54C-FFB698348616}" dt="2022-02-08T21:58:42.287" v="146" actId="6549"/>
+        <pc:sldMkLst>
+          <pc:docMk/>
+          <pc:sldMk cId="2523626175" sldId="263"/>
+        </pc:sldMkLst>
+        <pc:spChg chg="mod">
+          <ac:chgData name="Chris Reeves" userId="b49c9824-41eb-460f-b856-160cfa1dc613" providerId="ADAL" clId="{4C7E7115-D8D0-43A3-B54C-FFB698348616}" dt="2022-02-08T21:58:42.287" v="146" actId="6549"/>
+          <ac:spMkLst>
+            <pc:docMk/>
+            <pc:sldMk cId="2523626175" sldId="263"/>
+            <ac:spMk id="3" creationId="{F9E1C5AD-92AF-4AAB-8F58-2133C24B60C4}"/>
+          </ac:spMkLst>
+        </pc:spChg>
+      </pc:sldChg>
+      <pc:sldChg chg="modSp mod">
+        <pc:chgData name="Chris Reeves" userId="b49c9824-41eb-460f-b856-160cfa1dc613" providerId="ADAL" clId="{4C7E7115-D8D0-43A3-B54C-FFB698348616}" dt="2022-02-08T21:58:57.970" v="151" actId="20577"/>
+        <pc:sldMkLst>
+          <pc:docMk/>
+          <pc:sldMk cId="3705567830" sldId="264"/>
+        </pc:sldMkLst>
+        <pc:spChg chg="mod">
+          <ac:chgData name="Chris Reeves" userId="b49c9824-41eb-460f-b856-160cfa1dc613" providerId="ADAL" clId="{4C7E7115-D8D0-43A3-B54C-FFB698348616}" dt="2022-02-08T21:58:57.970" v="151" actId="20577"/>
+          <ac:spMkLst>
+            <pc:docMk/>
+            <pc:sldMk cId="3705567830" sldId="264"/>
+            <ac:spMk id="3" creationId="{F9E1C5AD-92AF-4AAB-8F58-2133C24B60C4}"/>
+          </ac:spMkLst>
+        </pc:spChg>
+      </pc:sldChg>
+      <pc:sldChg chg="del">
+        <pc:chgData name="Chris Reeves" userId="b49c9824-41eb-460f-b856-160cfa1dc613" providerId="ADAL" clId="{4C7E7115-D8D0-43A3-B54C-FFB698348616}" dt="2022-02-08T21:59:02.497" v="152" actId="2696"/>
+        <pc:sldMkLst>
+          <pc:docMk/>
+          <pc:sldMk cId="584315923" sldId="265"/>
+        </pc:sldMkLst>
+      </pc:sldChg>
+      <pc:sldChg chg="delSp modSp mod">
+        <pc:chgData name="Chris Reeves" userId="b49c9824-41eb-460f-b856-160cfa1dc613" providerId="ADAL" clId="{4C7E7115-D8D0-43A3-B54C-FFB698348616}" dt="2022-02-08T21:58:52.324" v="150" actId="478"/>
+        <pc:sldMkLst>
+          <pc:docMk/>
+          <pc:sldMk cId="1581745544" sldId="266"/>
+        </pc:sldMkLst>
+        <pc:spChg chg="mod">
+          <ac:chgData name="Chris Reeves" userId="b49c9824-41eb-460f-b856-160cfa1dc613" providerId="ADAL" clId="{4C7E7115-D8D0-43A3-B54C-FFB698348616}" dt="2022-02-08T21:58:47.056" v="147" actId="6549"/>
+          <ac:spMkLst>
+            <pc:docMk/>
+            <pc:sldMk cId="1581745544" sldId="266"/>
+            <ac:spMk id="3" creationId="{F9E1C5AD-92AF-4AAB-8F58-2133C24B60C4}"/>
+          </ac:spMkLst>
+        </pc:spChg>
+        <pc:spChg chg="del">
+          <ac:chgData name="Chris Reeves" userId="b49c9824-41eb-460f-b856-160cfa1dc613" providerId="ADAL" clId="{4C7E7115-D8D0-43A3-B54C-FFB698348616}" dt="2022-02-08T21:58:52.324" v="150" actId="478"/>
+          <ac:spMkLst>
+            <pc:docMk/>
+            <pc:sldMk cId="1581745544" sldId="266"/>
+            <ac:spMk id="12" creationId="{A6BA5703-3AD1-4485-8F46-4028510796EF}"/>
+          </ac:spMkLst>
+        </pc:spChg>
+        <pc:grpChg chg="del">
+          <ac:chgData name="Chris Reeves" userId="b49c9824-41eb-460f-b856-160cfa1dc613" providerId="ADAL" clId="{4C7E7115-D8D0-43A3-B54C-FFB698348616}" dt="2022-02-08T21:58:49.513" v="148" actId="478"/>
+          <ac:grpSpMkLst>
+            <pc:docMk/>
+            <pc:sldMk cId="1581745544" sldId="266"/>
+            <ac:grpSpMk id="16" creationId="{29050ADD-F8C6-481A-8BF0-64935BAF0E0C}"/>
+          </ac:grpSpMkLst>
+        </pc:grpChg>
+        <pc:picChg chg="del">
+          <ac:chgData name="Chris Reeves" userId="b49c9824-41eb-460f-b856-160cfa1dc613" providerId="ADAL" clId="{4C7E7115-D8D0-43A3-B54C-FFB698348616}" dt="2022-02-08T21:58:50.444" v="149" actId="478"/>
+          <ac:picMkLst>
+            <pc:docMk/>
+            <pc:sldMk cId="1581745544" sldId="266"/>
+            <ac:picMk id="15" creationId="{76BB6E94-6931-4811-AA51-95F4AF7F5C1F}"/>
+          </ac:picMkLst>
+        </pc:picChg>
+      </pc:sldChg>
+      <pc:sldChg chg="del">
+        <pc:chgData name="Chris Reeves" userId="b49c9824-41eb-460f-b856-160cfa1dc613" providerId="ADAL" clId="{4C7E7115-D8D0-43A3-B54C-FFB698348616}" dt="2022-02-08T21:59:06.666" v="153" actId="2696"/>
+        <pc:sldMkLst>
+          <pc:docMk/>
+          <pc:sldMk cId="2830517803" sldId="267"/>
+        </pc:sldMkLst>
+      </pc:sldChg>
+    </pc:docChg>
+  </pc:docChgLst>
+  <pc:docChgLst>
+    <pc:chgData name="Valade, Christian" userId="b7f8afa3-ecd1-415c-a7d8-3911c7f332e1" providerId="ADAL" clId="{63F6B6D0-799B-4CFA-B156-7C0DB90DDA3F}"/>
+    <pc:docChg chg="modSld">
+      <pc:chgData name="Valade, Christian" userId="b7f8afa3-ecd1-415c-a7d8-3911c7f332e1" providerId="ADAL" clId="{63F6B6D0-799B-4CFA-B156-7C0DB90DDA3F}" dt="2022-07-22T13:50:30.507" v="1" actId="20577"/>
+      <pc:docMkLst>
+        <pc:docMk/>
+      </pc:docMkLst>
+      <pc:sldChg chg="modSp mod">
+        <pc:chgData name="Valade, Christian" userId="b7f8afa3-ecd1-415c-a7d8-3911c7f332e1" providerId="ADAL" clId="{63F6B6D0-799B-4CFA-B156-7C0DB90DDA3F}" dt="2022-07-22T13:50:30.507" v="1" actId="20577"/>
+        <pc:sldMkLst>
+          <pc:docMk/>
+          <pc:sldMk cId="3290658582" sldId="270"/>
+        </pc:sldMkLst>
+        <pc:spChg chg="mod">
+          <ac:chgData name="Valade, Christian" userId="b7f8afa3-ecd1-415c-a7d8-3911c7f332e1" providerId="ADAL" clId="{63F6B6D0-799B-4CFA-B156-7C0DB90DDA3F}" dt="2022-07-22T13:50:30.507" v="1" actId="20577"/>
+          <ac:spMkLst>
+            <pc:docMk/>
+            <pc:sldMk cId="3290658582" sldId="270"/>
             <ac:spMk id="3" creationId="{F9E1C5AD-92AF-4AAB-8F58-2133C24B60C4}"/>
           </ac:spMkLst>
         </pc:spChg>
@@ -173,6 +565,491 @@
         </pc:sldMkLst>
         <pc:spChg chg="mod">
           <ac:chgData name="Reeves, Christopher" userId="S::reevesc7@msu.edu::b49c9824-41eb-460f-b856-160cfa1dc613" providerId="AD" clId="Web-{8E0761A3-013D-4C4A-9E1C-9632CEDD0DEA}" dt="2022-02-12T19:04:40.406" v="1" actId="20577"/>
+          <ac:spMkLst>
+            <pc:docMk/>
+            <pc:sldMk cId="4198178589" sldId="257"/>
+            <ac:spMk id="3" creationId="{F9E1C5AD-92AF-4AAB-8F58-2133C24B60C4}"/>
+          </ac:spMkLst>
+        </pc:spChg>
+      </pc:sldChg>
+    </pc:docChg>
+  </pc:docChgLst>
+  <pc:docChgLst>
+    <pc:chgData name="Reeves, Christopher" userId="S::reevesc7@msu.edu::b49c9824-41eb-460f-b856-160cfa1dc613" providerId="AD" clId="Web-{613CA3A6-25C9-40BD-BDBF-CA6F1D88A224}"/>
+    <pc:docChg chg="modSld">
+      <pc:chgData name="Reeves, Christopher" userId="S::reevesc7@msu.edu::b49c9824-41eb-460f-b856-160cfa1dc613" providerId="AD" clId="Web-{613CA3A6-25C9-40BD-BDBF-CA6F1D88A224}" dt="2022-01-29T15:26:23.972" v="8" actId="20577"/>
+      <pc:docMkLst>
+        <pc:docMk/>
+      </pc:docMkLst>
+      <pc:sldChg chg="modSp">
+        <pc:chgData name="Reeves, Christopher" userId="S::reevesc7@msu.edu::b49c9824-41eb-460f-b856-160cfa1dc613" providerId="AD" clId="Web-{613CA3A6-25C9-40BD-BDBF-CA6F1D88A224}" dt="2022-01-29T15:16:54.112" v="4" actId="20577"/>
+        <pc:sldMkLst>
+          <pc:docMk/>
+          <pc:sldMk cId="584315923" sldId="265"/>
+        </pc:sldMkLst>
+        <pc:spChg chg="mod">
+          <ac:chgData name="Reeves, Christopher" userId="S::reevesc7@msu.edu::b49c9824-41eb-460f-b856-160cfa1dc613" providerId="AD" clId="Web-{613CA3A6-25C9-40BD-BDBF-CA6F1D88A224}" dt="2022-01-29T15:16:54.112" v="4" actId="20577"/>
+          <ac:spMkLst>
+            <pc:docMk/>
+            <pc:sldMk cId="584315923" sldId="265"/>
+            <ac:spMk id="5" creationId="{808CA775-E27B-4CDE-951E-A4485604F2D7}"/>
+          </ac:spMkLst>
+        </pc:spChg>
+      </pc:sldChg>
+      <pc:sldChg chg="modSp">
+        <pc:chgData name="Reeves, Christopher" userId="S::reevesc7@msu.edu::b49c9824-41eb-460f-b856-160cfa1dc613" providerId="AD" clId="Web-{613CA3A6-25C9-40BD-BDBF-CA6F1D88A224}" dt="2022-01-29T15:26:23.972" v="8" actId="20577"/>
+        <pc:sldMkLst>
+          <pc:docMk/>
+          <pc:sldMk cId="1581745544" sldId="266"/>
+        </pc:sldMkLst>
+        <pc:spChg chg="mod">
+          <ac:chgData name="Reeves, Christopher" userId="S::reevesc7@msu.edu::b49c9824-41eb-460f-b856-160cfa1dc613" providerId="AD" clId="Web-{613CA3A6-25C9-40BD-BDBF-CA6F1D88A224}" dt="2022-01-29T15:26:23.972" v="8" actId="20577"/>
+          <ac:spMkLst>
+            <pc:docMk/>
+            <pc:sldMk cId="1581745544" sldId="266"/>
+            <ac:spMk id="12" creationId="{A6BA5703-3AD1-4485-8F46-4028510796EF}"/>
+          </ac:spMkLst>
+        </pc:spChg>
+      </pc:sldChg>
+    </pc:docChg>
+  </pc:docChgLst>
+  <pc:docChgLst>
+    <pc:chgData name="Chris Reeves" userId="b49c9824-41eb-460f-b856-160cfa1dc613" providerId="ADAL" clId="{320B3900-2BFD-4B9F-8A76-B8970B1B63EE}"/>
+    <pc:docChg chg="undo redo custSel addSld delSld modSld">
+      <pc:chgData name="Chris Reeves" userId="b49c9824-41eb-460f-b856-160cfa1dc613" providerId="ADAL" clId="{320B3900-2BFD-4B9F-8A76-B8970B1B63EE}" dt="2022-01-28T19:41:29.817" v="7149" actId="1076"/>
+      <pc:docMkLst>
+        <pc:docMk/>
+      </pc:docMkLst>
+      <pc:sldChg chg="del">
+        <pc:chgData name="Chris Reeves" userId="b49c9824-41eb-460f-b856-160cfa1dc613" providerId="ADAL" clId="{320B3900-2BFD-4B9F-8A76-B8970B1B63EE}" dt="2022-01-25T18:34:21.114" v="1" actId="47"/>
+        <pc:sldMkLst>
+          <pc:docMk/>
+          <pc:sldMk cId="109857222" sldId="256"/>
+        </pc:sldMkLst>
+      </pc:sldChg>
+      <pc:sldChg chg="modSp new mod">
+        <pc:chgData name="Chris Reeves" userId="b49c9824-41eb-460f-b856-160cfa1dc613" providerId="ADAL" clId="{320B3900-2BFD-4B9F-8A76-B8970B1B63EE}" dt="2022-01-28T03:41:08.244" v="6437" actId="313"/>
+        <pc:sldMkLst>
+          <pc:docMk/>
+          <pc:sldMk cId="4198178589" sldId="257"/>
+        </pc:sldMkLst>
+        <pc:spChg chg="mod">
+          <ac:chgData name="Chris Reeves" userId="b49c9824-41eb-460f-b856-160cfa1dc613" providerId="ADAL" clId="{320B3900-2BFD-4B9F-8A76-B8970B1B63EE}" dt="2022-01-27T17:49:25.485" v="2756" actId="1035"/>
+          <ac:spMkLst>
+            <pc:docMk/>
+            <pc:sldMk cId="4198178589" sldId="257"/>
+            <ac:spMk id="2" creationId="{93E913FC-AF7C-4F31-8CCF-0C042D810AED}"/>
+          </ac:spMkLst>
+        </pc:spChg>
+        <pc:spChg chg="mod">
+          <ac:chgData name="Chris Reeves" userId="b49c9824-41eb-460f-b856-160cfa1dc613" providerId="ADAL" clId="{320B3900-2BFD-4B9F-8A76-B8970B1B63EE}" dt="2022-01-28T03:41:08.244" v="6437" actId="313"/>
+          <ac:spMkLst>
+            <pc:docMk/>
+            <pc:sldMk cId="4198178589" sldId="257"/>
+            <ac:spMk id="3" creationId="{F9E1C5AD-92AF-4AAB-8F58-2133C24B60C4}"/>
+          </ac:spMkLst>
+        </pc:spChg>
+      </pc:sldChg>
+      <pc:sldChg chg="modSp new del mod">
+        <pc:chgData name="Chris Reeves" userId="b49c9824-41eb-460f-b856-160cfa1dc613" providerId="ADAL" clId="{320B3900-2BFD-4B9F-8A76-B8970B1B63EE}" dt="2022-01-27T17:47:20.640" v="2666" actId="2696"/>
+        <pc:sldMkLst>
+          <pc:docMk/>
+          <pc:sldMk cId="3476381566" sldId="258"/>
+        </pc:sldMkLst>
+        <pc:spChg chg="mod">
+          <ac:chgData name="Chris Reeves" userId="b49c9824-41eb-460f-b856-160cfa1dc613" providerId="ADAL" clId="{320B3900-2BFD-4B9F-8A76-B8970B1B63EE}" dt="2022-01-25T18:40:56.516" v="625" actId="20577"/>
+          <ac:spMkLst>
+            <pc:docMk/>
+            <pc:sldMk cId="3476381566" sldId="258"/>
+            <ac:spMk id="2" creationId="{F98A5C0F-FDB0-4A82-B7AC-EA70551A1E09}"/>
+          </ac:spMkLst>
+        </pc:spChg>
+        <pc:spChg chg="mod">
+          <ac:chgData name="Chris Reeves" userId="b49c9824-41eb-460f-b856-160cfa1dc613" providerId="ADAL" clId="{320B3900-2BFD-4B9F-8A76-B8970B1B63EE}" dt="2022-01-25T18:40:39.994" v="616" actId="20577"/>
+          <ac:spMkLst>
+            <pc:docMk/>
+            <pc:sldMk cId="3476381566" sldId="258"/>
+            <ac:spMk id="3" creationId="{770D93DF-B209-4A36-A0A6-215D08A961BB}"/>
+          </ac:spMkLst>
+        </pc:spChg>
+      </pc:sldChg>
+      <pc:sldChg chg="modSp new del mod">
+        <pc:chgData name="Chris Reeves" userId="b49c9824-41eb-460f-b856-160cfa1dc613" providerId="ADAL" clId="{320B3900-2BFD-4B9F-8A76-B8970B1B63EE}" dt="2022-01-27T17:47:39.953" v="2671" actId="2696"/>
+        <pc:sldMkLst>
+          <pc:docMk/>
+          <pc:sldMk cId="2497134089" sldId="259"/>
+        </pc:sldMkLst>
+        <pc:spChg chg="mod">
+          <ac:chgData name="Chris Reeves" userId="b49c9824-41eb-460f-b856-160cfa1dc613" providerId="ADAL" clId="{320B3900-2BFD-4B9F-8A76-B8970B1B63EE}" dt="2022-01-25T18:53:36.495" v="1305" actId="20577"/>
+          <ac:spMkLst>
+            <pc:docMk/>
+            <pc:sldMk cId="2497134089" sldId="259"/>
+            <ac:spMk id="2" creationId="{223F3D9A-1622-4713-A6E1-932B3551BC07}"/>
+          </ac:spMkLst>
+        </pc:spChg>
+        <pc:spChg chg="mod">
+          <ac:chgData name="Chris Reeves" userId="b49c9824-41eb-460f-b856-160cfa1dc613" providerId="ADAL" clId="{320B3900-2BFD-4B9F-8A76-B8970B1B63EE}" dt="2022-01-27T17:46:05.976" v="2655" actId="313"/>
+          <ac:spMkLst>
+            <pc:docMk/>
+            <pc:sldMk cId="2497134089" sldId="259"/>
+            <ac:spMk id="3" creationId="{B0205E3D-01A4-4841-8C1E-21EBF83CD159}"/>
+          </ac:spMkLst>
+        </pc:spChg>
+      </pc:sldChg>
+      <pc:sldChg chg="modSp new del mod">
+        <pc:chgData name="Chris Reeves" userId="b49c9824-41eb-460f-b856-160cfa1dc613" providerId="ADAL" clId="{320B3900-2BFD-4B9F-8A76-B8970B1B63EE}" dt="2022-01-27T17:46:52.643" v="2662" actId="2696"/>
+        <pc:sldMkLst>
+          <pc:docMk/>
+          <pc:sldMk cId="1177361074" sldId="260"/>
+        </pc:sldMkLst>
+        <pc:spChg chg="mod">
+          <ac:chgData name="Chris Reeves" userId="b49c9824-41eb-460f-b856-160cfa1dc613" providerId="ADAL" clId="{320B3900-2BFD-4B9F-8A76-B8970B1B63EE}" dt="2022-01-26T15:36:26.573" v="1983" actId="20577"/>
+          <ac:spMkLst>
+            <pc:docMk/>
+            <pc:sldMk cId="1177361074" sldId="260"/>
+            <ac:spMk id="2" creationId="{77805854-83FF-465C-8E12-33B89C6960E5}"/>
+          </ac:spMkLst>
+        </pc:spChg>
+        <pc:spChg chg="mod">
+          <ac:chgData name="Chris Reeves" userId="b49c9824-41eb-460f-b856-160cfa1dc613" providerId="ADAL" clId="{320B3900-2BFD-4B9F-8A76-B8970B1B63EE}" dt="2022-01-26T15:38:10.837" v="2160" actId="20577"/>
+          <ac:spMkLst>
+            <pc:docMk/>
+            <pc:sldMk cId="1177361074" sldId="260"/>
+            <ac:spMk id="3" creationId="{CEB5B244-EAF8-47A4-A949-9A342DED1604}"/>
+          </ac:spMkLst>
+        </pc:spChg>
+      </pc:sldChg>
+      <pc:sldChg chg="modSp add mod">
+        <pc:chgData name="Chris Reeves" userId="b49c9824-41eb-460f-b856-160cfa1dc613" providerId="ADAL" clId="{320B3900-2BFD-4B9F-8A76-B8970B1B63EE}" dt="2022-01-27T17:49:20.195" v="2746" actId="1035"/>
+        <pc:sldMkLst>
+          <pc:docMk/>
+          <pc:sldMk cId="3683627749" sldId="261"/>
+        </pc:sldMkLst>
+        <pc:spChg chg="mod">
+          <ac:chgData name="Chris Reeves" userId="b49c9824-41eb-460f-b856-160cfa1dc613" providerId="ADAL" clId="{320B3900-2BFD-4B9F-8A76-B8970B1B63EE}" dt="2022-01-27T17:49:20.195" v="2746" actId="1035"/>
+          <ac:spMkLst>
+            <pc:docMk/>
+            <pc:sldMk cId="3683627749" sldId="261"/>
+            <ac:spMk id="2" creationId="{93E913FC-AF7C-4F31-8CCF-0C042D810AED}"/>
+          </ac:spMkLst>
+        </pc:spChg>
+        <pc:spChg chg="mod">
+          <ac:chgData name="Chris Reeves" userId="b49c9824-41eb-460f-b856-160cfa1dc613" providerId="ADAL" clId="{320B3900-2BFD-4B9F-8A76-B8970B1B63EE}" dt="2022-01-27T17:46:43.408" v="2661" actId="12"/>
+          <ac:spMkLst>
+            <pc:docMk/>
+            <pc:sldMk cId="3683627749" sldId="261"/>
+            <ac:spMk id="3" creationId="{F9E1C5AD-92AF-4AAB-8F58-2133C24B60C4}"/>
+          </ac:spMkLst>
+        </pc:spChg>
+      </pc:sldChg>
+      <pc:sldChg chg="modSp add mod">
+        <pc:chgData name="Chris Reeves" userId="b49c9824-41eb-460f-b856-160cfa1dc613" providerId="ADAL" clId="{320B3900-2BFD-4B9F-8A76-B8970B1B63EE}" dt="2022-01-27T22:33:20.434" v="6185" actId="20577"/>
+        <pc:sldMkLst>
+          <pc:docMk/>
+          <pc:sldMk cId="2684212234" sldId="262"/>
+        </pc:sldMkLst>
+        <pc:spChg chg="mod">
+          <ac:chgData name="Chris Reeves" userId="b49c9824-41eb-460f-b856-160cfa1dc613" providerId="ADAL" clId="{320B3900-2BFD-4B9F-8A76-B8970B1B63EE}" dt="2022-01-27T17:49:12.295" v="2736" actId="1035"/>
+          <ac:spMkLst>
+            <pc:docMk/>
+            <pc:sldMk cId="2684212234" sldId="262"/>
+            <ac:spMk id="2" creationId="{93E913FC-AF7C-4F31-8CCF-0C042D810AED}"/>
+          </ac:spMkLst>
+        </pc:spChg>
+        <pc:spChg chg="mod">
+          <ac:chgData name="Chris Reeves" userId="b49c9824-41eb-460f-b856-160cfa1dc613" providerId="ADAL" clId="{320B3900-2BFD-4B9F-8A76-B8970B1B63EE}" dt="2022-01-27T22:33:20.434" v="6185" actId="20577"/>
+          <ac:spMkLst>
+            <pc:docMk/>
+            <pc:sldMk cId="2684212234" sldId="262"/>
+            <ac:spMk id="3" creationId="{F9E1C5AD-92AF-4AAB-8F58-2133C24B60C4}"/>
+          </ac:spMkLst>
+        </pc:spChg>
+      </pc:sldChg>
+      <pc:sldChg chg="modSp add mod">
+        <pc:chgData name="Chris Reeves" userId="b49c9824-41eb-460f-b856-160cfa1dc613" providerId="ADAL" clId="{320B3900-2BFD-4B9F-8A76-B8970B1B63EE}" dt="2022-01-27T22:20:20.634" v="6024" actId="114"/>
+        <pc:sldMkLst>
+          <pc:docMk/>
+          <pc:sldMk cId="2523626175" sldId="263"/>
+        </pc:sldMkLst>
+        <pc:spChg chg="mod">
+          <ac:chgData name="Chris Reeves" userId="b49c9824-41eb-460f-b856-160cfa1dc613" providerId="ADAL" clId="{320B3900-2BFD-4B9F-8A76-B8970B1B63EE}" dt="2022-01-27T17:49:07.857" v="2726" actId="1035"/>
+          <ac:spMkLst>
+            <pc:docMk/>
+            <pc:sldMk cId="2523626175" sldId="263"/>
+            <ac:spMk id="2" creationId="{93E913FC-AF7C-4F31-8CCF-0C042D810AED}"/>
+          </ac:spMkLst>
+        </pc:spChg>
+        <pc:spChg chg="mod">
+          <ac:chgData name="Chris Reeves" userId="b49c9824-41eb-460f-b856-160cfa1dc613" providerId="ADAL" clId="{320B3900-2BFD-4B9F-8A76-B8970B1B63EE}" dt="2022-01-27T22:20:20.634" v="6024" actId="114"/>
+          <ac:spMkLst>
+            <pc:docMk/>
+            <pc:sldMk cId="2523626175" sldId="263"/>
+            <ac:spMk id="3" creationId="{F9E1C5AD-92AF-4AAB-8F58-2133C24B60C4}"/>
+          </ac:spMkLst>
+        </pc:spChg>
+      </pc:sldChg>
+      <pc:sldChg chg="modSp add mod">
+        <pc:chgData name="Chris Reeves" userId="b49c9824-41eb-460f-b856-160cfa1dc613" providerId="ADAL" clId="{320B3900-2BFD-4B9F-8A76-B8970B1B63EE}" dt="2022-01-28T19:13:48.743" v="6547" actId="20577"/>
+        <pc:sldMkLst>
+          <pc:docMk/>
+          <pc:sldMk cId="3705567830" sldId="264"/>
+        </pc:sldMkLst>
+        <pc:spChg chg="mod">
+          <ac:chgData name="Chris Reeves" userId="b49c9824-41eb-460f-b856-160cfa1dc613" providerId="ADAL" clId="{320B3900-2BFD-4B9F-8A76-B8970B1B63EE}" dt="2022-01-28T19:12:34.891" v="6466" actId="20577"/>
+          <ac:spMkLst>
+            <pc:docMk/>
+            <pc:sldMk cId="3705567830" sldId="264"/>
+            <ac:spMk id="2" creationId="{93E913FC-AF7C-4F31-8CCF-0C042D810AED}"/>
+          </ac:spMkLst>
+        </pc:spChg>
+        <pc:spChg chg="mod">
+          <ac:chgData name="Chris Reeves" userId="b49c9824-41eb-460f-b856-160cfa1dc613" providerId="ADAL" clId="{320B3900-2BFD-4B9F-8A76-B8970B1B63EE}" dt="2022-01-28T19:13:48.743" v="6547" actId="20577"/>
+          <ac:spMkLst>
+            <pc:docMk/>
+            <pc:sldMk cId="3705567830" sldId="264"/>
+            <ac:spMk id="3" creationId="{F9E1C5AD-92AF-4AAB-8F58-2133C24B60C4}"/>
+          </ac:spMkLst>
+        </pc:spChg>
+      </pc:sldChg>
+      <pc:sldChg chg="addSp delSp modSp add mod">
+        <pc:chgData name="Chris Reeves" userId="b49c9824-41eb-460f-b856-160cfa1dc613" providerId="ADAL" clId="{320B3900-2BFD-4B9F-8A76-B8970B1B63EE}" dt="2022-01-28T00:52:11.685" v="6406" actId="20577"/>
+        <pc:sldMkLst>
+          <pc:docMk/>
+          <pc:sldMk cId="584315923" sldId="265"/>
+        </pc:sldMkLst>
+        <pc:spChg chg="mod">
+          <ac:chgData name="Chris Reeves" userId="b49c9824-41eb-460f-b856-160cfa1dc613" providerId="ADAL" clId="{320B3900-2BFD-4B9F-8A76-B8970B1B63EE}" dt="2022-01-27T21:55:58.938" v="5383" actId="1035"/>
+          <ac:spMkLst>
+            <pc:docMk/>
+            <pc:sldMk cId="584315923" sldId="265"/>
+            <ac:spMk id="2" creationId="{93E913FC-AF7C-4F31-8CCF-0C042D810AED}"/>
+          </ac:spMkLst>
+        </pc:spChg>
+        <pc:spChg chg="del mod">
+          <ac:chgData name="Chris Reeves" userId="b49c9824-41eb-460f-b856-160cfa1dc613" providerId="ADAL" clId="{320B3900-2BFD-4B9F-8A76-B8970B1B63EE}" dt="2022-01-27T18:34:39.010" v="4239" actId="478"/>
+          <ac:spMkLst>
+            <pc:docMk/>
+            <pc:sldMk cId="584315923" sldId="265"/>
+            <ac:spMk id="3" creationId="{F9E1C5AD-92AF-4AAB-8F58-2133C24B60C4}"/>
+          </ac:spMkLst>
+        </pc:spChg>
+        <pc:spChg chg="add mod">
+          <ac:chgData name="Chris Reeves" userId="b49c9824-41eb-460f-b856-160cfa1dc613" providerId="ADAL" clId="{320B3900-2BFD-4B9F-8A76-B8970B1B63EE}" dt="2022-01-28T00:46:42.270" v="6238" actId="20577"/>
+          <ac:spMkLst>
+            <pc:docMk/>
+            <pc:sldMk cId="584315923" sldId="265"/>
+            <ac:spMk id="5" creationId="{808CA775-E27B-4CDE-951E-A4485604F2D7}"/>
+          </ac:spMkLst>
+        </pc:spChg>
+        <pc:spChg chg="add del mod">
+          <ac:chgData name="Chris Reeves" userId="b49c9824-41eb-460f-b856-160cfa1dc613" providerId="ADAL" clId="{320B3900-2BFD-4B9F-8A76-B8970B1B63EE}" dt="2022-01-27T18:11:50.389" v="3721"/>
+          <ac:spMkLst>
+            <pc:docMk/>
+            <pc:sldMk cId="584315923" sldId="265"/>
+            <ac:spMk id="6" creationId="{A6FA66A9-36FF-402E-A676-1C4D1FCB77F0}"/>
+          </ac:spMkLst>
+        </pc:spChg>
+        <pc:spChg chg="add del mod">
+          <ac:chgData name="Chris Reeves" userId="b49c9824-41eb-460f-b856-160cfa1dc613" providerId="ADAL" clId="{320B3900-2BFD-4B9F-8A76-B8970B1B63EE}" dt="2022-01-27T18:34:15.095" v="4236" actId="478"/>
+          <ac:spMkLst>
+            <pc:docMk/>
+            <pc:sldMk cId="584315923" sldId="265"/>
+            <ac:spMk id="7" creationId="{0C18C12D-2916-4360-9C8B-E894248AA73C}"/>
+          </ac:spMkLst>
+        </pc:spChg>
+        <pc:spChg chg="add mod">
+          <ac:chgData name="Chris Reeves" userId="b49c9824-41eb-460f-b856-160cfa1dc613" providerId="ADAL" clId="{320B3900-2BFD-4B9F-8A76-B8970B1B63EE}" dt="2022-01-28T00:52:11.685" v="6406" actId="20577"/>
+          <ac:spMkLst>
+            <pc:docMk/>
+            <pc:sldMk cId="584315923" sldId="265"/>
+            <ac:spMk id="8" creationId="{A5F0A78C-17B3-423C-96A7-FE0D21A54967}"/>
+          </ac:spMkLst>
+        </pc:spChg>
+        <pc:spChg chg="add del mod">
+          <ac:chgData name="Chris Reeves" userId="b49c9824-41eb-460f-b856-160cfa1dc613" providerId="ADAL" clId="{320B3900-2BFD-4B9F-8A76-B8970B1B63EE}" dt="2022-01-27T21:24:27.856" v="4875" actId="478"/>
+          <ac:spMkLst>
+            <pc:docMk/>
+            <pc:sldMk cId="584315923" sldId="265"/>
+            <ac:spMk id="14" creationId="{1D755BF6-8F09-481C-8A30-2D2FB915CEF2}"/>
+          </ac:spMkLst>
+        </pc:spChg>
+        <pc:spChg chg="add del mod">
+          <ac:chgData name="Chris Reeves" userId="b49c9824-41eb-460f-b856-160cfa1dc613" providerId="ADAL" clId="{320B3900-2BFD-4B9F-8A76-B8970B1B63EE}" dt="2022-01-27T21:26:53.088" v="4883" actId="478"/>
+          <ac:spMkLst>
+            <pc:docMk/>
+            <pc:sldMk cId="584315923" sldId="265"/>
+            <ac:spMk id="15" creationId="{9185A74D-79FD-44CB-9981-8DDF8E129EA3}"/>
+          </ac:spMkLst>
+        </pc:spChg>
+        <pc:spChg chg="add del mod">
+          <ac:chgData name="Chris Reeves" userId="b49c9824-41eb-460f-b856-160cfa1dc613" providerId="ADAL" clId="{320B3900-2BFD-4B9F-8A76-B8970B1B63EE}" dt="2022-01-27T21:34:39.305" v="4904" actId="478"/>
+          <ac:spMkLst>
+            <pc:docMk/>
+            <pc:sldMk cId="584315923" sldId="265"/>
+            <ac:spMk id="16" creationId="{79069305-3D74-45D7-9FB7-95E57B12FAF3}"/>
+          </ac:spMkLst>
+        </pc:spChg>
+        <pc:spChg chg="add del mod">
+          <ac:chgData name="Chris Reeves" userId="b49c9824-41eb-460f-b856-160cfa1dc613" providerId="ADAL" clId="{320B3900-2BFD-4B9F-8A76-B8970B1B63EE}" dt="2022-01-27T21:43:26.781" v="5014" actId="478"/>
+          <ac:spMkLst>
+            <pc:docMk/>
+            <pc:sldMk cId="584315923" sldId="265"/>
+            <ac:spMk id="17" creationId="{DB22A9F8-3353-4855-A0B8-4F184FCFC2A2}"/>
+          </ac:spMkLst>
+        </pc:spChg>
+        <pc:spChg chg="add mod">
+          <ac:chgData name="Chris Reeves" userId="b49c9824-41eb-460f-b856-160cfa1dc613" providerId="ADAL" clId="{320B3900-2BFD-4B9F-8A76-B8970B1B63EE}" dt="2022-01-28T00:49:23.962" v="6278" actId="207"/>
+          <ac:spMkLst>
+            <pc:docMk/>
+            <pc:sldMk cId="584315923" sldId="265"/>
+            <ac:spMk id="22" creationId="{98A17986-0DD4-4E60-A525-87DBD6A69BB0}"/>
+          </ac:spMkLst>
+        </pc:spChg>
+        <pc:spChg chg="add mod">
+          <ac:chgData name="Chris Reeves" userId="b49c9824-41eb-460f-b856-160cfa1dc613" providerId="ADAL" clId="{320B3900-2BFD-4B9F-8A76-B8970B1B63EE}" dt="2022-01-28T00:50:10.262" v="6332" actId="20577"/>
+          <ac:spMkLst>
+            <pc:docMk/>
+            <pc:sldMk cId="584315923" sldId="265"/>
+            <ac:spMk id="23" creationId="{FFAE77A1-D972-46FF-B0CD-56FFFA3EE24F}"/>
+          </ac:spMkLst>
+        </pc:spChg>
+        <pc:cxnChg chg="add del mod">
+          <ac:chgData name="Chris Reeves" userId="b49c9824-41eb-460f-b856-160cfa1dc613" providerId="ADAL" clId="{320B3900-2BFD-4B9F-8A76-B8970B1B63EE}" dt="2022-01-27T21:22:57.522" v="4871" actId="478"/>
+          <ac:cxnSpMkLst>
+            <pc:docMk/>
+            <pc:sldMk cId="584315923" sldId="265"/>
+            <ac:cxnSpMk id="10" creationId="{76606C2A-536D-4E29-870A-638E922ABED0}"/>
+          </ac:cxnSpMkLst>
+        </pc:cxnChg>
+        <pc:cxnChg chg="add del mod">
+          <ac:chgData name="Chris Reeves" userId="b49c9824-41eb-460f-b856-160cfa1dc613" providerId="ADAL" clId="{320B3900-2BFD-4B9F-8A76-B8970B1B63EE}" dt="2022-01-27T21:36:47.640" v="4922" actId="478"/>
+          <ac:cxnSpMkLst>
+            <pc:docMk/>
+            <pc:sldMk cId="584315923" sldId="265"/>
+            <ac:cxnSpMk id="19" creationId="{B2A8500B-4B57-41EE-AB31-1E0B0E19A07E}"/>
+          </ac:cxnSpMkLst>
+        </pc:cxnChg>
+      </pc:sldChg>
+      <pc:sldChg chg="addSp delSp modSp add mod">
+        <pc:chgData name="Chris Reeves" userId="b49c9824-41eb-460f-b856-160cfa1dc613" providerId="ADAL" clId="{320B3900-2BFD-4B9F-8A76-B8970B1B63EE}" dt="2022-01-28T19:41:29.817" v="7149" actId="1076"/>
+        <pc:sldMkLst>
+          <pc:docMk/>
+          <pc:sldMk cId="1581745544" sldId="266"/>
+        </pc:sldMkLst>
+        <pc:spChg chg="mod">
+          <ac:chgData name="Chris Reeves" userId="b49c9824-41eb-460f-b856-160cfa1dc613" providerId="ADAL" clId="{320B3900-2BFD-4B9F-8A76-B8970B1B63EE}" dt="2022-01-28T19:11:33.858" v="6449" actId="20577"/>
+          <ac:spMkLst>
+            <pc:docMk/>
+            <pc:sldMk cId="1581745544" sldId="266"/>
+            <ac:spMk id="2" creationId="{93E913FC-AF7C-4F31-8CCF-0C042D810AED}"/>
+          </ac:spMkLst>
+        </pc:spChg>
+        <pc:spChg chg="mod">
+          <ac:chgData name="Chris Reeves" userId="b49c9824-41eb-460f-b856-160cfa1dc613" providerId="ADAL" clId="{320B3900-2BFD-4B9F-8A76-B8970B1B63EE}" dt="2022-01-28T19:19:02.943" v="6711" actId="20577"/>
+          <ac:spMkLst>
+            <pc:docMk/>
+            <pc:sldMk cId="1581745544" sldId="266"/>
+            <ac:spMk id="3" creationId="{F9E1C5AD-92AF-4AAB-8F58-2133C24B60C4}"/>
+          </ac:spMkLst>
+        </pc:spChg>
+        <pc:spChg chg="add mod">
+          <ac:chgData name="Chris Reeves" userId="b49c9824-41eb-460f-b856-160cfa1dc613" providerId="ADAL" clId="{320B3900-2BFD-4B9F-8A76-B8970B1B63EE}" dt="2022-01-28T19:28:37.090" v="6727" actId="1076"/>
+          <ac:spMkLst>
+            <pc:docMk/>
+            <pc:sldMk cId="1581745544" sldId="266"/>
+            <ac:spMk id="6" creationId="{DA2FC45D-809D-47E9-8001-E1BB5CF86E4C}"/>
+          </ac:spMkLst>
+        </pc:spChg>
+        <pc:spChg chg="add mod">
+          <ac:chgData name="Chris Reeves" userId="b49c9824-41eb-460f-b856-160cfa1dc613" providerId="ADAL" clId="{320B3900-2BFD-4B9F-8A76-B8970B1B63EE}" dt="2022-01-28T19:30:55.898" v="6756" actId="164"/>
+          <ac:spMkLst>
+            <pc:docMk/>
+            <pc:sldMk cId="1581745544" sldId="266"/>
+            <ac:spMk id="10" creationId="{741600DA-6DA2-4472-AA8F-635FC417454F}"/>
+          </ac:spMkLst>
+        </pc:spChg>
+        <pc:spChg chg="add mod">
+          <ac:chgData name="Chris Reeves" userId="b49c9824-41eb-460f-b856-160cfa1dc613" providerId="ADAL" clId="{320B3900-2BFD-4B9F-8A76-B8970B1B63EE}" dt="2022-01-28T19:40:21.081" v="7111" actId="1076"/>
+          <ac:spMkLst>
+            <pc:docMk/>
+            <pc:sldMk cId="1581745544" sldId="266"/>
+            <ac:spMk id="12" creationId="{A6BA5703-3AD1-4485-8F46-4028510796EF}"/>
+          </ac:spMkLst>
+        </pc:spChg>
+        <pc:spChg chg="add mod">
+          <ac:chgData name="Chris Reeves" userId="b49c9824-41eb-460f-b856-160cfa1dc613" providerId="ADAL" clId="{320B3900-2BFD-4B9F-8A76-B8970B1B63EE}" dt="2022-01-28T19:41:22.089" v="7148" actId="164"/>
+          <ac:spMkLst>
+            <pc:docMk/>
+            <pc:sldMk cId="1581745544" sldId="266"/>
+            <ac:spMk id="13" creationId="{20BA24EB-5932-4F63-868A-ED93DEA0387A}"/>
+          </ac:spMkLst>
+        </pc:spChg>
+        <pc:grpChg chg="add del mod">
+          <ac:chgData name="Chris Reeves" userId="b49c9824-41eb-460f-b856-160cfa1dc613" providerId="ADAL" clId="{320B3900-2BFD-4B9F-8A76-B8970B1B63EE}" dt="2022-01-28T19:29:06.817" v="6733" actId="478"/>
+          <ac:grpSpMkLst>
+            <pc:docMk/>
+            <pc:sldMk cId="1581745544" sldId="266"/>
+            <ac:grpSpMk id="7" creationId="{AD1395DD-7190-4B79-B65C-16CD2E256C69}"/>
+          </ac:grpSpMkLst>
+        </pc:grpChg>
+        <pc:grpChg chg="add mod">
+          <ac:chgData name="Chris Reeves" userId="b49c9824-41eb-460f-b856-160cfa1dc613" providerId="ADAL" clId="{320B3900-2BFD-4B9F-8A76-B8970B1B63EE}" dt="2022-01-28T19:41:22.089" v="7148" actId="164"/>
+          <ac:grpSpMkLst>
+            <pc:docMk/>
+            <pc:sldMk cId="1581745544" sldId="266"/>
+            <ac:grpSpMk id="11" creationId="{357AFAEC-027E-4412-B394-6F893B97359F}"/>
+          </ac:grpSpMkLst>
+        </pc:grpChg>
+        <pc:grpChg chg="add mod">
+          <ac:chgData name="Chris Reeves" userId="b49c9824-41eb-460f-b856-160cfa1dc613" providerId="ADAL" clId="{320B3900-2BFD-4B9F-8A76-B8970B1B63EE}" dt="2022-01-28T19:41:22.089" v="7148" actId="164"/>
+          <ac:grpSpMkLst>
+            <pc:docMk/>
+            <pc:sldMk cId="1581745544" sldId="266"/>
+            <ac:grpSpMk id="16" creationId="{29050ADD-F8C6-481A-8BF0-64935BAF0E0C}"/>
+          </ac:grpSpMkLst>
+        </pc:grpChg>
+        <pc:picChg chg="add mod modCrop">
+          <ac:chgData name="Chris Reeves" userId="b49c9824-41eb-460f-b856-160cfa1dc613" providerId="ADAL" clId="{320B3900-2BFD-4B9F-8A76-B8970B1B63EE}" dt="2022-01-28T19:28:37.090" v="6727" actId="1076"/>
+          <ac:picMkLst>
+            <pc:docMk/>
+            <pc:sldMk cId="1581745544" sldId="266"/>
+            <ac:picMk id="5" creationId="{663178FC-4359-441E-B3E8-6D3080BBEEB8}"/>
+          </ac:picMkLst>
+        </pc:picChg>
+        <pc:picChg chg="add mod modCrop">
+          <ac:chgData name="Chris Reeves" userId="b49c9824-41eb-460f-b856-160cfa1dc613" providerId="ADAL" clId="{320B3900-2BFD-4B9F-8A76-B8970B1B63EE}" dt="2022-01-28T19:30:55.898" v="6756" actId="164"/>
+          <ac:picMkLst>
+            <pc:docMk/>
+            <pc:sldMk cId="1581745544" sldId="266"/>
+            <ac:picMk id="9" creationId="{062A5D2C-AB35-4040-80DE-A182BE68C5EB}"/>
+          </ac:picMkLst>
+        </pc:picChg>
+        <pc:picChg chg="add mod">
+          <ac:chgData name="Chris Reeves" userId="b49c9824-41eb-460f-b856-160cfa1dc613" providerId="ADAL" clId="{320B3900-2BFD-4B9F-8A76-B8970B1B63EE}" dt="2022-01-28T19:41:29.817" v="7149" actId="1076"/>
+          <ac:picMkLst>
+            <pc:docMk/>
+            <pc:sldMk cId="1581745544" sldId="266"/>
+            <ac:picMk id="15" creationId="{76BB6E94-6931-4811-AA51-95F4AF7F5C1F}"/>
+          </ac:picMkLst>
+        </pc:picChg>
+      </pc:sldChg>
+    </pc:docChg>
+  </pc:docChgLst>
+  <pc:docChgLst>
+    <pc:chgData name="Reeves, Christopher" userId="S::reevesc7@msu.edu::b49c9824-41eb-460f-b856-160cfa1dc613" providerId="AD" clId="Web-{427D9BEB-3C52-4813-B0B3-A0AA85CC2DFD}"/>
+    <pc:docChg chg="modSld">
+      <pc:chgData name="Reeves, Christopher" userId="S::reevesc7@msu.edu::b49c9824-41eb-460f-b856-160cfa1dc613" providerId="AD" clId="Web-{427D9BEB-3C52-4813-B0B3-A0AA85CC2DFD}" dt="2022-02-11T21:35:10.615" v="13" actId="20577"/>
+      <pc:docMkLst>
+        <pc:docMk/>
+      </pc:docMkLst>
+      <pc:sldChg chg="modSp">
+        <pc:chgData name="Reeves, Christopher" userId="S::reevesc7@msu.edu::b49c9824-41eb-460f-b856-160cfa1dc613" providerId="AD" clId="Web-{427D9BEB-3C52-4813-B0B3-A0AA85CC2DFD}" dt="2022-02-11T21:35:10.615" v="13" actId="20577"/>
+        <pc:sldMkLst>
+          <pc:docMk/>
+          <pc:sldMk cId="4198178589" sldId="257"/>
+        </pc:sldMkLst>
+        <pc:spChg chg="mod">
+          <ac:chgData name="Reeves, Christopher" userId="S::reevesc7@msu.edu::b49c9824-41eb-460f-b856-160cfa1dc613" providerId="AD" clId="Web-{427D9BEB-3C52-4813-B0B3-A0AA85CC2DFD}" dt="2022-02-11T21:35:10.615" v="13" actId="20577"/>
           <ac:spMkLst>
             <pc:docMk/>
             <pc:sldMk cId="4198178589" sldId="257"/>
@@ -232,373 +1109,6 @@
             <pc:docMk/>
             <pc:sldMk cId="2830517803" sldId="267"/>
             <ac:picMk id="4" creationId="{F97C2F05-D67F-4448-B13D-89D5CA86386F}"/>
-          </ac:picMkLst>
-        </pc:picChg>
-      </pc:sldChg>
-    </pc:docChg>
-  </pc:docChgLst>
-  <pc:docChgLst>
-    <pc:chgData name="Chris Reeves" userId="b49c9824-41eb-460f-b856-160cfa1dc613" providerId="ADAL" clId="{4C7E7115-D8D0-43A3-B54C-FFB698348616}"/>
-    <pc:docChg chg="custSel delSld modSld">
-      <pc:chgData name="Chris Reeves" userId="b49c9824-41eb-460f-b856-160cfa1dc613" providerId="ADAL" clId="{4C7E7115-D8D0-43A3-B54C-FFB698348616}" dt="2022-02-08T22:27:34.975" v="221" actId="20577"/>
-      <pc:docMkLst>
-        <pc:docMk/>
-      </pc:docMkLst>
-      <pc:sldChg chg="modSp mod">
-        <pc:chgData name="Chris Reeves" userId="b49c9824-41eb-460f-b856-160cfa1dc613" providerId="ADAL" clId="{4C7E7115-D8D0-43A3-B54C-FFB698348616}" dt="2022-02-08T22:18:22.498" v="212" actId="27636"/>
-        <pc:sldMkLst>
-          <pc:docMk/>
-          <pc:sldMk cId="4198178589" sldId="257"/>
-        </pc:sldMkLst>
-        <pc:spChg chg="mod">
-          <ac:chgData name="Chris Reeves" userId="b49c9824-41eb-460f-b856-160cfa1dc613" providerId="ADAL" clId="{4C7E7115-D8D0-43A3-B54C-FFB698348616}" dt="2022-02-08T22:18:22.498" v="212" actId="27636"/>
-          <ac:spMkLst>
-            <pc:docMk/>
-            <pc:sldMk cId="4198178589" sldId="257"/>
-            <ac:spMk id="3" creationId="{F9E1C5AD-92AF-4AAB-8F58-2133C24B60C4}"/>
-          </ac:spMkLst>
-        </pc:spChg>
-      </pc:sldChg>
-      <pc:sldChg chg="modSp mod">
-        <pc:chgData name="Chris Reeves" userId="b49c9824-41eb-460f-b856-160cfa1dc613" providerId="ADAL" clId="{4C7E7115-D8D0-43A3-B54C-FFB698348616}" dt="2022-02-08T21:57:30.828" v="124" actId="20577"/>
-        <pc:sldMkLst>
-          <pc:docMk/>
-          <pc:sldMk cId="3683627749" sldId="261"/>
-        </pc:sldMkLst>
-        <pc:spChg chg="mod">
-          <ac:chgData name="Chris Reeves" userId="b49c9824-41eb-460f-b856-160cfa1dc613" providerId="ADAL" clId="{4C7E7115-D8D0-43A3-B54C-FFB698348616}" dt="2022-02-08T21:57:30.828" v="124" actId="20577"/>
-          <ac:spMkLst>
-            <pc:docMk/>
-            <pc:sldMk cId="3683627749" sldId="261"/>
-            <ac:spMk id="3" creationId="{F9E1C5AD-92AF-4AAB-8F58-2133C24B60C4}"/>
-          </ac:spMkLst>
-        </pc:spChg>
-      </pc:sldChg>
-      <pc:sldChg chg="modSp mod">
-        <pc:chgData name="Chris Reeves" userId="b49c9824-41eb-460f-b856-160cfa1dc613" providerId="ADAL" clId="{4C7E7115-D8D0-43A3-B54C-FFB698348616}" dt="2022-02-08T22:27:34.975" v="221" actId="20577"/>
-        <pc:sldMkLst>
-          <pc:docMk/>
-          <pc:sldMk cId="2684212234" sldId="262"/>
-        </pc:sldMkLst>
-        <pc:spChg chg="mod">
-          <ac:chgData name="Chris Reeves" userId="b49c9824-41eb-460f-b856-160cfa1dc613" providerId="ADAL" clId="{4C7E7115-D8D0-43A3-B54C-FFB698348616}" dt="2022-02-08T22:27:34.975" v="221" actId="20577"/>
-          <ac:spMkLst>
-            <pc:docMk/>
-            <pc:sldMk cId="2684212234" sldId="262"/>
-            <ac:spMk id="3" creationId="{F9E1C5AD-92AF-4AAB-8F58-2133C24B60C4}"/>
-          </ac:spMkLst>
-        </pc:spChg>
-      </pc:sldChg>
-      <pc:sldChg chg="modSp mod">
-        <pc:chgData name="Chris Reeves" userId="b49c9824-41eb-460f-b856-160cfa1dc613" providerId="ADAL" clId="{4C7E7115-D8D0-43A3-B54C-FFB698348616}" dt="2022-02-08T21:58:42.287" v="146" actId="6549"/>
-        <pc:sldMkLst>
-          <pc:docMk/>
-          <pc:sldMk cId="2523626175" sldId="263"/>
-        </pc:sldMkLst>
-        <pc:spChg chg="mod">
-          <ac:chgData name="Chris Reeves" userId="b49c9824-41eb-460f-b856-160cfa1dc613" providerId="ADAL" clId="{4C7E7115-D8D0-43A3-B54C-FFB698348616}" dt="2022-02-08T21:58:42.287" v="146" actId="6549"/>
-          <ac:spMkLst>
-            <pc:docMk/>
-            <pc:sldMk cId="2523626175" sldId="263"/>
-            <ac:spMk id="3" creationId="{F9E1C5AD-92AF-4AAB-8F58-2133C24B60C4}"/>
-          </ac:spMkLst>
-        </pc:spChg>
-      </pc:sldChg>
-      <pc:sldChg chg="modSp mod">
-        <pc:chgData name="Chris Reeves" userId="b49c9824-41eb-460f-b856-160cfa1dc613" providerId="ADAL" clId="{4C7E7115-D8D0-43A3-B54C-FFB698348616}" dt="2022-02-08T21:58:57.970" v="151" actId="20577"/>
-        <pc:sldMkLst>
-          <pc:docMk/>
-          <pc:sldMk cId="3705567830" sldId="264"/>
-        </pc:sldMkLst>
-        <pc:spChg chg="mod">
-          <ac:chgData name="Chris Reeves" userId="b49c9824-41eb-460f-b856-160cfa1dc613" providerId="ADAL" clId="{4C7E7115-D8D0-43A3-B54C-FFB698348616}" dt="2022-02-08T21:58:57.970" v="151" actId="20577"/>
-          <ac:spMkLst>
-            <pc:docMk/>
-            <pc:sldMk cId="3705567830" sldId="264"/>
-            <ac:spMk id="3" creationId="{F9E1C5AD-92AF-4AAB-8F58-2133C24B60C4}"/>
-          </ac:spMkLst>
-        </pc:spChg>
-      </pc:sldChg>
-      <pc:sldChg chg="del">
-        <pc:chgData name="Chris Reeves" userId="b49c9824-41eb-460f-b856-160cfa1dc613" providerId="ADAL" clId="{4C7E7115-D8D0-43A3-B54C-FFB698348616}" dt="2022-02-08T21:59:02.497" v="152" actId="2696"/>
-        <pc:sldMkLst>
-          <pc:docMk/>
-          <pc:sldMk cId="584315923" sldId="265"/>
-        </pc:sldMkLst>
-      </pc:sldChg>
-      <pc:sldChg chg="delSp modSp mod">
-        <pc:chgData name="Chris Reeves" userId="b49c9824-41eb-460f-b856-160cfa1dc613" providerId="ADAL" clId="{4C7E7115-D8D0-43A3-B54C-FFB698348616}" dt="2022-02-08T21:58:52.324" v="150" actId="478"/>
-        <pc:sldMkLst>
-          <pc:docMk/>
-          <pc:sldMk cId="1581745544" sldId="266"/>
-        </pc:sldMkLst>
-        <pc:spChg chg="mod">
-          <ac:chgData name="Chris Reeves" userId="b49c9824-41eb-460f-b856-160cfa1dc613" providerId="ADAL" clId="{4C7E7115-D8D0-43A3-B54C-FFB698348616}" dt="2022-02-08T21:58:47.056" v="147" actId="6549"/>
-          <ac:spMkLst>
-            <pc:docMk/>
-            <pc:sldMk cId="1581745544" sldId="266"/>
-            <ac:spMk id="3" creationId="{F9E1C5AD-92AF-4AAB-8F58-2133C24B60C4}"/>
-          </ac:spMkLst>
-        </pc:spChg>
-        <pc:spChg chg="del">
-          <ac:chgData name="Chris Reeves" userId="b49c9824-41eb-460f-b856-160cfa1dc613" providerId="ADAL" clId="{4C7E7115-D8D0-43A3-B54C-FFB698348616}" dt="2022-02-08T21:58:52.324" v="150" actId="478"/>
-          <ac:spMkLst>
-            <pc:docMk/>
-            <pc:sldMk cId="1581745544" sldId="266"/>
-            <ac:spMk id="12" creationId="{A6BA5703-3AD1-4485-8F46-4028510796EF}"/>
-          </ac:spMkLst>
-        </pc:spChg>
-        <pc:grpChg chg="del">
-          <ac:chgData name="Chris Reeves" userId="b49c9824-41eb-460f-b856-160cfa1dc613" providerId="ADAL" clId="{4C7E7115-D8D0-43A3-B54C-FFB698348616}" dt="2022-02-08T21:58:49.513" v="148" actId="478"/>
-          <ac:grpSpMkLst>
-            <pc:docMk/>
-            <pc:sldMk cId="1581745544" sldId="266"/>
-            <ac:grpSpMk id="16" creationId="{29050ADD-F8C6-481A-8BF0-64935BAF0E0C}"/>
-          </ac:grpSpMkLst>
-        </pc:grpChg>
-        <pc:picChg chg="del">
-          <ac:chgData name="Chris Reeves" userId="b49c9824-41eb-460f-b856-160cfa1dc613" providerId="ADAL" clId="{4C7E7115-D8D0-43A3-B54C-FFB698348616}" dt="2022-02-08T21:58:50.444" v="149" actId="478"/>
-          <ac:picMkLst>
-            <pc:docMk/>
-            <pc:sldMk cId="1581745544" sldId="266"/>
-            <ac:picMk id="15" creationId="{76BB6E94-6931-4811-AA51-95F4AF7F5C1F}"/>
-          </ac:picMkLst>
-        </pc:picChg>
-      </pc:sldChg>
-      <pc:sldChg chg="del">
-        <pc:chgData name="Chris Reeves" userId="b49c9824-41eb-460f-b856-160cfa1dc613" providerId="ADAL" clId="{4C7E7115-D8D0-43A3-B54C-FFB698348616}" dt="2022-02-08T21:59:06.666" v="153" actId="2696"/>
-        <pc:sldMkLst>
-          <pc:docMk/>
-          <pc:sldMk cId="2830517803" sldId="267"/>
-        </pc:sldMkLst>
-      </pc:sldChg>
-    </pc:docChg>
-  </pc:docChgLst>
-  <pc:docChgLst>
-    <pc:chgData name="Chris Reeves" userId="b49c9824-41eb-460f-b856-160cfa1dc613" providerId="ADAL" clId="{C6DD1DB1-9BFA-4213-8AF4-C87E0CA105E0}"/>
-    <pc:docChg chg="undo custSel addSld delSld modSld sldOrd">
-      <pc:chgData name="Chris Reeves" userId="b49c9824-41eb-460f-b856-160cfa1dc613" providerId="ADAL" clId="{C6DD1DB1-9BFA-4213-8AF4-C87E0CA105E0}" dt="2022-05-02T20:54:53.407" v="4965" actId="1076"/>
-      <pc:docMkLst>
-        <pc:docMk/>
-      </pc:docMkLst>
-      <pc:sldChg chg="modSp mod">
-        <pc:chgData name="Chris Reeves" userId="b49c9824-41eb-460f-b856-160cfa1dc613" providerId="ADAL" clId="{C6DD1DB1-9BFA-4213-8AF4-C87E0CA105E0}" dt="2022-05-02T19:29:22.592" v="118" actId="313"/>
-        <pc:sldMkLst>
-          <pc:docMk/>
-          <pc:sldMk cId="4198178589" sldId="257"/>
-        </pc:sldMkLst>
-        <pc:spChg chg="mod">
-          <ac:chgData name="Chris Reeves" userId="b49c9824-41eb-460f-b856-160cfa1dc613" providerId="ADAL" clId="{C6DD1DB1-9BFA-4213-8AF4-C87E0CA105E0}" dt="2022-05-02T19:29:22.592" v="118" actId="313"/>
-          <ac:spMkLst>
-            <pc:docMk/>
-            <pc:sldMk cId="4198178589" sldId="257"/>
-            <ac:spMk id="3" creationId="{F9E1C5AD-92AF-4AAB-8F58-2133C24B60C4}"/>
-          </ac:spMkLst>
-        </pc:spChg>
-      </pc:sldChg>
-      <pc:sldChg chg="modSp mod ord">
-        <pc:chgData name="Chris Reeves" userId="b49c9824-41eb-460f-b856-160cfa1dc613" providerId="ADAL" clId="{C6DD1DB1-9BFA-4213-8AF4-C87E0CA105E0}" dt="2022-05-02T20:27:07.574" v="4005"/>
-        <pc:sldMkLst>
-          <pc:docMk/>
-          <pc:sldMk cId="3683627749" sldId="261"/>
-        </pc:sldMkLst>
-        <pc:spChg chg="mod">
-          <ac:chgData name="Chris Reeves" userId="b49c9824-41eb-460f-b856-160cfa1dc613" providerId="ADAL" clId="{C6DD1DB1-9BFA-4213-8AF4-C87E0CA105E0}" dt="2022-05-02T20:26:41.799" v="4001" actId="20577"/>
-          <ac:spMkLst>
-            <pc:docMk/>
-            <pc:sldMk cId="3683627749" sldId="261"/>
-            <ac:spMk id="2" creationId="{93E913FC-AF7C-4F31-8CCF-0C042D810AED}"/>
-          </ac:spMkLst>
-        </pc:spChg>
-      </pc:sldChg>
-      <pc:sldChg chg="modSp mod">
-        <pc:chgData name="Chris Reeves" userId="b49c9824-41eb-460f-b856-160cfa1dc613" providerId="ADAL" clId="{C6DD1DB1-9BFA-4213-8AF4-C87E0CA105E0}" dt="2022-05-02T20:38:29.677" v="4231" actId="20577"/>
-        <pc:sldMkLst>
-          <pc:docMk/>
-          <pc:sldMk cId="2684212234" sldId="262"/>
-        </pc:sldMkLst>
-        <pc:spChg chg="mod">
-          <ac:chgData name="Chris Reeves" userId="b49c9824-41eb-460f-b856-160cfa1dc613" providerId="ADAL" clId="{C6DD1DB1-9BFA-4213-8AF4-C87E0CA105E0}" dt="2022-05-02T20:38:29.677" v="4231" actId="20577"/>
-          <ac:spMkLst>
-            <pc:docMk/>
-            <pc:sldMk cId="2684212234" sldId="262"/>
-            <ac:spMk id="3" creationId="{F9E1C5AD-92AF-4AAB-8F58-2133C24B60C4}"/>
-          </ac:spMkLst>
-        </pc:spChg>
-      </pc:sldChg>
-      <pc:sldChg chg="modSp mod">
-        <pc:chgData name="Chris Reeves" userId="b49c9824-41eb-460f-b856-160cfa1dc613" providerId="ADAL" clId="{C6DD1DB1-9BFA-4213-8AF4-C87E0CA105E0}" dt="2022-05-02T19:55:58.286" v="1299" actId="20577"/>
-        <pc:sldMkLst>
-          <pc:docMk/>
-          <pc:sldMk cId="2523626175" sldId="263"/>
-        </pc:sldMkLst>
-        <pc:spChg chg="mod">
-          <ac:chgData name="Chris Reeves" userId="b49c9824-41eb-460f-b856-160cfa1dc613" providerId="ADAL" clId="{C6DD1DB1-9BFA-4213-8AF4-C87E0CA105E0}" dt="2022-05-02T19:55:58.286" v="1299" actId="20577"/>
-          <ac:spMkLst>
-            <pc:docMk/>
-            <pc:sldMk cId="2523626175" sldId="263"/>
-            <ac:spMk id="3" creationId="{F9E1C5AD-92AF-4AAB-8F58-2133C24B60C4}"/>
-          </ac:spMkLst>
-        </pc:spChg>
-      </pc:sldChg>
-      <pc:sldChg chg="addSp delSp modSp mod">
-        <pc:chgData name="Chris Reeves" userId="b49c9824-41eb-460f-b856-160cfa1dc613" providerId="ADAL" clId="{C6DD1DB1-9BFA-4213-8AF4-C87E0CA105E0}" dt="2022-05-02T20:54:53.407" v="4965" actId="1076"/>
-        <pc:sldMkLst>
-          <pc:docMk/>
-          <pc:sldMk cId="1581745544" sldId="266"/>
-        </pc:sldMkLst>
-        <pc:spChg chg="mod">
-          <ac:chgData name="Chris Reeves" userId="b49c9824-41eb-460f-b856-160cfa1dc613" providerId="ADAL" clId="{C6DD1DB1-9BFA-4213-8AF4-C87E0CA105E0}" dt="2022-05-02T20:54:53.407" v="4965" actId="1076"/>
-          <ac:spMkLst>
-            <pc:docMk/>
-            <pc:sldMk cId="1581745544" sldId="266"/>
-            <ac:spMk id="3" creationId="{F9E1C5AD-92AF-4AAB-8F58-2133C24B60C4}"/>
-          </ac:spMkLst>
-        </pc:spChg>
-        <pc:picChg chg="add del mod">
-          <ac:chgData name="Chris Reeves" userId="b49c9824-41eb-460f-b856-160cfa1dc613" providerId="ADAL" clId="{C6DD1DB1-9BFA-4213-8AF4-C87E0CA105E0}" dt="2022-05-02T20:47:52.642" v="4602" actId="478"/>
-          <ac:picMkLst>
-            <pc:docMk/>
-            <pc:sldMk cId="1581745544" sldId="266"/>
-            <ac:picMk id="5" creationId="{BBA2D60F-454C-F8B5-70FC-598A80EDC038}"/>
-          </ac:picMkLst>
-        </pc:picChg>
-        <pc:picChg chg="add mod">
-          <ac:chgData name="Chris Reeves" userId="b49c9824-41eb-460f-b856-160cfa1dc613" providerId="ADAL" clId="{C6DD1DB1-9BFA-4213-8AF4-C87E0CA105E0}" dt="2022-05-02T20:48:26.466" v="4611" actId="1037"/>
-          <ac:picMkLst>
-            <pc:docMk/>
-            <pc:sldMk cId="1581745544" sldId="266"/>
-            <ac:picMk id="7" creationId="{712295E4-2C80-2F5B-4B16-6F647ABBABDE}"/>
-          </ac:picMkLst>
-        </pc:picChg>
-      </pc:sldChg>
-      <pc:sldChg chg="add del">
-        <pc:chgData name="Chris Reeves" userId="b49c9824-41eb-460f-b856-160cfa1dc613" providerId="ADAL" clId="{C6DD1DB1-9BFA-4213-8AF4-C87E0CA105E0}" dt="2022-05-02T20:17:49.554" v="3236" actId="2696"/>
-        <pc:sldMkLst>
-          <pc:docMk/>
-          <pc:sldMk cId="954009963" sldId="267"/>
-        </pc:sldMkLst>
-      </pc:sldChg>
-      <pc:sldChg chg="modSp add mod">
-        <pc:chgData name="Chris Reeves" userId="b49c9824-41eb-460f-b856-160cfa1dc613" providerId="ADAL" clId="{C6DD1DB1-9BFA-4213-8AF4-C87E0CA105E0}" dt="2022-05-02T20:06:08.750" v="2339" actId="20577"/>
-        <pc:sldMkLst>
-          <pc:docMk/>
-          <pc:sldMk cId="3454217184" sldId="268"/>
-        </pc:sldMkLst>
-        <pc:spChg chg="mod">
-          <ac:chgData name="Chris Reeves" userId="b49c9824-41eb-460f-b856-160cfa1dc613" providerId="ADAL" clId="{C6DD1DB1-9BFA-4213-8AF4-C87E0CA105E0}" dt="2022-05-02T19:56:33.620" v="1307" actId="20577"/>
-          <ac:spMkLst>
-            <pc:docMk/>
-            <pc:sldMk cId="3454217184" sldId="268"/>
-            <ac:spMk id="2" creationId="{93E913FC-AF7C-4F31-8CCF-0C042D810AED}"/>
-          </ac:spMkLst>
-        </pc:spChg>
-        <pc:spChg chg="mod">
-          <ac:chgData name="Chris Reeves" userId="b49c9824-41eb-460f-b856-160cfa1dc613" providerId="ADAL" clId="{C6DD1DB1-9BFA-4213-8AF4-C87E0CA105E0}" dt="2022-05-02T20:06:08.750" v="2339" actId="20577"/>
-          <ac:spMkLst>
-            <pc:docMk/>
-            <pc:sldMk cId="3454217184" sldId="268"/>
-            <ac:spMk id="3" creationId="{F9E1C5AD-92AF-4AAB-8F58-2133C24B60C4}"/>
-          </ac:spMkLst>
-        </pc:spChg>
-      </pc:sldChg>
-      <pc:sldChg chg="modSp add mod">
-        <pc:chgData name="Chris Reeves" userId="b49c9824-41eb-460f-b856-160cfa1dc613" providerId="ADAL" clId="{C6DD1DB1-9BFA-4213-8AF4-C87E0CA105E0}" dt="2022-05-02T20:17:36.595" v="3235" actId="27636"/>
-        <pc:sldMkLst>
-          <pc:docMk/>
-          <pc:sldMk cId="3284550745" sldId="269"/>
-        </pc:sldMkLst>
-        <pc:spChg chg="mod">
-          <ac:chgData name="Chris Reeves" userId="b49c9824-41eb-460f-b856-160cfa1dc613" providerId="ADAL" clId="{C6DD1DB1-9BFA-4213-8AF4-C87E0CA105E0}" dt="2022-05-02T20:17:36.595" v="3235" actId="27636"/>
-          <ac:spMkLst>
-            <pc:docMk/>
-            <pc:sldMk cId="3284550745" sldId="269"/>
-            <ac:spMk id="3" creationId="{F9E1C5AD-92AF-4AAB-8F58-2133C24B60C4}"/>
-          </ac:spMkLst>
-        </pc:spChg>
-      </pc:sldChg>
-      <pc:sldChg chg="modSp add mod">
-        <pc:chgData name="Chris Reeves" userId="b49c9824-41eb-460f-b856-160cfa1dc613" providerId="ADAL" clId="{C6DD1DB1-9BFA-4213-8AF4-C87E0CA105E0}" dt="2022-05-02T20:34:39.615" v="4098" actId="20577"/>
-        <pc:sldMkLst>
-          <pc:docMk/>
-          <pc:sldMk cId="3290658582" sldId="270"/>
-        </pc:sldMkLst>
-        <pc:spChg chg="mod">
-          <ac:chgData name="Chris Reeves" userId="b49c9824-41eb-460f-b856-160cfa1dc613" providerId="ADAL" clId="{C6DD1DB1-9BFA-4213-8AF4-C87E0CA105E0}" dt="2022-05-02T20:18:14.456" v="3253" actId="20577"/>
-          <ac:spMkLst>
-            <pc:docMk/>
-            <pc:sldMk cId="3290658582" sldId="270"/>
-            <ac:spMk id="2" creationId="{93E913FC-AF7C-4F31-8CCF-0C042D810AED}"/>
-          </ac:spMkLst>
-        </pc:spChg>
-        <pc:spChg chg="mod">
-          <ac:chgData name="Chris Reeves" userId="b49c9824-41eb-460f-b856-160cfa1dc613" providerId="ADAL" clId="{C6DD1DB1-9BFA-4213-8AF4-C87E0CA105E0}" dt="2022-05-02T20:34:39.615" v="4098" actId="20577"/>
-          <ac:spMkLst>
-            <pc:docMk/>
-            <pc:sldMk cId="3290658582" sldId="270"/>
-            <ac:spMk id="3" creationId="{F9E1C5AD-92AF-4AAB-8F58-2133C24B60C4}"/>
-          </ac:spMkLst>
-        </pc:spChg>
-      </pc:sldChg>
-      <pc:sldChg chg="delSp add del mod">
-        <pc:chgData name="Chris Reeves" userId="b49c9824-41eb-460f-b856-160cfa1dc613" providerId="ADAL" clId="{C6DD1DB1-9BFA-4213-8AF4-C87E0CA105E0}" dt="2022-05-02T20:49:05.616" v="4616" actId="2696"/>
-        <pc:sldMkLst>
-          <pc:docMk/>
-          <pc:sldMk cId="2445228223" sldId="271"/>
-        </pc:sldMkLst>
-        <pc:picChg chg="del">
-          <ac:chgData name="Chris Reeves" userId="b49c9824-41eb-460f-b856-160cfa1dc613" providerId="ADAL" clId="{C6DD1DB1-9BFA-4213-8AF4-C87E0CA105E0}" dt="2022-05-02T20:48:58.064" v="4614" actId="478"/>
-          <ac:picMkLst>
-            <pc:docMk/>
-            <pc:sldMk cId="2445228223" sldId="271"/>
-            <ac:picMk id="7" creationId="{712295E4-2C80-2F5B-4B16-6F647ABBABDE}"/>
-          </ac:picMkLst>
-        </pc:picChg>
-      </pc:sldChg>
-      <pc:sldChg chg="addSp delSp modSp new mod">
-        <pc:chgData name="Chris Reeves" userId="b49c9824-41eb-460f-b856-160cfa1dc613" providerId="ADAL" clId="{C6DD1DB1-9BFA-4213-8AF4-C87E0CA105E0}" dt="2022-05-02T20:54:42.510" v="4964" actId="1076"/>
-        <pc:sldMkLst>
-          <pc:docMk/>
-          <pc:sldMk cId="4262189219" sldId="272"/>
-        </pc:sldMkLst>
-        <pc:spChg chg="mod">
-          <ac:chgData name="Chris Reeves" userId="b49c9824-41eb-460f-b856-160cfa1dc613" providerId="ADAL" clId="{C6DD1DB1-9BFA-4213-8AF4-C87E0CA105E0}" dt="2022-05-02T20:49:13.279" v="4623" actId="20577"/>
-          <ac:spMkLst>
-            <pc:docMk/>
-            <pc:sldMk cId="4262189219" sldId="272"/>
-            <ac:spMk id="2" creationId="{87AE82EE-4424-0197-AD6A-625D41474F3F}"/>
-          </ac:spMkLst>
-        </pc:spChg>
-        <pc:spChg chg="add del mod">
-          <ac:chgData name="Chris Reeves" userId="b49c9824-41eb-460f-b856-160cfa1dc613" providerId="ADAL" clId="{C6DD1DB1-9BFA-4213-8AF4-C87E0CA105E0}" dt="2022-05-02T20:54:26.655" v="4963" actId="20577"/>
-          <ac:spMkLst>
-            <pc:docMk/>
-            <pc:sldMk cId="4262189219" sldId="272"/>
-            <ac:spMk id="3" creationId="{33014443-6033-F7C3-A071-D69CA0D5FDE5}"/>
-          </ac:spMkLst>
-        </pc:spChg>
-        <pc:picChg chg="add del mod">
-          <ac:chgData name="Chris Reeves" userId="b49c9824-41eb-460f-b856-160cfa1dc613" providerId="ADAL" clId="{C6DD1DB1-9BFA-4213-8AF4-C87E0CA105E0}" dt="2022-05-02T20:50:13.755" v="4628"/>
-          <ac:picMkLst>
-            <pc:docMk/>
-            <pc:sldMk cId="4262189219" sldId="272"/>
-            <ac:picMk id="5" creationId="{9BCA4540-9AF9-7EE9-A801-B05BD2815610}"/>
-          </ac:picMkLst>
-        </pc:picChg>
-        <pc:picChg chg="add del mod">
-          <ac:chgData name="Chris Reeves" userId="b49c9824-41eb-460f-b856-160cfa1dc613" providerId="ADAL" clId="{C6DD1DB1-9BFA-4213-8AF4-C87E0CA105E0}" dt="2022-05-02T20:51:47.730" v="4669" actId="478"/>
-          <ac:picMkLst>
-            <pc:docMk/>
-            <pc:sldMk cId="4262189219" sldId="272"/>
-            <ac:picMk id="7" creationId="{1F71A148-7D71-8787-DC35-C8ED99D7D576}"/>
-          </ac:picMkLst>
-        </pc:picChg>
-        <pc:picChg chg="add mod">
-          <ac:chgData name="Chris Reeves" userId="b49c9824-41eb-460f-b856-160cfa1dc613" providerId="ADAL" clId="{C6DD1DB1-9BFA-4213-8AF4-C87E0CA105E0}" dt="2022-05-02T20:54:42.510" v="4964" actId="1076"/>
-          <ac:picMkLst>
-            <pc:docMk/>
-            <pc:sldMk cId="4262189219" sldId="272"/>
-            <ac:picMk id="9" creationId="{21BD06D9-97EF-FBA7-0895-687CB72EBD7C}"/>
           </ac:picMkLst>
         </pc:picChg>
       </pc:sldChg>
@@ -702,515 +1212,6 @@
       </pc:sldChg>
     </pc:docChg>
   </pc:docChgLst>
-  <pc:docChgLst>
-    <pc:chgData name="Reeves, Christopher" userId="S::reevesc7@msu.edu::b49c9824-41eb-460f-b856-160cfa1dc613" providerId="AD" clId="Web-{613CA3A6-25C9-40BD-BDBF-CA6F1D88A224}"/>
-    <pc:docChg chg="modSld">
-      <pc:chgData name="Reeves, Christopher" userId="S::reevesc7@msu.edu::b49c9824-41eb-460f-b856-160cfa1dc613" providerId="AD" clId="Web-{613CA3A6-25C9-40BD-BDBF-CA6F1D88A224}" dt="2022-01-29T15:26:23.972" v="8" actId="20577"/>
-      <pc:docMkLst>
-        <pc:docMk/>
-      </pc:docMkLst>
-      <pc:sldChg chg="modSp">
-        <pc:chgData name="Reeves, Christopher" userId="S::reevesc7@msu.edu::b49c9824-41eb-460f-b856-160cfa1dc613" providerId="AD" clId="Web-{613CA3A6-25C9-40BD-BDBF-CA6F1D88A224}" dt="2022-01-29T15:16:54.112" v="4" actId="20577"/>
-        <pc:sldMkLst>
-          <pc:docMk/>
-          <pc:sldMk cId="584315923" sldId="265"/>
-        </pc:sldMkLst>
-        <pc:spChg chg="mod">
-          <ac:chgData name="Reeves, Christopher" userId="S::reevesc7@msu.edu::b49c9824-41eb-460f-b856-160cfa1dc613" providerId="AD" clId="Web-{613CA3A6-25C9-40BD-BDBF-CA6F1D88A224}" dt="2022-01-29T15:16:54.112" v="4" actId="20577"/>
-          <ac:spMkLst>
-            <pc:docMk/>
-            <pc:sldMk cId="584315923" sldId="265"/>
-            <ac:spMk id="5" creationId="{808CA775-E27B-4CDE-951E-A4485604F2D7}"/>
-          </ac:spMkLst>
-        </pc:spChg>
-      </pc:sldChg>
-      <pc:sldChg chg="modSp">
-        <pc:chgData name="Reeves, Christopher" userId="S::reevesc7@msu.edu::b49c9824-41eb-460f-b856-160cfa1dc613" providerId="AD" clId="Web-{613CA3A6-25C9-40BD-BDBF-CA6F1D88A224}" dt="2022-01-29T15:26:23.972" v="8" actId="20577"/>
-        <pc:sldMkLst>
-          <pc:docMk/>
-          <pc:sldMk cId="1581745544" sldId="266"/>
-        </pc:sldMkLst>
-        <pc:spChg chg="mod">
-          <ac:chgData name="Reeves, Christopher" userId="S::reevesc7@msu.edu::b49c9824-41eb-460f-b856-160cfa1dc613" providerId="AD" clId="Web-{613CA3A6-25C9-40BD-BDBF-CA6F1D88A224}" dt="2022-01-29T15:26:23.972" v="8" actId="20577"/>
-          <ac:spMkLst>
-            <pc:docMk/>
-            <pc:sldMk cId="1581745544" sldId="266"/>
-            <ac:spMk id="12" creationId="{A6BA5703-3AD1-4485-8F46-4028510796EF}"/>
-          </ac:spMkLst>
-        </pc:spChg>
-      </pc:sldChg>
-    </pc:docChg>
-  </pc:docChgLst>
-  <pc:docChgLst>
-    <pc:chgData name="Olekanma, Doris" userId="S::olekanm1@msu.edu::812322f7-7fc0-49f2-9291-a96ee5858438" providerId="AD" clId="Web-{131E4309-D9F6-4934-AE7D-8A87FCABCA82}"/>
-    <pc:docChg chg="modSld">
-      <pc:chgData name="Olekanma, Doris" userId="S::olekanm1@msu.edu::812322f7-7fc0-49f2-9291-a96ee5858438" providerId="AD" clId="Web-{131E4309-D9F6-4934-AE7D-8A87FCABCA82}" dt="2022-02-01T16:32:12.749" v="13" actId="20577"/>
-      <pc:docMkLst>
-        <pc:docMk/>
-      </pc:docMkLst>
-      <pc:sldChg chg="modSp">
-        <pc:chgData name="Olekanma, Doris" userId="S::olekanm1@msu.edu::812322f7-7fc0-49f2-9291-a96ee5858438" providerId="AD" clId="Web-{131E4309-D9F6-4934-AE7D-8A87FCABCA82}" dt="2022-02-01T16:32:12.749" v="13" actId="20577"/>
-        <pc:sldMkLst>
-          <pc:docMk/>
-          <pc:sldMk cId="4198178589" sldId="257"/>
-        </pc:sldMkLst>
-        <pc:spChg chg="mod">
-          <ac:chgData name="Olekanma, Doris" userId="S::olekanm1@msu.edu::812322f7-7fc0-49f2-9291-a96ee5858438" providerId="AD" clId="Web-{131E4309-D9F6-4934-AE7D-8A87FCABCA82}" dt="2022-02-01T16:32:12.749" v="13" actId="20577"/>
-          <ac:spMkLst>
-            <pc:docMk/>
-            <pc:sldMk cId="4198178589" sldId="257"/>
-            <ac:spMk id="3" creationId="{F9E1C5AD-92AF-4AAB-8F58-2133C24B60C4}"/>
-          </ac:spMkLst>
-        </pc:spChg>
-      </pc:sldChg>
-    </pc:docChg>
-  </pc:docChgLst>
-  <pc:docChgLst>
-    <pc:chgData name="Valade, Christian" userId="b7f8afa3-ecd1-415c-a7d8-3911c7f332e1" providerId="ADAL" clId="{63F6B6D0-799B-4CFA-B156-7C0DB90DDA3F}"/>
-    <pc:docChg chg="modSld">
-      <pc:chgData name="Valade, Christian" userId="b7f8afa3-ecd1-415c-a7d8-3911c7f332e1" providerId="ADAL" clId="{63F6B6D0-799B-4CFA-B156-7C0DB90DDA3F}" dt="2022-07-22T13:50:30.507" v="1" actId="20577"/>
-      <pc:docMkLst>
-        <pc:docMk/>
-      </pc:docMkLst>
-      <pc:sldChg chg="modSp mod">
-        <pc:chgData name="Valade, Christian" userId="b7f8afa3-ecd1-415c-a7d8-3911c7f332e1" providerId="ADAL" clId="{63F6B6D0-799B-4CFA-B156-7C0DB90DDA3F}" dt="2022-07-22T13:50:30.507" v="1" actId="20577"/>
-        <pc:sldMkLst>
-          <pc:docMk/>
-          <pc:sldMk cId="3290658582" sldId="270"/>
-        </pc:sldMkLst>
-        <pc:spChg chg="mod">
-          <ac:chgData name="Valade, Christian" userId="b7f8afa3-ecd1-415c-a7d8-3911c7f332e1" providerId="ADAL" clId="{63F6B6D0-799B-4CFA-B156-7C0DB90DDA3F}" dt="2022-07-22T13:50:30.507" v="1" actId="20577"/>
-          <ac:spMkLst>
-            <pc:docMk/>
-            <pc:sldMk cId="3290658582" sldId="270"/>
-            <ac:spMk id="3" creationId="{F9E1C5AD-92AF-4AAB-8F58-2133C24B60C4}"/>
-          </ac:spMkLst>
-        </pc:spChg>
-      </pc:sldChg>
-    </pc:docChg>
-  </pc:docChgLst>
-  <pc:docChgLst>
-    <pc:chgData name="Chris Reeves" userId="b49c9824-41eb-460f-b856-160cfa1dc613" providerId="ADAL" clId="{320B3900-2BFD-4B9F-8A76-B8970B1B63EE}"/>
-    <pc:docChg chg="undo redo custSel addSld delSld modSld">
-      <pc:chgData name="Chris Reeves" userId="b49c9824-41eb-460f-b856-160cfa1dc613" providerId="ADAL" clId="{320B3900-2BFD-4B9F-8A76-B8970B1B63EE}" dt="2022-01-28T19:41:29.817" v="7149" actId="1076"/>
-      <pc:docMkLst>
-        <pc:docMk/>
-      </pc:docMkLst>
-      <pc:sldChg chg="del">
-        <pc:chgData name="Chris Reeves" userId="b49c9824-41eb-460f-b856-160cfa1dc613" providerId="ADAL" clId="{320B3900-2BFD-4B9F-8A76-B8970B1B63EE}" dt="2022-01-25T18:34:21.114" v="1" actId="47"/>
-        <pc:sldMkLst>
-          <pc:docMk/>
-          <pc:sldMk cId="109857222" sldId="256"/>
-        </pc:sldMkLst>
-      </pc:sldChg>
-      <pc:sldChg chg="modSp new mod">
-        <pc:chgData name="Chris Reeves" userId="b49c9824-41eb-460f-b856-160cfa1dc613" providerId="ADAL" clId="{320B3900-2BFD-4B9F-8A76-B8970B1B63EE}" dt="2022-01-28T03:41:08.244" v="6437" actId="313"/>
-        <pc:sldMkLst>
-          <pc:docMk/>
-          <pc:sldMk cId="4198178589" sldId="257"/>
-        </pc:sldMkLst>
-        <pc:spChg chg="mod">
-          <ac:chgData name="Chris Reeves" userId="b49c9824-41eb-460f-b856-160cfa1dc613" providerId="ADAL" clId="{320B3900-2BFD-4B9F-8A76-B8970B1B63EE}" dt="2022-01-27T17:49:25.485" v="2756" actId="1035"/>
-          <ac:spMkLst>
-            <pc:docMk/>
-            <pc:sldMk cId="4198178589" sldId="257"/>
-            <ac:spMk id="2" creationId="{93E913FC-AF7C-4F31-8CCF-0C042D810AED}"/>
-          </ac:spMkLst>
-        </pc:spChg>
-        <pc:spChg chg="mod">
-          <ac:chgData name="Chris Reeves" userId="b49c9824-41eb-460f-b856-160cfa1dc613" providerId="ADAL" clId="{320B3900-2BFD-4B9F-8A76-B8970B1B63EE}" dt="2022-01-28T03:41:08.244" v="6437" actId="313"/>
-          <ac:spMkLst>
-            <pc:docMk/>
-            <pc:sldMk cId="4198178589" sldId="257"/>
-            <ac:spMk id="3" creationId="{F9E1C5AD-92AF-4AAB-8F58-2133C24B60C4}"/>
-          </ac:spMkLst>
-        </pc:spChg>
-      </pc:sldChg>
-      <pc:sldChg chg="modSp new del mod">
-        <pc:chgData name="Chris Reeves" userId="b49c9824-41eb-460f-b856-160cfa1dc613" providerId="ADAL" clId="{320B3900-2BFD-4B9F-8A76-B8970B1B63EE}" dt="2022-01-27T17:47:20.640" v="2666" actId="2696"/>
-        <pc:sldMkLst>
-          <pc:docMk/>
-          <pc:sldMk cId="3476381566" sldId="258"/>
-        </pc:sldMkLst>
-        <pc:spChg chg="mod">
-          <ac:chgData name="Chris Reeves" userId="b49c9824-41eb-460f-b856-160cfa1dc613" providerId="ADAL" clId="{320B3900-2BFD-4B9F-8A76-B8970B1B63EE}" dt="2022-01-25T18:40:56.516" v="625" actId="20577"/>
-          <ac:spMkLst>
-            <pc:docMk/>
-            <pc:sldMk cId="3476381566" sldId="258"/>
-            <ac:spMk id="2" creationId="{F98A5C0F-FDB0-4A82-B7AC-EA70551A1E09}"/>
-          </ac:spMkLst>
-        </pc:spChg>
-        <pc:spChg chg="mod">
-          <ac:chgData name="Chris Reeves" userId="b49c9824-41eb-460f-b856-160cfa1dc613" providerId="ADAL" clId="{320B3900-2BFD-4B9F-8A76-B8970B1B63EE}" dt="2022-01-25T18:40:39.994" v="616" actId="20577"/>
-          <ac:spMkLst>
-            <pc:docMk/>
-            <pc:sldMk cId="3476381566" sldId="258"/>
-            <ac:spMk id="3" creationId="{770D93DF-B209-4A36-A0A6-215D08A961BB}"/>
-          </ac:spMkLst>
-        </pc:spChg>
-      </pc:sldChg>
-      <pc:sldChg chg="modSp new del mod">
-        <pc:chgData name="Chris Reeves" userId="b49c9824-41eb-460f-b856-160cfa1dc613" providerId="ADAL" clId="{320B3900-2BFD-4B9F-8A76-B8970B1B63EE}" dt="2022-01-27T17:47:39.953" v="2671" actId="2696"/>
-        <pc:sldMkLst>
-          <pc:docMk/>
-          <pc:sldMk cId="2497134089" sldId="259"/>
-        </pc:sldMkLst>
-        <pc:spChg chg="mod">
-          <ac:chgData name="Chris Reeves" userId="b49c9824-41eb-460f-b856-160cfa1dc613" providerId="ADAL" clId="{320B3900-2BFD-4B9F-8A76-B8970B1B63EE}" dt="2022-01-25T18:53:36.495" v="1305" actId="20577"/>
-          <ac:spMkLst>
-            <pc:docMk/>
-            <pc:sldMk cId="2497134089" sldId="259"/>
-            <ac:spMk id="2" creationId="{223F3D9A-1622-4713-A6E1-932B3551BC07}"/>
-          </ac:spMkLst>
-        </pc:spChg>
-        <pc:spChg chg="mod">
-          <ac:chgData name="Chris Reeves" userId="b49c9824-41eb-460f-b856-160cfa1dc613" providerId="ADAL" clId="{320B3900-2BFD-4B9F-8A76-B8970B1B63EE}" dt="2022-01-27T17:46:05.976" v="2655" actId="313"/>
-          <ac:spMkLst>
-            <pc:docMk/>
-            <pc:sldMk cId="2497134089" sldId="259"/>
-            <ac:spMk id="3" creationId="{B0205E3D-01A4-4841-8C1E-21EBF83CD159}"/>
-          </ac:spMkLst>
-        </pc:spChg>
-      </pc:sldChg>
-      <pc:sldChg chg="modSp new del mod">
-        <pc:chgData name="Chris Reeves" userId="b49c9824-41eb-460f-b856-160cfa1dc613" providerId="ADAL" clId="{320B3900-2BFD-4B9F-8A76-B8970B1B63EE}" dt="2022-01-27T17:46:52.643" v="2662" actId="2696"/>
-        <pc:sldMkLst>
-          <pc:docMk/>
-          <pc:sldMk cId="1177361074" sldId="260"/>
-        </pc:sldMkLst>
-        <pc:spChg chg="mod">
-          <ac:chgData name="Chris Reeves" userId="b49c9824-41eb-460f-b856-160cfa1dc613" providerId="ADAL" clId="{320B3900-2BFD-4B9F-8A76-B8970B1B63EE}" dt="2022-01-26T15:36:26.573" v="1983" actId="20577"/>
-          <ac:spMkLst>
-            <pc:docMk/>
-            <pc:sldMk cId="1177361074" sldId="260"/>
-            <ac:spMk id="2" creationId="{77805854-83FF-465C-8E12-33B89C6960E5}"/>
-          </ac:spMkLst>
-        </pc:spChg>
-        <pc:spChg chg="mod">
-          <ac:chgData name="Chris Reeves" userId="b49c9824-41eb-460f-b856-160cfa1dc613" providerId="ADAL" clId="{320B3900-2BFD-4B9F-8A76-B8970B1B63EE}" dt="2022-01-26T15:38:10.837" v="2160" actId="20577"/>
-          <ac:spMkLst>
-            <pc:docMk/>
-            <pc:sldMk cId="1177361074" sldId="260"/>
-            <ac:spMk id="3" creationId="{CEB5B244-EAF8-47A4-A949-9A342DED1604}"/>
-          </ac:spMkLst>
-        </pc:spChg>
-      </pc:sldChg>
-      <pc:sldChg chg="modSp add mod">
-        <pc:chgData name="Chris Reeves" userId="b49c9824-41eb-460f-b856-160cfa1dc613" providerId="ADAL" clId="{320B3900-2BFD-4B9F-8A76-B8970B1B63EE}" dt="2022-01-27T17:49:20.195" v="2746" actId="1035"/>
-        <pc:sldMkLst>
-          <pc:docMk/>
-          <pc:sldMk cId="3683627749" sldId="261"/>
-        </pc:sldMkLst>
-        <pc:spChg chg="mod">
-          <ac:chgData name="Chris Reeves" userId="b49c9824-41eb-460f-b856-160cfa1dc613" providerId="ADAL" clId="{320B3900-2BFD-4B9F-8A76-B8970B1B63EE}" dt="2022-01-27T17:49:20.195" v="2746" actId="1035"/>
-          <ac:spMkLst>
-            <pc:docMk/>
-            <pc:sldMk cId="3683627749" sldId="261"/>
-            <ac:spMk id="2" creationId="{93E913FC-AF7C-4F31-8CCF-0C042D810AED}"/>
-          </ac:spMkLst>
-        </pc:spChg>
-        <pc:spChg chg="mod">
-          <ac:chgData name="Chris Reeves" userId="b49c9824-41eb-460f-b856-160cfa1dc613" providerId="ADAL" clId="{320B3900-2BFD-4B9F-8A76-B8970B1B63EE}" dt="2022-01-27T17:46:43.408" v="2661" actId="12"/>
-          <ac:spMkLst>
-            <pc:docMk/>
-            <pc:sldMk cId="3683627749" sldId="261"/>
-            <ac:spMk id="3" creationId="{F9E1C5AD-92AF-4AAB-8F58-2133C24B60C4}"/>
-          </ac:spMkLst>
-        </pc:spChg>
-      </pc:sldChg>
-      <pc:sldChg chg="modSp add mod">
-        <pc:chgData name="Chris Reeves" userId="b49c9824-41eb-460f-b856-160cfa1dc613" providerId="ADAL" clId="{320B3900-2BFD-4B9F-8A76-B8970B1B63EE}" dt="2022-01-27T22:33:20.434" v="6185" actId="20577"/>
-        <pc:sldMkLst>
-          <pc:docMk/>
-          <pc:sldMk cId="2684212234" sldId="262"/>
-        </pc:sldMkLst>
-        <pc:spChg chg="mod">
-          <ac:chgData name="Chris Reeves" userId="b49c9824-41eb-460f-b856-160cfa1dc613" providerId="ADAL" clId="{320B3900-2BFD-4B9F-8A76-B8970B1B63EE}" dt="2022-01-27T17:49:12.295" v="2736" actId="1035"/>
-          <ac:spMkLst>
-            <pc:docMk/>
-            <pc:sldMk cId="2684212234" sldId="262"/>
-            <ac:spMk id="2" creationId="{93E913FC-AF7C-4F31-8CCF-0C042D810AED}"/>
-          </ac:spMkLst>
-        </pc:spChg>
-        <pc:spChg chg="mod">
-          <ac:chgData name="Chris Reeves" userId="b49c9824-41eb-460f-b856-160cfa1dc613" providerId="ADAL" clId="{320B3900-2BFD-4B9F-8A76-B8970B1B63EE}" dt="2022-01-27T22:33:20.434" v="6185" actId="20577"/>
-          <ac:spMkLst>
-            <pc:docMk/>
-            <pc:sldMk cId="2684212234" sldId="262"/>
-            <ac:spMk id="3" creationId="{F9E1C5AD-92AF-4AAB-8F58-2133C24B60C4}"/>
-          </ac:spMkLst>
-        </pc:spChg>
-      </pc:sldChg>
-      <pc:sldChg chg="modSp add mod">
-        <pc:chgData name="Chris Reeves" userId="b49c9824-41eb-460f-b856-160cfa1dc613" providerId="ADAL" clId="{320B3900-2BFD-4B9F-8A76-B8970B1B63EE}" dt="2022-01-27T22:20:20.634" v="6024" actId="114"/>
-        <pc:sldMkLst>
-          <pc:docMk/>
-          <pc:sldMk cId="2523626175" sldId="263"/>
-        </pc:sldMkLst>
-        <pc:spChg chg="mod">
-          <ac:chgData name="Chris Reeves" userId="b49c9824-41eb-460f-b856-160cfa1dc613" providerId="ADAL" clId="{320B3900-2BFD-4B9F-8A76-B8970B1B63EE}" dt="2022-01-27T17:49:07.857" v="2726" actId="1035"/>
-          <ac:spMkLst>
-            <pc:docMk/>
-            <pc:sldMk cId="2523626175" sldId="263"/>
-            <ac:spMk id="2" creationId="{93E913FC-AF7C-4F31-8CCF-0C042D810AED}"/>
-          </ac:spMkLst>
-        </pc:spChg>
-        <pc:spChg chg="mod">
-          <ac:chgData name="Chris Reeves" userId="b49c9824-41eb-460f-b856-160cfa1dc613" providerId="ADAL" clId="{320B3900-2BFD-4B9F-8A76-B8970B1B63EE}" dt="2022-01-27T22:20:20.634" v="6024" actId="114"/>
-          <ac:spMkLst>
-            <pc:docMk/>
-            <pc:sldMk cId="2523626175" sldId="263"/>
-            <ac:spMk id="3" creationId="{F9E1C5AD-92AF-4AAB-8F58-2133C24B60C4}"/>
-          </ac:spMkLst>
-        </pc:spChg>
-      </pc:sldChg>
-      <pc:sldChg chg="modSp add mod">
-        <pc:chgData name="Chris Reeves" userId="b49c9824-41eb-460f-b856-160cfa1dc613" providerId="ADAL" clId="{320B3900-2BFD-4B9F-8A76-B8970B1B63EE}" dt="2022-01-28T19:13:48.743" v="6547" actId="20577"/>
-        <pc:sldMkLst>
-          <pc:docMk/>
-          <pc:sldMk cId="3705567830" sldId="264"/>
-        </pc:sldMkLst>
-        <pc:spChg chg="mod">
-          <ac:chgData name="Chris Reeves" userId="b49c9824-41eb-460f-b856-160cfa1dc613" providerId="ADAL" clId="{320B3900-2BFD-4B9F-8A76-B8970B1B63EE}" dt="2022-01-28T19:12:34.891" v="6466" actId="20577"/>
-          <ac:spMkLst>
-            <pc:docMk/>
-            <pc:sldMk cId="3705567830" sldId="264"/>
-            <ac:spMk id="2" creationId="{93E913FC-AF7C-4F31-8CCF-0C042D810AED}"/>
-          </ac:spMkLst>
-        </pc:spChg>
-        <pc:spChg chg="mod">
-          <ac:chgData name="Chris Reeves" userId="b49c9824-41eb-460f-b856-160cfa1dc613" providerId="ADAL" clId="{320B3900-2BFD-4B9F-8A76-B8970B1B63EE}" dt="2022-01-28T19:13:48.743" v="6547" actId="20577"/>
-          <ac:spMkLst>
-            <pc:docMk/>
-            <pc:sldMk cId="3705567830" sldId="264"/>
-            <ac:spMk id="3" creationId="{F9E1C5AD-92AF-4AAB-8F58-2133C24B60C4}"/>
-          </ac:spMkLst>
-        </pc:spChg>
-      </pc:sldChg>
-      <pc:sldChg chg="addSp delSp modSp add mod">
-        <pc:chgData name="Chris Reeves" userId="b49c9824-41eb-460f-b856-160cfa1dc613" providerId="ADAL" clId="{320B3900-2BFD-4B9F-8A76-B8970B1B63EE}" dt="2022-01-28T00:52:11.685" v="6406" actId="20577"/>
-        <pc:sldMkLst>
-          <pc:docMk/>
-          <pc:sldMk cId="584315923" sldId="265"/>
-        </pc:sldMkLst>
-        <pc:spChg chg="mod">
-          <ac:chgData name="Chris Reeves" userId="b49c9824-41eb-460f-b856-160cfa1dc613" providerId="ADAL" clId="{320B3900-2BFD-4B9F-8A76-B8970B1B63EE}" dt="2022-01-27T21:55:58.938" v="5383" actId="1035"/>
-          <ac:spMkLst>
-            <pc:docMk/>
-            <pc:sldMk cId="584315923" sldId="265"/>
-            <ac:spMk id="2" creationId="{93E913FC-AF7C-4F31-8CCF-0C042D810AED}"/>
-          </ac:spMkLst>
-        </pc:spChg>
-        <pc:spChg chg="del mod">
-          <ac:chgData name="Chris Reeves" userId="b49c9824-41eb-460f-b856-160cfa1dc613" providerId="ADAL" clId="{320B3900-2BFD-4B9F-8A76-B8970B1B63EE}" dt="2022-01-27T18:34:39.010" v="4239" actId="478"/>
-          <ac:spMkLst>
-            <pc:docMk/>
-            <pc:sldMk cId="584315923" sldId="265"/>
-            <ac:spMk id="3" creationId="{F9E1C5AD-92AF-4AAB-8F58-2133C24B60C4}"/>
-          </ac:spMkLst>
-        </pc:spChg>
-        <pc:spChg chg="add mod">
-          <ac:chgData name="Chris Reeves" userId="b49c9824-41eb-460f-b856-160cfa1dc613" providerId="ADAL" clId="{320B3900-2BFD-4B9F-8A76-B8970B1B63EE}" dt="2022-01-28T00:46:42.270" v="6238" actId="20577"/>
-          <ac:spMkLst>
-            <pc:docMk/>
-            <pc:sldMk cId="584315923" sldId="265"/>
-            <ac:spMk id="5" creationId="{808CA775-E27B-4CDE-951E-A4485604F2D7}"/>
-          </ac:spMkLst>
-        </pc:spChg>
-        <pc:spChg chg="add del mod">
-          <ac:chgData name="Chris Reeves" userId="b49c9824-41eb-460f-b856-160cfa1dc613" providerId="ADAL" clId="{320B3900-2BFD-4B9F-8A76-B8970B1B63EE}" dt="2022-01-27T18:11:50.389" v="3721"/>
-          <ac:spMkLst>
-            <pc:docMk/>
-            <pc:sldMk cId="584315923" sldId="265"/>
-            <ac:spMk id="6" creationId="{A6FA66A9-36FF-402E-A676-1C4D1FCB77F0}"/>
-          </ac:spMkLst>
-        </pc:spChg>
-        <pc:spChg chg="add del mod">
-          <ac:chgData name="Chris Reeves" userId="b49c9824-41eb-460f-b856-160cfa1dc613" providerId="ADAL" clId="{320B3900-2BFD-4B9F-8A76-B8970B1B63EE}" dt="2022-01-27T18:34:15.095" v="4236" actId="478"/>
-          <ac:spMkLst>
-            <pc:docMk/>
-            <pc:sldMk cId="584315923" sldId="265"/>
-            <ac:spMk id="7" creationId="{0C18C12D-2916-4360-9C8B-E894248AA73C}"/>
-          </ac:spMkLst>
-        </pc:spChg>
-        <pc:spChg chg="add mod">
-          <ac:chgData name="Chris Reeves" userId="b49c9824-41eb-460f-b856-160cfa1dc613" providerId="ADAL" clId="{320B3900-2BFD-4B9F-8A76-B8970B1B63EE}" dt="2022-01-28T00:52:11.685" v="6406" actId="20577"/>
-          <ac:spMkLst>
-            <pc:docMk/>
-            <pc:sldMk cId="584315923" sldId="265"/>
-            <ac:spMk id="8" creationId="{A5F0A78C-17B3-423C-96A7-FE0D21A54967}"/>
-          </ac:spMkLst>
-        </pc:spChg>
-        <pc:spChg chg="add del mod">
-          <ac:chgData name="Chris Reeves" userId="b49c9824-41eb-460f-b856-160cfa1dc613" providerId="ADAL" clId="{320B3900-2BFD-4B9F-8A76-B8970B1B63EE}" dt="2022-01-27T21:24:27.856" v="4875" actId="478"/>
-          <ac:spMkLst>
-            <pc:docMk/>
-            <pc:sldMk cId="584315923" sldId="265"/>
-            <ac:spMk id="14" creationId="{1D755BF6-8F09-481C-8A30-2D2FB915CEF2}"/>
-          </ac:spMkLst>
-        </pc:spChg>
-        <pc:spChg chg="add del mod">
-          <ac:chgData name="Chris Reeves" userId="b49c9824-41eb-460f-b856-160cfa1dc613" providerId="ADAL" clId="{320B3900-2BFD-4B9F-8A76-B8970B1B63EE}" dt="2022-01-27T21:26:53.088" v="4883" actId="478"/>
-          <ac:spMkLst>
-            <pc:docMk/>
-            <pc:sldMk cId="584315923" sldId="265"/>
-            <ac:spMk id="15" creationId="{9185A74D-79FD-44CB-9981-8DDF8E129EA3}"/>
-          </ac:spMkLst>
-        </pc:spChg>
-        <pc:spChg chg="add del mod">
-          <ac:chgData name="Chris Reeves" userId="b49c9824-41eb-460f-b856-160cfa1dc613" providerId="ADAL" clId="{320B3900-2BFD-4B9F-8A76-B8970B1B63EE}" dt="2022-01-27T21:34:39.305" v="4904" actId="478"/>
-          <ac:spMkLst>
-            <pc:docMk/>
-            <pc:sldMk cId="584315923" sldId="265"/>
-            <ac:spMk id="16" creationId="{79069305-3D74-45D7-9FB7-95E57B12FAF3}"/>
-          </ac:spMkLst>
-        </pc:spChg>
-        <pc:spChg chg="add del mod">
-          <ac:chgData name="Chris Reeves" userId="b49c9824-41eb-460f-b856-160cfa1dc613" providerId="ADAL" clId="{320B3900-2BFD-4B9F-8A76-B8970B1B63EE}" dt="2022-01-27T21:43:26.781" v="5014" actId="478"/>
-          <ac:spMkLst>
-            <pc:docMk/>
-            <pc:sldMk cId="584315923" sldId="265"/>
-            <ac:spMk id="17" creationId="{DB22A9F8-3353-4855-A0B8-4F184FCFC2A2}"/>
-          </ac:spMkLst>
-        </pc:spChg>
-        <pc:spChg chg="add mod">
-          <ac:chgData name="Chris Reeves" userId="b49c9824-41eb-460f-b856-160cfa1dc613" providerId="ADAL" clId="{320B3900-2BFD-4B9F-8A76-B8970B1B63EE}" dt="2022-01-28T00:49:23.962" v="6278" actId="207"/>
-          <ac:spMkLst>
-            <pc:docMk/>
-            <pc:sldMk cId="584315923" sldId="265"/>
-            <ac:spMk id="22" creationId="{98A17986-0DD4-4E60-A525-87DBD6A69BB0}"/>
-          </ac:spMkLst>
-        </pc:spChg>
-        <pc:spChg chg="add mod">
-          <ac:chgData name="Chris Reeves" userId="b49c9824-41eb-460f-b856-160cfa1dc613" providerId="ADAL" clId="{320B3900-2BFD-4B9F-8A76-B8970B1B63EE}" dt="2022-01-28T00:50:10.262" v="6332" actId="20577"/>
-          <ac:spMkLst>
-            <pc:docMk/>
-            <pc:sldMk cId="584315923" sldId="265"/>
-            <ac:spMk id="23" creationId="{FFAE77A1-D972-46FF-B0CD-56FFFA3EE24F}"/>
-          </ac:spMkLst>
-        </pc:spChg>
-        <pc:cxnChg chg="add del mod">
-          <ac:chgData name="Chris Reeves" userId="b49c9824-41eb-460f-b856-160cfa1dc613" providerId="ADAL" clId="{320B3900-2BFD-4B9F-8A76-B8970B1B63EE}" dt="2022-01-27T21:22:57.522" v="4871" actId="478"/>
-          <ac:cxnSpMkLst>
-            <pc:docMk/>
-            <pc:sldMk cId="584315923" sldId="265"/>
-            <ac:cxnSpMk id="10" creationId="{76606C2A-536D-4E29-870A-638E922ABED0}"/>
-          </ac:cxnSpMkLst>
-        </pc:cxnChg>
-        <pc:cxnChg chg="add del mod">
-          <ac:chgData name="Chris Reeves" userId="b49c9824-41eb-460f-b856-160cfa1dc613" providerId="ADAL" clId="{320B3900-2BFD-4B9F-8A76-B8970B1B63EE}" dt="2022-01-27T21:36:47.640" v="4922" actId="478"/>
-          <ac:cxnSpMkLst>
-            <pc:docMk/>
-            <pc:sldMk cId="584315923" sldId="265"/>
-            <ac:cxnSpMk id="19" creationId="{B2A8500B-4B57-41EE-AB31-1E0B0E19A07E}"/>
-          </ac:cxnSpMkLst>
-        </pc:cxnChg>
-      </pc:sldChg>
-      <pc:sldChg chg="addSp delSp modSp add mod">
-        <pc:chgData name="Chris Reeves" userId="b49c9824-41eb-460f-b856-160cfa1dc613" providerId="ADAL" clId="{320B3900-2BFD-4B9F-8A76-B8970B1B63EE}" dt="2022-01-28T19:41:29.817" v="7149" actId="1076"/>
-        <pc:sldMkLst>
-          <pc:docMk/>
-          <pc:sldMk cId="1581745544" sldId="266"/>
-        </pc:sldMkLst>
-        <pc:spChg chg="mod">
-          <ac:chgData name="Chris Reeves" userId="b49c9824-41eb-460f-b856-160cfa1dc613" providerId="ADAL" clId="{320B3900-2BFD-4B9F-8A76-B8970B1B63EE}" dt="2022-01-28T19:11:33.858" v="6449" actId="20577"/>
-          <ac:spMkLst>
-            <pc:docMk/>
-            <pc:sldMk cId="1581745544" sldId="266"/>
-            <ac:spMk id="2" creationId="{93E913FC-AF7C-4F31-8CCF-0C042D810AED}"/>
-          </ac:spMkLst>
-        </pc:spChg>
-        <pc:spChg chg="mod">
-          <ac:chgData name="Chris Reeves" userId="b49c9824-41eb-460f-b856-160cfa1dc613" providerId="ADAL" clId="{320B3900-2BFD-4B9F-8A76-B8970B1B63EE}" dt="2022-01-28T19:19:02.943" v="6711" actId="20577"/>
-          <ac:spMkLst>
-            <pc:docMk/>
-            <pc:sldMk cId="1581745544" sldId="266"/>
-            <ac:spMk id="3" creationId="{F9E1C5AD-92AF-4AAB-8F58-2133C24B60C4}"/>
-          </ac:spMkLst>
-        </pc:spChg>
-        <pc:spChg chg="add mod">
-          <ac:chgData name="Chris Reeves" userId="b49c9824-41eb-460f-b856-160cfa1dc613" providerId="ADAL" clId="{320B3900-2BFD-4B9F-8A76-B8970B1B63EE}" dt="2022-01-28T19:28:37.090" v="6727" actId="1076"/>
-          <ac:spMkLst>
-            <pc:docMk/>
-            <pc:sldMk cId="1581745544" sldId="266"/>
-            <ac:spMk id="6" creationId="{DA2FC45D-809D-47E9-8001-E1BB5CF86E4C}"/>
-          </ac:spMkLst>
-        </pc:spChg>
-        <pc:spChg chg="add mod">
-          <ac:chgData name="Chris Reeves" userId="b49c9824-41eb-460f-b856-160cfa1dc613" providerId="ADAL" clId="{320B3900-2BFD-4B9F-8A76-B8970B1B63EE}" dt="2022-01-28T19:30:55.898" v="6756" actId="164"/>
-          <ac:spMkLst>
-            <pc:docMk/>
-            <pc:sldMk cId="1581745544" sldId="266"/>
-            <ac:spMk id="10" creationId="{741600DA-6DA2-4472-AA8F-635FC417454F}"/>
-          </ac:spMkLst>
-        </pc:spChg>
-        <pc:spChg chg="add mod">
-          <ac:chgData name="Chris Reeves" userId="b49c9824-41eb-460f-b856-160cfa1dc613" providerId="ADAL" clId="{320B3900-2BFD-4B9F-8A76-B8970B1B63EE}" dt="2022-01-28T19:40:21.081" v="7111" actId="1076"/>
-          <ac:spMkLst>
-            <pc:docMk/>
-            <pc:sldMk cId="1581745544" sldId="266"/>
-            <ac:spMk id="12" creationId="{A6BA5703-3AD1-4485-8F46-4028510796EF}"/>
-          </ac:spMkLst>
-        </pc:spChg>
-        <pc:spChg chg="add mod">
-          <ac:chgData name="Chris Reeves" userId="b49c9824-41eb-460f-b856-160cfa1dc613" providerId="ADAL" clId="{320B3900-2BFD-4B9F-8A76-B8970B1B63EE}" dt="2022-01-28T19:41:22.089" v="7148" actId="164"/>
-          <ac:spMkLst>
-            <pc:docMk/>
-            <pc:sldMk cId="1581745544" sldId="266"/>
-            <ac:spMk id="13" creationId="{20BA24EB-5932-4F63-868A-ED93DEA0387A}"/>
-          </ac:spMkLst>
-        </pc:spChg>
-        <pc:grpChg chg="add del mod">
-          <ac:chgData name="Chris Reeves" userId="b49c9824-41eb-460f-b856-160cfa1dc613" providerId="ADAL" clId="{320B3900-2BFD-4B9F-8A76-B8970B1B63EE}" dt="2022-01-28T19:29:06.817" v="6733" actId="478"/>
-          <ac:grpSpMkLst>
-            <pc:docMk/>
-            <pc:sldMk cId="1581745544" sldId="266"/>
-            <ac:grpSpMk id="7" creationId="{AD1395DD-7190-4B79-B65C-16CD2E256C69}"/>
-          </ac:grpSpMkLst>
-        </pc:grpChg>
-        <pc:grpChg chg="add mod">
-          <ac:chgData name="Chris Reeves" userId="b49c9824-41eb-460f-b856-160cfa1dc613" providerId="ADAL" clId="{320B3900-2BFD-4B9F-8A76-B8970B1B63EE}" dt="2022-01-28T19:41:22.089" v="7148" actId="164"/>
-          <ac:grpSpMkLst>
-            <pc:docMk/>
-            <pc:sldMk cId="1581745544" sldId="266"/>
-            <ac:grpSpMk id="11" creationId="{357AFAEC-027E-4412-B394-6F893B97359F}"/>
-          </ac:grpSpMkLst>
-        </pc:grpChg>
-        <pc:grpChg chg="add mod">
-          <ac:chgData name="Chris Reeves" userId="b49c9824-41eb-460f-b856-160cfa1dc613" providerId="ADAL" clId="{320B3900-2BFD-4B9F-8A76-B8970B1B63EE}" dt="2022-01-28T19:41:22.089" v="7148" actId="164"/>
-          <ac:grpSpMkLst>
-            <pc:docMk/>
-            <pc:sldMk cId="1581745544" sldId="266"/>
-            <ac:grpSpMk id="16" creationId="{29050ADD-F8C6-481A-8BF0-64935BAF0E0C}"/>
-          </ac:grpSpMkLst>
-        </pc:grpChg>
-        <pc:picChg chg="add mod modCrop">
-          <ac:chgData name="Chris Reeves" userId="b49c9824-41eb-460f-b856-160cfa1dc613" providerId="ADAL" clId="{320B3900-2BFD-4B9F-8A76-B8970B1B63EE}" dt="2022-01-28T19:28:37.090" v="6727" actId="1076"/>
-          <ac:picMkLst>
-            <pc:docMk/>
-            <pc:sldMk cId="1581745544" sldId="266"/>
-            <ac:picMk id="5" creationId="{663178FC-4359-441E-B3E8-6D3080BBEEB8}"/>
-          </ac:picMkLst>
-        </pc:picChg>
-        <pc:picChg chg="add mod modCrop">
-          <ac:chgData name="Chris Reeves" userId="b49c9824-41eb-460f-b856-160cfa1dc613" providerId="ADAL" clId="{320B3900-2BFD-4B9F-8A76-B8970B1B63EE}" dt="2022-01-28T19:30:55.898" v="6756" actId="164"/>
-          <ac:picMkLst>
-            <pc:docMk/>
-            <pc:sldMk cId="1581745544" sldId="266"/>
-            <ac:picMk id="9" creationId="{062A5D2C-AB35-4040-80DE-A182BE68C5EB}"/>
-          </ac:picMkLst>
-        </pc:picChg>
-        <pc:picChg chg="add mod">
-          <ac:chgData name="Chris Reeves" userId="b49c9824-41eb-460f-b856-160cfa1dc613" providerId="ADAL" clId="{320B3900-2BFD-4B9F-8A76-B8970B1B63EE}" dt="2022-01-28T19:41:29.817" v="7149" actId="1076"/>
-          <ac:picMkLst>
-            <pc:docMk/>
-            <pc:sldMk cId="1581745544" sldId="266"/>
-            <ac:picMk id="15" creationId="{76BB6E94-6931-4811-AA51-95F4AF7F5C1F}"/>
-          </ac:picMkLst>
-        </pc:picChg>
-      </pc:sldChg>
-    </pc:docChg>
-  </pc:docChgLst>
 </pc:chgInfo>
 </file>
 
@@ -1295,7 +1296,7 @@
           </a:lstStyle>
           <a:p>
             <a:fld id="{23951410-EDE1-43FE-B18B-95E222B9014D}" type="datetimeFigureOut">
-              <a:t>8/14/2022</a:t>
+              <a:t>11/7/2022</a:t>
             </a:fld>
             <a:endParaRPr lang="en-US"/>
           </a:p>
@@ -1649,6 +1650,182 @@
 </p:notes>
 </file>
 
+<file path=ppt/notesSlides/notesSlide2.xml><?xml version="1.0" encoding="utf-8"?>
+<p:notes xmlns:a="http://schemas.openxmlformats.org/drawingml/2006/main" xmlns:r="http://schemas.openxmlformats.org/officeDocument/2006/relationships" xmlns:p="http://schemas.openxmlformats.org/presentationml/2006/main">
+  <p:cSld>
+    <p:spTree>
+      <p:nvGrpSpPr>
+        <p:cNvPr id="1" name=""/>
+        <p:cNvGrpSpPr/>
+        <p:nvPr/>
+      </p:nvGrpSpPr>
+      <p:grpSpPr>
+        <a:xfrm>
+          <a:off x="0" y="0"/>
+          <a:ext cx="0" cy="0"/>
+          <a:chOff x="0" y="0"/>
+          <a:chExt cx="0" cy="0"/>
+        </a:xfrm>
+      </p:grpSpPr>
+      <p:sp>
+        <p:nvSpPr>
+          <p:cNvPr id="2" name="Slide Image Placeholder 1"/>
+          <p:cNvSpPr>
+            <a:spLocks noGrp="1" noRot="1" noChangeAspect="1"/>
+          </p:cNvSpPr>
+          <p:nvPr>
+            <p:ph type="sldImg"/>
+          </p:nvPr>
+        </p:nvSpPr>
+        <p:spPr/>
+      </p:sp>
+      <p:sp>
+        <p:nvSpPr>
+          <p:cNvPr id="3" name="Notes Placeholder 2"/>
+          <p:cNvSpPr>
+            <a:spLocks noGrp="1"/>
+          </p:cNvSpPr>
+          <p:nvPr>
+            <p:ph type="body" idx="1"/>
+          </p:nvPr>
+        </p:nvSpPr>
+        <p:spPr/>
+        <p:txBody>
+          <a:bodyPr/>
+          <a:lstStyle/>
+          <a:p>
+            <a:r>
+              <a:rPr lang="en-US">
+                <a:cs typeface="Calibri"/>
+              </a:rPr>
+              <a:t>&lt;&gt; </a:t>
+            </a:r>
+          </a:p>
+        </p:txBody>
+      </p:sp>
+      <p:sp>
+        <p:nvSpPr>
+          <p:cNvPr id="4" name="Slide Number Placeholder 3"/>
+          <p:cNvSpPr>
+            <a:spLocks noGrp="1"/>
+          </p:cNvSpPr>
+          <p:nvPr>
+            <p:ph type="sldNum" sz="quarter" idx="5"/>
+          </p:nvPr>
+        </p:nvSpPr>
+        <p:spPr/>
+        <p:txBody>
+          <a:bodyPr/>
+          <a:lstStyle/>
+          <a:p>
+            <a:fld id="{D9E8AE0B-21B2-4E0B-92C7-D22D6E6C3473}" type="slidenum">
+              <a:t>2</a:t>
+            </a:fld>
+            <a:endParaRPr lang="en-US"/>
+          </a:p>
+        </p:txBody>
+      </p:sp>
+    </p:spTree>
+    <p:extLst>
+      <p:ext uri="{BB962C8B-B14F-4D97-AF65-F5344CB8AC3E}">
+        <p14:creationId xmlns:p14="http://schemas.microsoft.com/office/powerpoint/2010/main" val="2905531268"/>
+      </p:ext>
+    </p:extLst>
+  </p:cSld>
+  <p:clrMapOvr>
+    <a:masterClrMapping/>
+  </p:clrMapOvr>
+</p:notes>
+</file>
+
+<file path=ppt/notesSlides/notesSlide3.xml><?xml version="1.0" encoding="utf-8"?>
+<p:notes xmlns:a="http://schemas.openxmlformats.org/drawingml/2006/main" xmlns:r="http://schemas.openxmlformats.org/officeDocument/2006/relationships" xmlns:p="http://schemas.openxmlformats.org/presentationml/2006/main">
+  <p:cSld>
+    <p:spTree>
+      <p:nvGrpSpPr>
+        <p:cNvPr id="1" name=""/>
+        <p:cNvGrpSpPr/>
+        <p:nvPr/>
+      </p:nvGrpSpPr>
+      <p:grpSpPr>
+        <a:xfrm>
+          <a:off x="0" y="0"/>
+          <a:ext cx="0" cy="0"/>
+          <a:chOff x="0" y="0"/>
+          <a:chExt cx="0" cy="0"/>
+        </a:xfrm>
+      </p:grpSpPr>
+      <p:sp>
+        <p:nvSpPr>
+          <p:cNvPr id="2" name="Slide Image Placeholder 1"/>
+          <p:cNvSpPr>
+            <a:spLocks noGrp="1" noRot="1" noChangeAspect="1"/>
+          </p:cNvSpPr>
+          <p:nvPr>
+            <p:ph type="sldImg"/>
+          </p:nvPr>
+        </p:nvSpPr>
+        <p:spPr/>
+      </p:sp>
+      <p:sp>
+        <p:nvSpPr>
+          <p:cNvPr id="3" name="Notes Placeholder 2"/>
+          <p:cNvSpPr>
+            <a:spLocks noGrp="1"/>
+          </p:cNvSpPr>
+          <p:nvPr>
+            <p:ph type="body" idx="1"/>
+          </p:nvPr>
+        </p:nvSpPr>
+        <p:spPr/>
+        <p:txBody>
+          <a:bodyPr/>
+          <a:lstStyle/>
+          <a:p>
+            <a:r>
+              <a:rPr lang="en-US">
+                <a:cs typeface="Calibri"/>
+              </a:rPr>
+              <a:t>&lt;&gt; </a:t>
+            </a:r>
+          </a:p>
+        </p:txBody>
+      </p:sp>
+      <p:sp>
+        <p:nvSpPr>
+          <p:cNvPr id="4" name="Slide Number Placeholder 3"/>
+          <p:cNvSpPr>
+            <a:spLocks noGrp="1"/>
+          </p:cNvSpPr>
+          <p:nvPr>
+            <p:ph type="sldNum" sz="quarter" idx="5"/>
+          </p:nvPr>
+        </p:nvSpPr>
+        <p:spPr/>
+        <p:txBody>
+          <a:bodyPr/>
+          <a:lstStyle/>
+          <a:p>
+            <a:fld id="{D9E8AE0B-21B2-4E0B-92C7-D22D6E6C3473}" type="slidenum">
+              <a:t>3</a:t>
+            </a:fld>
+            <a:endParaRPr lang="en-US"/>
+          </a:p>
+        </p:txBody>
+      </p:sp>
+    </p:spTree>
+    <p:extLst>
+      <p:ext uri="{BB962C8B-B14F-4D97-AF65-F5344CB8AC3E}">
+        <p14:creationId xmlns:p14="http://schemas.microsoft.com/office/powerpoint/2010/main" val="126251072"/>
+      </p:ext>
+    </p:extLst>
+  </p:cSld>
+  <p:clrMapOvr>
+    <a:masterClrMapping/>
+  </p:clrMapOvr>
+</p:notes>
+</file>
+
 <file path=ppt/slideLayouts/slideLayout1.xml><?xml version="1.0" encoding="utf-8"?>
 <p:sldLayout xmlns:a="http://schemas.openxmlformats.org/drawingml/2006/main" xmlns:r="http://schemas.openxmlformats.org/officeDocument/2006/relationships" xmlns:p="http://schemas.openxmlformats.org/presentationml/2006/main" type="title" preserve="1">
   <p:cSld name="Title Slide">
@@ -1778,7 +1955,7 @@
           <a:p>
             <a:fld id="{846CE7D5-CF57-46EF-B807-FDD0502418D4}" type="datetimeFigureOut">
               <a:rPr lang="en-US" smtClean="0"/>
-              <a:t>8/14/2022</a:t>
+              <a:t>11/7/2022</a:t>
             </a:fld>
             <a:endParaRPr lang="en-US"/>
           </a:p>
@@ -1946,7 +2123,7 @@
           <a:p>
             <a:fld id="{846CE7D5-CF57-46EF-B807-FDD0502418D4}" type="datetimeFigureOut">
               <a:rPr lang="en-US" smtClean="0"/>
-              <a:t>8/14/2022</a:t>
+              <a:t>11/7/2022</a:t>
             </a:fld>
             <a:endParaRPr lang="en-US"/>
           </a:p>
@@ -2124,7 +2301,7 @@
           <a:p>
             <a:fld id="{846CE7D5-CF57-46EF-B807-FDD0502418D4}" type="datetimeFigureOut">
               <a:rPr lang="en-US" smtClean="0"/>
-              <a:t>8/14/2022</a:t>
+              <a:t>11/7/2022</a:t>
             </a:fld>
             <a:endParaRPr lang="en-US"/>
           </a:p>
@@ -2292,7 +2469,7 @@
           <a:p>
             <a:fld id="{846CE7D5-CF57-46EF-B807-FDD0502418D4}" type="datetimeFigureOut">
               <a:rPr lang="en-US" smtClean="0"/>
-              <a:t>8/14/2022</a:t>
+              <a:t>11/7/2022</a:t>
             </a:fld>
             <a:endParaRPr lang="en-US"/>
           </a:p>
@@ -2537,7 +2714,7 @@
           <a:p>
             <a:fld id="{846CE7D5-CF57-46EF-B807-FDD0502418D4}" type="datetimeFigureOut">
               <a:rPr lang="en-US" smtClean="0"/>
-              <a:t>8/14/2022</a:t>
+              <a:t>11/7/2022</a:t>
             </a:fld>
             <a:endParaRPr lang="en-US"/>
           </a:p>
@@ -2766,7 +2943,7 @@
           <a:p>
             <a:fld id="{846CE7D5-CF57-46EF-B807-FDD0502418D4}" type="datetimeFigureOut">
               <a:rPr lang="en-US" smtClean="0"/>
-              <a:t>8/14/2022</a:t>
+              <a:t>11/7/2022</a:t>
             </a:fld>
             <a:endParaRPr lang="en-US"/>
           </a:p>
@@ -3130,7 +3307,7 @@
           <a:p>
             <a:fld id="{846CE7D5-CF57-46EF-B807-FDD0502418D4}" type="datetimeFigureOut">
               <a:rPr lang="en-US" smtClean="0"/>
-              <a:t>8/14/2022</a:t>
+              <a:t>11/7/2022</a:t>
             </a:fld>
             <a:endParaRPr lang="en-US"/>
           </a:p>
@@ -3247,7 +3424,7 @@
           <a:p>
             <a:fld id="{846CE7D5-CF57-46EF-B807-FDD0502418D4}" type="datetimeFigureOut">
               <a:rPr lang="en-US" smtClean="0"/>
-              <a:t>8/14/2022</a:t>
+              <a:t>11/7/2022</a:t>
             </a:fld>
             <a:endParaRPr lang="en-US"/>
           </a:p>
@@ -3342,7 +3519,7 @@
           <a:p>
             <a:fld id="{846CE7D5-CF57-46EF-B807-FDD0502418D4}" type="datetimeFigureOut">
               <a:rPr lang="en-US" smtClean="0"/>
-              <a:t>8/14/2022</a:t>
+              <a:t>11/7/2022</a:t>
             </a:fld>
             <a:endParaRPr lang="en-US"/>
           </a:p>
@@ -3617,7 +3794,7 @@
           <a:p>
             <a:fld id="{846CE7D5-CF57-46EF-B807-FDD0502418D4}" type="datetimeFigureOut">
               <a:rPr lang="en-US" smtClean="0"/>
-              <a:t>8/14/2022</a:t>
+              <a:t>11/7/2022</a:t>
             </a:fld>
             <a:endParaRPr lang="en-US"/>
           </a:p>
@@ -3872,7 +4049,7 @@
           <a:p>
             <a:fld id="{846CE7D5-CF57-46EF-B807-FDD0502418D4}" type="datetimeFigureOut">
               <a:rPr lang="en-US" smtClean="0"/>
-              <a:t>8/14/2022</a:t>
+              <a:t>11/7/2022</a:t>
             </a:fld>
             <a:endParaRPr lang="en-US"/>
           </a:p>
@@ -4083,7 +4260,7 @@
           <a:p>
             <a:fld id="{846CE7D5-CF57-46EF-B807-FDD0502418D4}" type="datetimeFigureOut">
               <a:rPr lang="en-US" smtClean="0"/>
-              <a:t>8/14/2022</a:t>
+              <a:t>11/7/2022</a:t>
             </a:fld>
             <a:endParaRPr lang="en-US"/>
           </a:p>
@@ -4540,12 +4717,12 @@
         <p:spPr>
           <a:xfrm>
             <a:off x="838200" y="1411550"/>
-            <a:ext cx="10515600" cy="5273335"/>
+            <a:ext cx="8418922" cy="5273335"/>
           </a:xfrm>
         </p:spPr>
         <p:txBody>
           <a:bodyPr vert="horz" lIns="91440" tIns="45720" rIns="91440" bIns="45720" rtlCol="0" anchor="t">
-            <a:normAutofit fontScale="85000" lnSpcReduction="20000"/>
+            <a:normAutofit/>
           </a:bodyPr>
           <a:lstStyle/>
           <a:p>
@@ -4555,23 +4732,13 @@
             </a:pPr>
             <a:r>
               <a:rPr lang="en-US" dirty="0"/>
-              <a:t>Download ‘scc.py’ and move to desired file location</a:t>
-            </a:r>
-          </a:p>
-          <a:p>
-            <a:pPr marL="514350" indent="-514350">
-              <a:buFont typeface="+mj-lt"/>
-              <a:buAutoNum type="arabicPeriod"/>
-            </a:pPr>
-            <a:r>
-              <a:rPr lang="en-US" dirty="0"/>
-              <a:t>Install </a:t>
-            </a:r>
-            <a:r>
-              <a:rPr lang="en-US" dirty="0">
+              <a:t>Download ‘scc.py’ from </a:t>
+            </a:r>
+            <a:r>
+              <a:rPr lang="en-US" dirty="0" err="1">
                 <a:hlinkClick r:id="rId3"/>
               </a:rPr>
-              <a:t>Anaconda Distribution</a:t>
+              <a:t>github</a:t>
             </a:r>
             <a:endParaRPr lang="en-US" dirty="0"/>
           </a:p>
@@ -4579,220 +4746,449 @@
             <a:pPr lvl="1"/>
             <a:r>
               <a:rPr lang="en-US" dirty="0"/>
-              <a:t>If you want to install the program for every user on the PC, select this option during the install. All other defaults are fine.	</a:t>
-            </a:r>
-          </a:p>
-          <a:p>
-            <a:pPr marL="514350" indent="-514350">
-              <a:buFont typeface="+mj-lt"/>
-              <a:buAutoNum type="arabicPeriod"/>
-            </a:pPr>
-            <a:r>
-              <a:rPr lang="en-US" dirty="0"/>
-              <a:t>Run ‘Anaconda Prompt’ as Administrator</a:t>
+              <a:t>Switch to your desired branch via the dropdown menu</a:t>
+            </a:r>
+          </a:p>
+          <a:p>
+            <a:pPr lvl="2"/>
+            <a:r>
+              <a:rPr lang="en-US" dirty="0"/>
+              <a:t>‘master’ branch is the most stable version</a:t>
+            </a:r>
+          </a:p>
+          <a:p>
+            <a:pPr lvl="2"/>
+            <a:r>
+              <a:rPr lang="en-US" dirty="0"/>
+              <a:t>‘development’ branch is the most current version, but could have bugs</a:t>
             </a:r>
           </a:p>
           <a:p>
             <a:pPr lvl="1"/>
             <a:r>
               <a:rPr lang="en-US" dirty="0"/>
-              <a:t>On Windows: Right click app, select “Run as Administrator”</a:t>
-            </a:r>
-          </a:p>
-          <a:p>
-            <a:pPr marL="514350" indent="-514350">
-              <a:buFont typeface="+mj-lt"/>
-              <a:buAutoNum type="arabicPeriod"/>
-            </a:pPr>
-            <a:r>
-              <a:rPr lang="en-US" dirty="0"/>
-              <a:t>Type “</a:t>
-            </a:r>
-            <a:r>
-              <a:rPr lang="en-US" dirty="0" err="1"/>
-              <a:t>conda</a:t>
-            </a:r>
-            <a:r>
-              <a:rPr lang="en-US" dirty="0"/>
-              <a:t> create –n </a:t>
-            </a:r>
-            <a:r>
-              <a:rPr lang="en-US" i="1" dirty="0"/>
-              <a:t>desired name of environment</a:t>
-            </a:r>
-            <a:r>
-              <a:rPr lang="en-US" dirty="0"/>
-              <a:t> python=3.9”</a:t>
+              <a:t>Option 1: Download entire branch</a:t>
+            </a:r>
+          </a:p>
+          <a:p>
+            <a:pPr lvl="2"/>
+            <a:r>
+              <a:rPr lang="en-US" dirty="0"/>
+              <a:t>In the code dropdown menu, select ‘Download Zip’</a:t>
+            </a:r>
+          </a:p>
+          <a:p>
+            <a:pPr lvl="2"/>
+            <a:r>
+              <a:rPr lang="en-US" dirty="0"/>
+              <a:t>Move the .zip file to your desired file location and extract it using a file archiver like WinRAR or 7-Zip</a:t>
             </a:r>
           </a:p>
           <a:p>
             <a:pPr lvl="1"/>
             <a:r>
               <a:rPr lang="en-US" dirty="0"/>
-              <a:t>Remember the name you use! Recommended: “</a:t>
-            </a:r>
-            <a:r>
-              <a:rPr lang="en-US" dirty="0" err="1">
-                <a:solidFill>
-                  <a:srgbClr val="C00000"/>
-                </a:solidFill>
-              </a:rPr>
-              <a:t>sccenv</a:t>
-            </a:r>
-            <a:r>
-              <a:rPr lang="en-US" dirty="0"/>
-              <a:t>”</a:t>
-            </a:r>
-          </a:p>
-          <a:p>
-            <a:pPr lvl="1"/>
-            <a:r>
-              <a:rPr lang="en-US" dirty="0" err="1">
-                <a:cs typeface="Calibri"/>
-              </a:rPr>
-              <a:t>Eg</a:t>
-            </a:r>
-            <a:r>
-              <a:rPr lang="en-US" dirty="0">
-                <a:cs typeface="Calibri"/>
-              </a:rPr>
-              <a:t>: “</a:t>
-            </a:r>
-            <a:r>
-              <a:rPr lang="en-US" dirty="0" err="1">
-                <a:cs typeface="Calibri"/>
-              </a:rPr>
-              <a:t>conda</a:t>
-            </a:r>
-            <a:r>
-              <a:rPr lang="en-US" dirty="0">
-                <a:cs typeface="Calibri"/>
-              </a:rPr>
-              <a:t> create –n </a:t>
-            </a:r>
-            <a:r>
-              <a:rPr lang="en-US" dirty="0" err="1">
-                <a:cs typeface="Calibri"/>
-              </a:rPr>
-              <a:t>sccenv</a:t>
-            </a:r>
-            <a:r>
-              <a:rPr lang="en-US" dirty="0">
-                <a:cs typeface="Calibri"/>
-              </a:rPr>
-              <a:t> python=3.9”</a:t>
-            </a:r>
-          </a:p>
-          <a:p>
-            <a:pPr marL="514350" indent="-514350">
-              <a:buAutoNum type="arabicPeriod"/>
-            </a:pPr>
-            <a:r>
-              <a:rPr lang="en-US" dirty="0"/>
-              <a:t>Type “</a:t>
-            </a:r>
-            <a:r>
-              <a:rPr lang="en-US" dirty="0" err="1"/>
-              <a:t>conda</a:t>
-            </a:r>
-            <a:r>
-              <a:rPr lang="en-US" dirty="0"/>
-              <a:t> activate </a:t>
-            </a:r>
-            <a:r>
-              <a:rPr lang="en-US" i="1" dirty="0"/>
-              <a:t>name of your environment</a:t>
-            </a:r>
-            <a:r>
-              <a:rPr lang="en-US" dirty="0"/>
-              <a:t>”</a:t>
-            </a:r>
-            <a:endParaRPr lang="en-US" dirty="0">
-              <a:cs typeface="Calibri"/>
-            </a:endParaRPr>
-          </a:p>
-          <a:p>
-            <a:pPr marL="514350" indent="-514350">
-              <a:buFont typeface="+mj-lt"/>
-              <a:buAutoNum type="arabicPeriod"/>
-            </a:pPr>
-            <a:r>
-              <a:rPr lang="en-US" dirty="0"/>
-              <a:t>Type “pip install pandas” </a:t>
-            </a:r>
-          </a:p>
-          <a:p>
-            <a:pPr marL="514350" indent="-514350">
-              <a:buFont typeface="+mj-lt"/>
-              <a:buAutoNum type="arabicPeriod"/>
-            </a:pPr>
-            <a:r>
-              <a:rPr lang="en-US" dirty="0"/>
-              <a:t>Type “pip install </a:t>
-            </a:r>
-            <a:r>
-              <a:rPr lang="en-US" dirty="0" err="1"/>
-              <a:t>opencv</a:t>
-            </a:r>
-            <a:r>
-              <a:rPr lang="en-US" dirty="0"/>
-              <a:t>-python”</a:t>
-            </a:r>
-          </a:p>
-          <a:p>
-            <a:pPr marL="514350" indent="-514350">
-              <a:buFont typeface="+mj-lt"/>
-              <a:buAutoNum type="arabicPeriod"/>
-            </a:pPr>
-            <a:r>
-              <a:rPr lang="en-US" dirty="0">
-                <a:cs typeface="Calibri" panose="020F0502020204030204"/>
-              </a:rPr>
-              <a:t>Type “pip install matplotlib”</a:t>
-            </a:r>
-            <a:endParaRPr lang="en-US" dirty="0"/>
-          </a:p>
-          <a:p>
-            <a:pPr marL="514350" indent="-514350">
-              <a:buFont typeface="+mj-lt"/>
-              <a:buAutoNum type="arabicPeriod"/>
-            </a:pPr>
-            <a:r>
-              <a:rPr lang="en-US" dirty="0"/>
-              <a:t>Type “pip install </a:t>
-            </a:r>
-            <a:r>
-              <a:rPr lang="en-US" dirty="0" err="1"/>
-              <a:t>configparser</a:t>
-            </a:r>
-            <a:r>
-              <a:rPr lang="en-US" dirty="0"/>
-              <a:t>”</a:t>
-            </a:r>
-          </a:p>
-          <a:p>
-            <a:pPr marL="514350" indent="-514350">
-              <a:buFont typeface="+mj-lt"/>
-              <a:buAutoNum type="arabicPeriod"/>
-            </a:pPr>
-            <a:r>
-              <a:rPr lang="en-US" dirty="0"/>
-              <a:t>Type “pip install </a:t>
-            </a:r>
-            <a:r>
-              <a:rPr lang="en-US" dirty="0" err="1"/>
-              <a:t>PySimpleGUI</a:t>
-            </a:r>
-            <a:r>
-              <a:rPr lang="en-US" dirty="0"/>
-              <a:t>”</a:t>
-            </a:r>
-            <a:endParaRPr lang="en-US" dirty="0">
-              <a:cs typeface="Calibri" panose="020F0502020204030204"/>
-            </a:endParaRPr>
-          </a:p>
-        </p:txBody>
-      </p:sp>
+              <a:t>Option 2: Download scc.py only</a:t>
+            </a:r>
+          </a:p>
+          <a:p>
+            <a:pPr lvl="2"/>
+            <a:r>
+              <a:rPr lang="en-US" dirty="0"/>
+              <a:t>In the file list, select scc.py</a:t>
+            </a:r>
+          </a:p>
+          <a:p>
+            <a:pPr lvl="2"/>
+            <a:r>
+              <a:rPr lang="en-US" dirty="0"/>
+              <a:t>On the new page, select ‘Raw’</a:t>
+            </a:r>
+          </a:p>
+          <a:p>
+            <a:pPr lvl="2"/>
+            <a:r>
+              <a:rPr lang="en-US" dirty="0"/>
+              <a:t>On the new page, right click and select ‘Save as…’</a:t>
+            </a:r>
+          </a:p>
+          <a:p>
+            <a:pPr lvl="2"/>
+            <a:r>
+              <a:rPr lang="en-US" dirty="0"/>
+              <a:t>Save the file in your desired file location (keep the name as ‘scc.py’)</a:t>
+            </a:r>
+          </a:p>
+        </p:txBody>
+      </p:sp>
+      <p:pic>
+        <p:nvPicPr>
+          <p:cNvPr id="5" name="Picture 4">
+            <a:extLst>
+              <a:ext uri="{FF2B5EF4-FFF2-40B4-BE49-F238E27FC236}">
+                <a16:creationId xmlns:a16="http://schemas.microsoft.com/office/drawing/2014/main" id="{5DE10DD4-6EEA-80E8-D084-945AD385E237}"/>
+              </a:ext>
+            </a:extLst>
+          </p:cNvPr>
+          <p:cNvPicPr>
+            <a:picLocks noChangeAspect="1"/>
+          </p:cNvPicPr>
+          <p:nvPr/>
+        </p:nvPicPr>
+        <p:blipFill>
+          <a:blip r:embed="rId4"/>
+          <a:stretch>
+            <a:fillRect/>
+          </a:stretch>
+        </p:blipFill>
+        <p:spPr>
+          <a:xfrm>
+            <a:off x="9643620" y="238228"/>
+            <a:ext cx="2192039" cy="2346641"/>
+          </a:xfrm>
+          <a:prstGeom prst="rect">
+            <a:avLst/>
+          </a:prstGeom>
+        </p:spPr>
+      </p:pic>
+      <p:grpSp>
+        <p:nvGrpSpPr>
+          <p:cNvPr id="9" name="Group 8">
+            <a:extLst>
+              <a:ext uri="{FF2B5EF4-FFF2-40B4-BE49-F238E27FC236}">
+                <a16:creationId xmlns:a16="http://schemas.microsoft.com/office/drawing/2014/main" id="{1F081E0A-2FD7-E999-4FBA-EECF102DDF21}"/>
+              </a:ext>
+            </a:extLst>
+          </p:cNvPr>
+          <p:cNvGrpSpPr/>
+          <p:nvPr/>
+        </p:nvGrpSpPr>
+        <p:grpSpPr>
+          <a:xfrm>
+            <a:off x="9161656" y="2876586"/>
+            <a:ext cx="2919100" cy="2343262"/>
+            <a:chOff x="9161656" y="3012444"/>
+            <a:chExt cx="2919100" cy="2343262"/>
+          </a:xfrm>
+        </p:grpSpPr>
+        <p:pic>
+          <p:nvPicPr>
+            <p:cNvPr id="7" name="Picture 6">
+              <a:extLst>
+                <a:ext uri="{FF2B5EF4-FFF2-40B4-BE49-F238E27FC236}">
+                  <a16:creationId xmlns:a16="http://schemas.microsoft.com/office/drawing/2014/main" id="{9976591A-175A-4043-ADF5-BCEF21909B56}"/>
+                </a:ext>
+              </a:extLst>
+            </p:cNvPr>
+            <p:cNvPicPr>
+              <a:picLocks noChangeAspect="1"/>
+            </p:cNvPicPr>
+            <p:nvPr/>
+          </p:nvPicPr>
+          <p:blipFill>
+            <a:blip r:embed="rId5"/>
+            <a:stretch>
+              <a:fillRect/>
+            </a:stretch>
+          </p:blipFill>
+          <p:spPr>
+            <a:xfrm>
+              <a:off x="9161656" y="3012444"/>
+              <a:ext cx="2919100" cy="2343262"/>
+            </a:xfrm>
+            <a:prstGeom prst="rect">
+              <a:avLst/>
+            </a:prstGeom>
+          </p:spPr>
+        </p:pic>
+        <p:sp>
+          <p:nvSpPr>
+            <p:cNvPr id="8" name="Rectangle 7">
+              <a:extLst>
+                <a:ext uri="{FF2B5EF4-FFF2-40B4-BE49-F238E27FC236}">
+                  <a16:creationId xmlns:a16="http://schemas.microsoft.com/office/drawing/2014/main" id="{72275AB6-98D7-4662-56BE-ACB629C7841A}"/>
+                </a:ext>
+              </a:extLst>
+            </p:cNvPr>
+            <p:cNvSpPr/>
+            <p:nvPr/>
+          </p:nvSpPr>
+          <p:spPr>
+            <a:xfrm>
+              <a:off x="9257122" y="4967926"/>
+              <a:ext cx="1376313" cy="320511"/>
+            </a:xfrm>
+            <a:prstGeom prst="rect">
+              <a:avLst/>
+            </a:prstGeom>
+            <a:noFill/>
+            <a:ln w="28575">
+              <a:solidFill>
+                <a:srgbClr val="FF0000"/>
+              </a:solidFill>
+            </a:ln>
+          </p:spPr>
+          <p:style>
+            <a:lnRef idx="2">
+              <a:schemeClr val="accent1">
+                <a:shade val="50000"/>
+              </a:schemeClr>
+            </a:lnRef>
+            <a:fillRef idx="1">
+              <a:schemeClr val="accent1"/>
+            </a:fillRef>
+            <a:effectRef idx="0">
+              <a:schemeClr val="accent1"/>
+            </a:effectRef>
+            <a:fontRef idx="minor">
+              <a:schemeClr val="lt1"/>
+            </a:fontRef>
+          </p:style>
+          <p:txBody>
+            <a:bodyPr rtlCol="0" anchor="ctr"/>
+            <a:lstStyle/>
+            <a:p>
+              <a:pPr algn="ctr"/>
+              <a:endParaRPr lang="en-US"/>
+            </a:p>
+          </p:txBody>
+        </p:sp>
+      </p:grpSp>
+      <p:grpSp>
+        <p:nvGrpSpPr>
+          <p:cNvPr id="13" name="Group 12">
+            <a:extLst>
+              <a:ext uri="{FF2B5EF4-FFF2-40B4-BE49-F238E27FC236}">
+                <a16:creationId xmlns:a16="http://schemas.microsoft.com/office/drawing/2014/main" id="{9B4F4E51-0A83-5B4E-54F6-2AE6C249142E}"/>
+              </a:ext>
+            </a:extLst>
+          </p:cNvPr>
+          <p:cNvGrpSpPr/>
+          <p:nvPr/>
+        </p:nvGrpSpPr>
+        <p:grpSpPr>
+          <a:xfrm>
+            <a:off x="6325254" y="5154915"/>
+            <a:ext cx="2111206" cy="391266"/>
+            <a:chOff x="6323495" y="4421974"/>
+            <a:chExt cx="2111206" cy="391266"/>
+          </a:xfrm>
+        </p:grpSpPr>
+        <p:pic>
+          <p:nvPicPr>
+            <p:cNvPr id="11" name="Picture 10">
+              <a:extLst>
+                <a:ext uri="{FF2B5EF4-FFF2-40B4-BE49-F238E27FC236}">
+                  <a16:creationId xmlns:a16="http://schemas.microsoft.com/office/drawing/2014/main" id="{96DBBBE3-6C1B-BED3-177E-F11192A0665E}"/>
+                </a:ext>
+              </a:extLst>
+            </p:cNvPr>
+            <p:cNvPicPr>
+              <a:picLocks noChangeAspect="1"/>
+            </p:cNvPicPr>
+            <p:nvPr/>
+          </p:nvPicPr>
+          <p:blipFill>
+            <a:blip r:embed="rId6"/>
+            <a:stretch>
+              <a:fillRect/>
+            </a:stretch>
+          </p:blipFill>
+          <p:spPr>
+            <a:xfrm>
+              <a:off x="6323495" y="4421974"/>
+              <a:ext cx="2111206" cy="391266"/>
+            </a:xfrm>
+            <a:prstGeom prst="rect">
+              <a:avLst/>
+            </a:prstGeom>
+          </p:spPr>
+        </p:pic>
+        <p:sp>
+          <p:nvSpPr>
+            <p:cNvPr id="12" name="Rectangle 11">
+              <a:extLst>
+                <a:ext uri="{FF2B5EF4-FFF2-40B4-BE49-F238E27FC236}">
+                  <a16:creationId xmlns:a16="http://schemas.microsoft.com/office/drawing/2014/main" id="{44D14200-A12D-FDB0-571F-89489B6D30F6}"/>
+                </a:ext>
+              </a:extLst>
+            </p:cNvPr>
+            <p:cNvSpPr/>
+            <p:nvPr/>
+          </p:nvSpPr>
+          <p:spPr>
+            <a:xfrm>
+              <a:off x="6476214" y="4455021"/>
+              <a:ext cx="650450" cy="320511"/>
+            </a:xfrm>
+            <a:prstGeom prst="rect">
+              <a:avLst/>
+            </a:prstGeom>
+            <a:noFill/>
+            <a:ln w="28575">
+              <a:solidFill>
+                <a:srgbClr val="FF0000"/>
+              </a:solidFill>
+            </a:ln>
+          </p:spPr>
+          <p:style>
+            <a:lnRef idx="2">
+              <a:schemeClr val="accent1">
+                <a:shade val="50000"/>
+              </a:schemeClr>
+            </a:lnRef>
+            <a:fillRef idx="1">
+              <a:schemeClr val="accent1"/>
+            </a:fillRef>
+            <a:effectRef idx="0">
+              <a:schemeClr val="accent1"/>
+            </a:effectRef>
+            <a:fontRef idx="minor">
+              <a:schemeClr val="lt1"/>
+            </a:fontRef>
+          </p:style>
+          <p:txBody>
+            <a:bodyPr rtlCol="0" anchor="ctr"/>
+            <a:lstStyle/>
+            <a:p>
+              <a:pPr algn="ctr"/>
+              <a:endParaRPr lang="en-US"/>
+            </a:p>
+          </p:txBody>
+        </p:sp>
+      </p:grpSp>
+      <p:cxnSp>
+        <p:nvCxnSpPr>
+          <p:cNvPr id="16" name="Connector: Curved 15">
+            <a:extLst>
+              <a:ext uri="{FF2B5EF4-FFF2-40B4-BE49-F238E27FC236}">
+                <a16:creationId xmlns:a16="http://schemas.microsoft.com/office/drawing/2014/main" id="{48D7F352-7206-B8D4-6222-341F83C3F1F7}"/>
+              </a:ext>
+            </a:extLst>
+          </p:cNvPr>
+          <p:cNvCxnSpPr>
+            <a:cxnSpLocks/>
+          </p:cNvCxnSpPr>
+          <p:nvPr/>
+        </p:nvCxnSpPr>
+        <p:spPr>
+          <a:xfrm flipV="1">
+            <a:off x="8436460" y="1055802"/>
+            <a:ext cx="1094039" cy="999241"/>
+          </a:xfrm>
+          <a:prstGeom prst="curvedConnector3">
+            <a:avLst/>
+          </a:prstGeom>
+          <a:ln>
+            <a:solidFill>
+              <a:schemeClr val="tx1"/>
+            </a:solidFill>
+            <a:tailEnd type="triangle"/>
+          </a:ln>
+        </p:spPr>
+        <p:style>
+          <a:lnRef idx="1">
+            <a:schemeClr val="accent1"/>
+          </a:lnRef>
+          <a:fillRef idx="0">
+            <a:schemeClr val="accent1"/>
+          </a:fillRef>
+          <a:effectRef idx="0">
+            <a:schemeClr val="accent1"/>
+          </a:effectRef>
+          <a:fontRef idx="minor">
+            <a:schemeClr val="tx1"/>
+          </a:fontRef>
+        </p:style>
+      </p:cxnSp>
+      <p:cxnSp>
+        <p:nvCxnSpPr>
+          <p:cNvPr id="21" name="Straight Arrow Connector 20">
+            <a:extLst>
+              <a:ext uri="{FF2B5EF4-FFF2-40B4-BE49-F238E27FC236}">
+                <a16:creationId xmlns:a16="http://schemas.microsoft.com/office/drawing/2014/main" id="{480AA254-726D-5898-3A64-96AAAEACF730}"/>
+              </a:ext>
+            </a:extLst>
+          </p:cNvPr>
+          <p:cNvCxnSpPr>
+            <a:cxnSpLocks/>
+          </p:cNvCxnSpPr>
+          <p:nvPr/>
+        </p:nvCxnSpPr>
+        <p:spPr>
+          <a:xfrm>
+            <a:off x="7380857" y="3780153"/>
+            <a:ext cx="1659448" cy="0"/>
+          </a:xfrm>
+          <a:prstGeom prst="straightConnector1">
+            <a:avLst/>
+          </a:prstGeom>
+          <a:ln>
+            <a:solidFill>
+              <a:schemeClr val="tx1"/>
+            </a:solidFill>
+            <a:tailEnd type="triangle"/>
+          </a:ln>
+        </p:spPr>
+        <p:style>
+          <a:lnRef idx="1">
+            <a:schemeClr val="accent1"/>
+          </a:lnRef>
+          <a:fillRef idx="0">
+            <a:schemeClr val="accent1"/>
+          </a:fillRef>
+          <a:effectRef idx="0">
+            <a:schemeClr val="accent1"/>
+          </a:effectRef>
+          <a:fontRef idx="minor">
+            <a:schemeClr val="tx1"/>
+          </a:fontRef>
+        </p:style>
+      </p:cxnSp>
+      <p:cxnSp>
+        <p:nvCxnSpPr>
+          <p:cNvPr id="29" name="Connector: Curved 28">
+            <a:extLst>
+              <a:ext uri="{FF2B5EF4-FFF2-40B4-BE49-F238E27FC236}">
+                <a16:creationId xmlns:a16="http://schemas.microsoft.com/office/drawing/2014/main" id="{35F90EF6-E373-2FF7-899C-B5D40AB355A3}"/>
+              </a:ext>
+            </a:extLst>
+          </p:cNvPr>
+          <p:cNvCxnSpPr>
+            <a:cxnSpLocks/>
+          </p:cNvCxnSpPr>
+          <p:nvPr/>
+        </p:nvCxnSpPr>
+        <p:spPr>
+          <a:xfrm flipV="1">
+            <a:off x="5241303" y="5348217"/>
+            <a:ext cx="989815" cy="98233"/>
+          </a:xfrm>
+          <a:prstGeom prst="curvedConnector3">
+            <a:avLst/>
+          </a:prstGeom>
+          <a:ln>
+            <a:solidFill>
+              <a:schemeClr val="tx1"/>
+            </a:solidFill>
+            <a:tailEnd type="triangle"/>
+          </a:ln>
+        </p:spPr>
+        <p:style>
+          <a:lnRef idx="1">
+            <a:schemeClr val="accent1"/>
+          </a:lnRef>
+          <a:fillRef idx="0">
+            <a:schemeClr val="accent1"/>
+          </a:fillRef>
+          <a:effectRef idx="0">
+            <a:schemeClr val="accent1"/>
+          </a:effectRef>
+          <a:fontRef idx="minor">
+            <a:schemeClr val="tx1"/>
+          </a:fontRef>
+        </p:style>
+      </p:cxnSp>
     </p:spTree>
     <p:extLst>
       <p:ext uri="{BB962C8B-B14F-4D97-AF65-F5344CB8AC3E}">
@@ -4828,6 +5224,161 @@
           <p:cNvPr id="2" name="Title 1">
             <a:extLst>
               <a:ext uri="{FF2B5EF4-FFF2-40B4-BE49-F238E27FC236}">
+                <a16:creationId xmlns:a16="http://schemas.microsoft.com/office/drawing/2014/main" id="{87AE82EE-4424-0197-AD6A-625D41474F3F}"/>
+              </a:ext>
+            </a:extLst>
+          </p:cNvPr>
+          <p:cNvSpPr>
+            <a:spLocks noGrp="1"/>
+          </p:cNvSpPr>
+          <p:nvPr>
+            <p:ph type="title"/>
+          </p:nvPr>
+        </p:nvSpPr>
+        <p:spPr/>
+        <p:txBody>
+          <a:bodyPr/>
+          <a:lstStyle/>
+          <a:p>
+            <a:r>
+              <a:rPr lang="en-US" dirty="0"/>
+              <a:t>Output Data </a:t>
+            </a:r>
+            <a:r>
+              <a:rPr lang="en-US" i="1" dirty="0"/>
+              <a:t>cont.</a:t>
+            </a:r>
+            <a:endParaRPr lang="en-US" dirty="0"/>
+          </a:p>
+        </p:txBody>
+      </p:sp>
+      <p:sp>
+        <p:nvSpPr>
+          <p:cNvPr id="3" name="Content Placeholder 2">
+            <a:extLst>
+              <a:ext uri="{FF2B5EF4-FFF2-40B4-BE49-F238E27FC236}">
+                <a16:creationId xmlns:a16="http://schemas.microsoft.com/office/drawing/2014/main" id="{33014443-6033-F7C3-A071-D69CA0D5FDE5}"/>
+              </a:ext>
+            </a:extLst>
+          </p:cNvPr>
+          <p:cNvSpPr>
+            <a:spLocks noGrp="1"/>
+          </p:cNvSpPr>
+          <p:nvPr>
+            <p:ph idx="1"/>
+          </p:nvPr>
+        </p:nvSpPr>
+        <p:spPr>
+          <a:xfrm>
+            <a:off x="838200" y="1825624"/>
+            <a:ext cx="5609253" cy="4667251"/>
+          </a:xfrm>
+        </p:spPr>
+        <p:txBody>
+          <a:bodyPr>
+            <a:normAutofit/>
+          </a:bodyPr>
+          <a:lstStyle/>
+          <a:p>
+            <a:r>
+              <a:rPr lang="en-US" dirty="0"/>
+              <a:t>Cyan: Counted cells</a:t>
+            </a:r>
+          </a:p>
+          <a:p>
+            <a:r>
+              <a:rPr lang="en-US" dirty="0"/>
+              <a:t>Yellow: Contours not circular enough</a:t>
+            </a:r>
+          </a:p>
+          <a:p>
+            <a:r>
+              <a:rPr lang="en-US" dirty="0"/>
+              <a:t>Magenta: Contours too small or large</a:t>
+            </a:r>
+          </a:p>
+          <a:p>
+            <a:endParaRPr lang="en-US" dirty="0"/>
+          </a:p>
+          <a:p>
+            <a:r>
+              <a:rPr lang="en-US" dirty="0"/>
+              <a:t>Legend displays counts of each contour type</a:t>
+            </a:r>
+          </a:p>
+        </p:txBody>
+      </p:sp>
+      <p:pic>
+        <p:nvPicPr>
+          <p:cNvPr id="5" name="Picture 4" descr="A picture containing green, decorated, fabric&#10;&#10;Description automatically generated">
+            <a:extLst>
+              <a:ext uri="{FF2B5EF4-FFF2-40B4-BE49-F238E27FC236}">
+                <a16:creationId xmlns:a16="http://schemas.microsoft.com/office/drawing/2014/main" id="{594019D8-BCB2-CFA5-D5C9-F9B3329F8F55}"/>
+              </a:ext>
+            </a:extLst>
+          </p:cNvPr>
+          <p:cNvPicPr>
+            <a:picLocks noChangeAspect="1"/>
+          </p:cNvPicPr>
+          <p:nvPr/>
+        </p:nvPicPr>
+        <p:blipFill>
+          <a:blip r:embed="rId2" cstate="print">
+            <a:extLst>
+              <a:ext uri="{28A0092B-C50C-407E-A947-70E740481C1C}">
+                <a14:useLocalDpi xmlns:a14="http://schemas.microsoft.com/office/drawing/2010/main" val="0"/>
+              </a:ext>
+            </a:extLst>
+          </a:blip>
+          <a:stretch>
+            <a:fillRect/>
+          </a:stretch>
+        </p:blipFill>
+        <p:spPr>
+          <a:xfrm>
+            <a:off x="6096001" y="1530446"/>
+            <a:ext cx="5852978" cy="4450702"/>
+          </a:xfrm>
+          <a:prstGeom prst="rect">
+            <a:avLst/>
+          </a:prstGeom>
+        </p:spPr>
+      </p:pic>
+    </p:spTree>
+    <p:extLst>
+      <p:ext uri="{BB962C8B-B14F-4D97-AF65-F5344CB8AC3E}">
+        <p14:creationId xmlns:p14="http://schemas.microsoft.com/office/powerpoint/2010/main" val="4262189219"/>
+      </p:ext>
+    </p:extLst>
+  </p:cSld>
+  <p:clrMapOvr>
+    <a:masterClrMapping/>
+  </p:clrMapOvr>
+</p:sld>
+</file>
+
+<file path=ppt/slides/slide11.xml><?xml version="1.0" encoding="utf-8"?>
+<p:sld xmlns:a="http://schemas.openxmlformats.org/drawingml/2006/main" xmlns:r="http://schemas.openxmlformats.org/officeDocument/2006/relationships" xmlns:p="http://schemas.openxmlformats.org/presentationml/2006/main">
+  <p:cSld>
+    <p:spTree>
+      <p:nvGrpSpPr>
+        <p:cNvPr id="1" name=""/>
+        <p:cNvGrpSpPr/>
+        <p:nvPr/>
+      </p:nvGrpSpPr>
+      <p:grpSpPr>
+        <a:xfrm>
+          <a:off x="0" y="0"/>
+          <a:ext cx="0" cy="0"/>
+          <a:chOff x="0" y="0"/>
+          <a:chExt cx="0" cy="0"/>
+        </a:xfrm>
+      </p:grpSpPr>
+      <p:sp>
+        <p:nvSpPr>
+          <p:cNvPr id="2" name="Title 1">
+            <a:extLst>
+              <a:ext uri="{FF2B5EF4-FFF2-40B4-BE49-F238E27FC236}">
                 <a16:creationId xmlns:a16="http://schemas.microsoft.com/office/drawing/2014/main" id="{93E913FC-AF7C-4F31-8CCF-0C042D810AED}"/>
               </a:ext>
             </a:extLst>
@@ -4993,9 +5544,14 @@
           <a:lstStyle/>
           <a:p>
             <a:r>
-              <a:rPr lang="en-US"/>
-              <a:t>Running the Program - Basics</a:t>
-            </a:r>
+              <a:rPr lang="en-US" dirty="0"/>
+              <a:t>Installation </a:t>
+            </a:r>
+            <a:r>
+              <a:rPr lang="en-US" i="1" dirty="0"/>
+              <a:t>cont.</a:t>
+            </a:r>
+            <a:endParaRPr lang="en-US" dirty="0"/>
           </a:p>
         </p:txBody>
       </p:sp>
@@ -5022,7 +5578,7 @@
           </a:xfrm>
         </p:spPr>
         <p:txBody>
-          <a:bodyPr>
+          <a:bodyPr vert="horz" lIns="91440" tIns="45720" rIns="91440" bIns="45720" rtlCol="0" anchor="t">
             <a:normAutofit/>
           </a:bodyPr>
           <a:lstStyle/>
@@ -5032,15 +5588,22 @@
               <a:buAutoNum type="arabicPeriod"/>
             </a:pPr>
             <a:r>
-              <a:rPr lang="en-US"/>
-              <a:t>Copy file location of ‘scc.py’</a:t>
-            </a:r>
+              <a:rPr lang="en-US" dirty="0"/>
+              <a:t>Install </a:t>
+            </a:r>
+            <a:r>
+              <a:rPr lang="en-US" dirty="0">
+                <a:hlinkClick r:id="rId3"/>
+              </a:rPr>
+              <a:t>Anaconda Distribution</a:t>
+            </a:r>
+            <a:endParaRPr lang="en-US" dirty="0"/>
           </a:p>
           <a:p>
             <a:pPr lvl="1"/>
             <a:r>
-              <a:rPr lang="en-US"/>
-              <a:t>On Windows: Right click file, select Properties, copy the Location field.</a:t>
+              <a:rPr lang="en-US" dirty="0"/>
+              <a:t>If you want to install the program for every user on the PC, select this option during the install. All other defaults are fine.	</a:t>
             </a:r>
           </a:p>
           <a:p>
@@ -5049,8 +5612,15 @@
               <a:buAutoNum type="arabicPeriod"/>
             </a:pPr>
             <a:r>
-              <a:rPr lang="en-US"/>
-              <a:t>Run ‘Anaconda Prompt’</a:t>
+              <a:rPr lang="en-US" dirty="0"/>
+              <a:t>Run ‘Anaconda Prompt’ as Administrator</a:t>
+            </a:r>
+          </a:p>
+          <a:p>
+            <a:pPr lvl="1"/>
+            <a:r>
+              <a:rPr lang="en-US" dirty="0"/>
+              <a:t>On Windows: Right click app, select “Run as Administrator”</a:t>
             </a:r>
           </a:p>
           <a:p>
@@ -5059,87 +5629,118 @@
               <a:buAutoNum type="arabicPeriod"/>
             </a:pPr>
             <a:r>
-              <a:rPr lang="en-US"/>
+              <a:rPr lang="en-US" dirty="0"/>
               <a:t>Type “</a:t>
             </a:r>
             <a:r>
-              <a:rPr lang="en-US" err="1"/>
+              <a:rPr lang="en-US" dirty="0" err="1"/>
               <a:t>conda</a:t>
             </a:r>
             <a:r>
-              <a:rPr lang="en-US"/>
-              <a:t> activate </a:t>
-            </a:r>
-            <a:r>
-              <a:rPr lang="en-US" i="1"/>
-              <a:t>name of your environment</a:t>
-            </a:r>
-            <a:r>
-              <a:rPr lang="en-US"/>
+              <a:rPr lang="en-US" dirty="0"/>
+              <a:t> create –n </a:t>
+            </a:r>
+            <a:r>
+              <a:rPr lang="en-US" i="1" dirty="0"/>
+              <a:t>desired name of environment</a:t>
+            </a:r>
+            <a:r>
+              <a:rPr lang="en-US" dirty="0"/>
+              <a:t> python=3.9”</a:t>
+            </a:r>
+          </a:p>
+          <a:p>
+            <a:pPr lvl="1"/>
+            <a:r>
+              <a:rPr lang="en-US" dirty="0"/>
+              <a:t>Remember the name you use! Recommended: “</a:t>
+            </a:r>
+            <a:r>
+              <a:rPr lang="en-US" dirty="0" err="1">
+                <a:solidFill>
+                  <a:srgbClr val="C00000"/>
+                </a:solidFill>
+              </a:rPr>
+              <a:t>sccenv</a:t>
+            </a:r>
+            <a:r>
+              <a:rPr lang="en-US" dirty="0"/>
               <a:t>”</a:t>
             </a:r>
           </a:p>
           <a:p>
+            <a:pPr lvl="1"/>
+            <a:r>
+              <a:rPr lang="en-US" dirty="0" err="1">
+                <a:cs typeface="Calibri"/>
+              </a:rPr>
+              <a:t>Eg</a:t>
+            </a:r>
+            <a:r>
+              <a:rPr lang="en-US" dirty="0">
+                <a:cs typeface="Calibri"/>
+              </a:rPr>
+              <a:t>: “</a:t>
+            </a:r>
+            <a:r>
+              <a:rPr lang="en-US" dirty="0" err="1">
+                <a:cs typeface="Calibri"/>
+              </a:rPr>
+              <a:t>conda</a:t>
+            </a:r>
+            <a:r>
+              <a:rPr lang="en-US" dirty="0">
+                <a:cs typeface="Calibri"/>
+              </a:rPr>
+              <a:t> create –n </a:t>
+            </a:r>
+            <a:r>
+              <a:rPr lang="en-US" dirty="0" err="1">
+                <a:cs typeface="Calibri"/>
+              </a:rPr>
+              <a:t>sccenv</a:t>
+            </a:r>
+            <a:r>
+              <a:rPr lang="en-US" dirty="0">
+                <a:cs typeface="Calibri"/>
+              </a:rPr>
+              <a:t> python=3.9”</a:t>
+            </a:r>
+          </a:p>
+          <a:p>
             <a:pPr marL="514350" indent="-514350">
-              <a:buFont typeface="+mj-lt"/>
               <a:buAutoNum type="arabicPeriod"/>
             </a:pPr>
             <a:r>
-              <a:rPr lang="en-US"/>
-              <a:t>Type “cd </a:t>
-            </a:r>
-            <a:r>
-              <a:rPr lang="en-US" i="1"/>
-              <a:t>paste file location</a:t>
-            </a:r>
-            <a:r>
-              <a:rPr lang="en-US"/>
-              <a:t>” Type “python scc.py”</a:t>
-            </a:r>
-          </a:p>
-          <a:p>
-            <a:pPr marL="514350" indent="-514350">
-              <a:buFont typeface="+mj-lt"/>
-              <a:buAutoNum type="arabicPeriod"/>
-            </a:pPr>
-            <a:r>
-              <a:rPr lang="en-US"/>
-              <a:t>When the interface opens, edit variables as desired</a:t>
-            </a:r>
-          </a:p>
-          <a:p>
-            <a:pPr lvl="1"/>
-            <a:r>
-              <a:rPr lang="en-US"/>
-              <a:t>The current variables can be saved by choosing the ‘Export’ option under the ‘Config’ menu bar. These variables can be later retrieved by choosing ‘Import’.</a:t>
-            </a:r>
-          </a:p>
-          <a:p>
-            <a:r>
-              <a:rPr lang="en-US"/>
-              <a:t>Press ‘Run’</a:t>
-            </a:r>
-          </a:p>
-          <a:p>
-            <a:pPr lvl="1"/>
-            <a:r>
-              <a:rPr lang="en-US"/>
-              <a:t>While running, the program will display as Not Responding, but should resume functioning once finished.</a:t>
-            </a:r>
-          </a:p>
-          <a:p>
-            <a:pPr marL="514350" indent="-514350">
-              <a:buFont typeface="+mj-lt"/>
-              <a:buAutoNum type="arabicPeriod"/>
-            </a:pPr>
-            <a:endParaRPr lang="en-US"/>
+              <a:rPr lang="en-US" dirty="0"/>
+              <a:t>Type “</a:t>
+            </a:r>
+            <a:r>
+              <a:rPr lang="en-US" dirty="0" err="1"/>
+              <a:t>conda</a:t>
+            </a:r>
+            <a:r>
+              <a:rPr lang="en-US" dirty="0"/>
+              <a:t> activate </a:t>
+            </a:r>
+            <a:r>
+              <a:rPr lang="en-US" i="1" dirty="0"/>
+              <a:t>name of your environment</a:t>
+            </a:r>
+            <a:r>
+              <a:rPr lang="en-US" dirty="0"/>
+              <a:t>”</a:t>
+            </a:r>
+            <a:endParaRPr lang="en-US" dirty="0">
+              <a:cs typeface="Calibri" panose="020F0502020204030204"/>
+            </a:endParaRPr>
           </a:p>
         </p:txBody>
       </p:sp>
     </p:spTree>
     <p:extLst>
       <p:ext uri="{BB962C8B-B14F-4D97-AF65-F5344CB8AC3E}">
-        <p14:creationId xmlns:p14="http://schemas.microsoft.com/office/powerpoint/2010/main" val="2684212234"/>
+        <p14:creationId xmlns:p14="http://schemas.microsoft.com/office/powerpoint/2010/main" val="272756812"/>
       </p:ext>
     </p:extLst>
   </p:cSld>
@@ -5193,9 +5794,14 @@
           <a:lstStyle/>
           <a:p>
             <a:r>
-              <a:rPr lang="en-US"/>
-              <a:t>Running - Configs</a:t>
-            </a:r>
+              <a:rPr lang="en-US" dirty="0"/>
+              <a:t>Installation </a:t>
+            </a:r>
+            <a:r>
+              <a:rPr lang="en-US" i="1" dirty="0"/>
+              <a:t>cont.</a:t>
+            </a:r>
+            <a:endParaRPr lang="en-US" dirty="0"/>
           </a:p>
         </p:txBody>
       </p:sp>
@@ -5222,62 +5828,102 @@
           </a:xfrm>
         </p:spPr>
         <p:txBody>
-          <a:bodyPr>
-            <a:normAutofit lnSpcReduction="10000"/>
+          <a:bodyPr vert="horz" lIns="91440" tIns="45720" rIns="91440" bIns="45720" rtlCol="0" anchor="t">
+            <a:normAutofit/>
           </a:bodyPr>
           <a:lstStyle/>
           <a:p>
             <a:r>
-              <a:rPr lang="en-US"/>
-              <a:t>Batch/Preview Mode</a:t>
-            </a:r>
-          </a:p>
-          <a:p>
-            <a:pPr lvl="1"/>
-            <a:r>
-              <a:rPr lang="en-US"/>
-              <a:t>Batch mode will count cells in all images within a specified folder (including all subfolders). An excel file with counts will be generated and optional output images can be generated as well.</a:t>
-            </a:r>
-          </a:p>
-          <a:p>
-            <a:pPr lvl="1"/>
-            <a:r>
-              <a:rPr lang="en-US"/>
-              <a:t>Preview mode will count cells in a single image and display images that reflect how the program processed the image. Use it to tune the program to your data.</a:t>
-            </a:r>
-          </a:p>
-          <a:p>
-            <a:r>
-              <a:rPr lang="en-US"/>
-              <a:t>Thresholds only</a:t>
-            </a:r>
-          </a:p>
-          <a:p>
-            <a:pPr lvl="1"/>
-            <a:r>
-              <a:rPr lang="en-US"/>
-              <a:t>Causes Batch mode to forgo counting cells, instead only reporting the background brightness of each image. Use to quickly get a report on image brightness values.</a:t>
-            </a:r>
-          </a:p>
-          <a:p>
-            <a:r>
-              <a:rPr lang="en-US"/>
-              <a:t>Output image files</a:t>
-            </a:r>
-          </a:p>
-          <a:p>
-            <a:pPr lvl="1"/>
-            <a:r>
-              <a:rPr lang="en-US"/>
-              <a:t>Causes Batch mode to generate images files with counted cells and uncounted contours marked.</a:t>
-            </a:r>
+              <a:rPr lang="en-US" dirty="0"/>
+              <a:t>Install python modules:</a:t>
+            </a:r>
+          </a:p>
+          <a:p>
+            <a:pPr marL="514350" indent="-514350">
+              <a:buFont typeface="+mj-lt"/>
+              <a:buAutoNum type="arabicPeriod"/>
+            </a:pPr>
+            <a:r>
+              <a:rPr lang="en-US" dirty="0"/>
+              <a:t>Type “pip install pandas” </a:t>
+            </a:r>
+          </a:p>
+          <a:p>
+            <a:pPr marL="514350" indent="-514350">
+              <a:buFont typeface="+mj-lt"/>
+              <a:buAutoNum type="arabicPeriod"/>
+            </a:pPr>
+            <a:r>
+              <a:rPr lang="en-US" dirty="0"/>
+              <a:t>Type “pip install </a:t>
+            </a:r>
+            <a:r>
+              <a:rPr lang="en-US" dirty="0" err="1"/>
+              <a:t>opencv</a:t>
+            </a:r>
+            <a:r>
+              <a:rPr lang="en-US" dirty="0"/>
+              <a:t>-python”</a:t>
+            </a:r>
+          </a:p>
+          <a:p>
+            <a:pPr marL="514350" indent="-514350">
+              <a:buFont typeface="+mj-lt"/>
+              <a:buAutoNum type="arabicPeriod"/>
+            </a:pPr>
+            <a:r>
+              <a:rPr lang="en-US" dirty="0">
+                <a:cs typeface="Calibri" panose="020F0502020204030204"/>
+              </a:rPr>
+              <a:t>Type “pip install matplotlib”</a:t>
+            </a:r>
+            <a:endParaRPr lang="en-US" dirty="0"/>
+          </a:p>
+          <a:p>
+            <a:pPr marL="514350" indent="-514350">
+              <a:buFont typeface="+mj-lt"/>
+              <a:buAutoNum type="arabicPeriod"/>
+            </a:pPr>
+            <a:r>
+              <a:rPr lang="en-US" dirty="0"/>
+              <a:t>Type “pip install </a:t>
+            </a:r>
+            <a:r>
+              <a:rPr lang="en-US" dirty="0" err="1"/>
+              <a:t>configparser</a:t>
+            </a:r>
+            <a:r>
+              <a:rPr lang="en-US" dirty="0"/>
+              <a:t>”</a:t>
+            </a:r>
+          </a:p>
+          <a:p>
+            <a:pPr marL="514350" indent="-514350">
+              <a:buFont typeface="+mj-lt"/>
+              <a:buAutoNum type="arabicPeriod"/>
+            </a:pPr>
+            <a:r>
+              <a:rPr lang="en-US" dirty="0"/>
+              <a:t>Type “pip install </a:t>
+            </a:r>
+            <a:r>
+              <a:rPr lang="en-US" dirty="0" err="1"/>
+              <a:t>PySimpleGUI</a:t>
+            </a:r>
+            <a:r>
+              <a:rPr lang="en-US" dirty="0"/>
+              <a:t>”</a:t>
+            </a:r>
+            <a:endParaRPr lang="en-US" dirty="0">
+              <a:cs typeface="Calibri" panose="020F0502020204030204"/>
+            </a:endParaRPr>
           </a:p>
         </p:txBody>
       </p:sp>
     </p:spTree>
     <p:extLst>
       <p:ext uri="{BB962C8B-B14F-4D97-AF65-F5344CB8AC3E}">
-        <p14:creationId xmlns:p14="http://schemas.microsoft.com/office/powerpoint/2010/main" val="2523626175"/>
+        <p14:creationId xmlns:p14="http://schemas.microsoft.com/office/powerpoint/2010/main" val="4289612205"/>
       </p:ext>
     </p:extLst>
   </p:cSld>
@@ -5332,13 +5978,8 @@
           <a:p>
             <a:r>
               <a:rPr lang="en-US"/>
-              <a:t>Running – Configs </a:t>
-            </a:r>
-            <a:r>
-              <a:rPr lang="en-US" i="1"/>
-              <a:t>cont.</a:t>
-            </a:r>
-            <a:endParaRPr lang="en-US"/>
+              <a:t>Running the Program - Basics</a:t>
+            </a:r>
           </a:p>
         </p:txBody>
       </p:sp>
@@ -5366,99 +6007,111 @@
         </p:spPr>
         <p:txBody>
           <a:bodyPr>
-            <a:normAutofit fontScale="85000" lnSpcReduction="20000"/>
+            <a:normAutofit/>
           </a:bodyPr>
           <a:lstStyle/>
           <a:p>
-            <a:r>
-              <a:rPr lang="en-US" dirty="0"/>
-              <a:t>Image Thresholds</a:t>
+            <a:pPr marL="514350" indent="-514350">
+              <a:buFont typeface="+mj-lt"/>
+              <a:buAutoNum type="arabicPeriod"/>
+            </a:pPr>
+            <a:r>
+              <a:rPr lang="en-US" dirty="0"/>
+              <a:t>Copy file location of ‘scc.py’</a:t>
             </a:r>
           </a:p>
           <a:p>
             <a:pPr lvl="1"/>
             <a:r>
               <a:rPr lang="en-US" dirty="0"/>
-              <a:t>Determine how bright/dark a pixel must be to register as a 1 or 0 on the </a:t>
+              <a:t>On Windows: Right click file, select Properties, copy the Location field.</a:t>
+            </a:r>
+          </a:p>
+          <a:p>
+            <a:pPr marL="514350" indent="-514350">
+              <a:buFont typeface="+mj-lt"/>
+              <a:buAutoNum type="arabicPeriod"/>
+            </a:pPr>
+            <a:r>
+              <a:rPr lang="en-US" dirty="0"/>
+              <a:t>Run ‘Anaconda Prompt’</a:t>
+            </a:r>
+          </a:p>
+          <a:p>
+            <a:pPr marL="514350" indent="-514350">
+              <a:buFont typeface="+mj-lt"/>
+              <a:buAutoNum type="arabicPeriod"/>
+            </a:pPr>
+            <a:r>
+              <a:rPr lang="en-US" dirty="0"/>
+              <a:t>Type “</a:t>
             </a:r>
             <a:r>
               <a:rPr lang="en-US" dirty="0" err="1"/>
-              <a:t>thresholded</a:t>
-            </a:r>
-            <a:r>
-              <a:rPr lang="en-US" dirty="0"/>
-              <a:t> binary image (3</a:t>
-            </a:r>
-            <a:r>
-              <a:rPr lang="en-US" baseline="30000" dirty="0"/>
-              <a:t>rd</a:t>
-            </a:r>
-            <a:r>
-              <a:rPr lang="en-US" dirty="0"/>
-              <a:t> output image in preview mode)</a:t>
-            </a:r>
-          </a:p>
-          <a:p>
-            <a:r>
-              <a:rPr lang="en-US" dirty="0"/>
-              <a:t>Cell Thresholds</a:t>
+              <a:t>conda</a:t>
+            </a:r>
+            <a:r>
+              <a:rPr lang="en-US" dirty="0"/>
+              <a:t> activate </a:t>
+            </a:r>
+            <a:r>
+              <a:rPr lang="en-US" i="1" dirty="0"/>
+              <a:t>name of your environment</a:t>
+            </a:r>
+            <a:r>
+              <a:rPr lang="en-US" dirty="0"/>
+              <a:t>”</a:t>
+            </a:r>
+          </a:p>
+          <a:p>
+            <a:pPr marL="514350" indent="-514350">
+              <a:buFont typeface="+mj-lt"/>
+              <a:buAutoNum type="arabicPeriod"/>
+            </a:pPr>
+            <a:r>
+              <a:rPr lang="en-US" dirty="0"/>
+              <a:t>Type “cd </a:t>
+            </a:r>
+            <a:r>
+              <a:rPr lang="en-US" i="1" dirty="0"/>
+              <a:t>paste file location</a:t>
+            </a:r>
+            <a:r>
+              <a:rPr lang="en-US" dirty="0"/>
+              <a:t>” </a:t>
+            </a:r>
+          </a:p>
+          <a:p>
+            <a:pPr marL="514350" indent="-514350">
+              <a:buFont typeface="+mj-lt"/>
+              <a:buAutoNum type="arabicPeriod"/>
+            </a:pPr>
+            <a:r>
+              <a:rPr lang="en-US" dirty="0"/>
+              <a:t>Type “python scc.py”</a:t>
+            </a:r>
+          </a:p>
+          <a:p>
+            <a:pPr marL="514350" indent="-514350">
+              <a:buFont typeface="+mj-lt"/>
+              <a:buAutoNum type="arabicPeriod"/>
+            </a:pPr>
+            <a:r>
+              <a:rPr lang="en-US" dirty="0"/>
+              <a:t>When the interface opens, edit variables as desired</a:t>
             </a:r>
           </a:p>
           <a:p>
             <a:pPr lvl="1"/>
             <a:r>
               <a:rPr lang="en-US" dirty="0"/>
-              <a:t>Determine how bright/dark the pixels within a contour must be to count it as a cell.</a:t>
-            </a:r>
-          </a:p>
-          <a:p>
-            <a:endParaRPr lang="en-US" dirty="0"/>
-          </a:p>
-          <a:p>
-            <a:r>
-              <a:rPr lang="en-US" dirty="0"/>
-              <a:t>Absolute</a:t>
-            </a:r>
-          </a:p>
-          <a:p>
-            <a:pPr lvl="1"/>
-            <a:r>
-              <a:rPr lang="en-US" dirty="0"/>
-              <a:t>Range [0,255]. These values directly determine the pixel </a:t>
-            </a:r>
-            <a:r>
-              <a:rPr lang="en-US" dirty="0" err="1"/>
-              <a:t>brightnesses</a:t>
-            </a:r>
-            <a:r>
-              <a:rPr lang="en-US" dirty="0"/>
-              <a:t> used for both thresholds. Each image will have the same threshold values.</a:t>
-            </a:r>
-          </a:p>
-          <a:p>
-            <a:r>
-              <a:rPr lang="en-US" dirty="0"/>
-              <a:t>Relative</a:t>
-            </a:r>
-          </a:p>
-          <a:p>
-            <a:pPr lvl="1"/>
-            <a:r>
-              <a:rPr lang="en-US" dirty="0"/>
-              <a:t>Range [0.0,1.0]. These values are multiplied by the measured background brightness of each image to determine both thresholds. Each image will have different thresholds based on its brightness.</a:t>
-            </a:r>
-          </a:p>
-          <a:p>
-            <a:r>
-              <a:rPr lang="en-US" dirty="0"/>
-              <a:t>Difference</a:t>
-            </a:r>
-          </a:p>
-          <a:p>
-            <a:pPr lvl="1"/>
-            <a:r>
-              <a:rPr lang="en-US" dirty="0"/>
-              <a:t>Range [0,255]. These values are subtracted from the measured background brightness of the image to determine both thresholds. Each image will have different thresholds based on its brightness.</a:t>
+              <a:t>Current variables can always be saved by choosing the ‘Export’ option under the ‘Config’ menu bar. These variables can be later retrieved by choosing ‘Import’.</a:t>
+            </a:r>
+          </a:p>
+          <a:p>
+            <a:r>
+              <a:rPr lang="en-US" dirty="0"/>
+              <a:t>Press ‘Run’</a:t>
             </a:r>
           </a:p>
         </p:txBody>
@@ -5466,7 +6119,7 @@
     </p:spTree>
     <p:extLst>
       <p:ext uri="{BB962C8B-B14F-4D97-AF65-F5344CB8AC3E}">
-        <p14:creationId xmlns:p14="http://schemas.microsoft.com/office/powerpoint/2010/main" val="3284550745"/>
+        <p14:creationId xmlns:p14="http://schemas.microsoft.com/office/powerpoint/2010/main" val="2684212234"/>
       </p:ext>
     </p:extLst>
   </p:cSld>
@@ -5521,13 +6174,8 @@
           <a:p>
             <a:r>
               <a:rPr lang="en-US"/>
-              <a:t>Running – Configs </a:t>
-            </a:r>
-            <a:r>
-              <a:rPr lang="en-US" i="1"/>
-              <a:t>cont.</a:t>
-            </a:r>
-            <a:endParaRPr lang="en-US"/>
+              <a:t>Running - Configs</a:t>
+            </a:r>
           </a:p>
         </p:txBody>
       </p:sp>
@@ -5555,59 +6203,53 @@
         </p:spPr>
         <p:txBody>
           <a:bodyPr>
-            <a:normAutofit/>
+            <a:normAutofit lnSpcReduction="10000"/>
           </a:bodyPr>
           <a:lstStyle/>
           <a:p>
             <a:r>
-              <a:rPr lang="en-US"/>
-              <a:t>Fluorescent</a:t>
+              <a:rPr lang="en-US" dirty="0"/>
+              <a:t>Batch/Preview Mode</a:t>
             </a:r>
           </a:p>
           <a:p>
             <a:pPr lvl="1"/>
             <a:r>
-              <a:rPr lang="en-US"/>
-              <a:t>Check if counting fluorescent images (SCC will not work on brightfield and fluorescent images at the same time!).</a:t>
-            </a:r>
-          </a:p>
-          <a:p>
-            <a:r>
-              <a:rPr lang="en-US"/>
-              <a:t>Size</a:t>
+              <a:rPr lang="en-US" dirty="0"/>
+              <a:t>Batch mode will count cells in all images within a specified folder (including all subfolders). An excel file with counts will be generated and optional output images can be generated as well.</a:t>
             </a:r>
           </a:p>
           <a:p>
             <a:pPr lvl="1"/>
             <a:r>
-              <a:rPr lang="en-US"/>
-              <a:t>Affects the minimum radius of cells and the minimum and maximum area filters. Value is the approximate radius, in pixels, of the smallest cells that will be counted.</a:t>
-            </a:r>
-          </a:p>
-          <a:p>
-            <a:r>
-              <a:rPr lang="en-US"/>
-              <a:t>Min/Max Area Coefficient</a:t>
+              <a:rPr lang="en-US" dirty="0"/>
+              <a:t>Preview mode will count cells in a single image and display images that reflect how the program processed the image. Use it to tune the program to your data.</a:t>
+            </a:r>
+          </a:p>
+          <a:p>
+            <a:r>
+              <a:rPr lang="en-US" dirty="0"/>
+              <a:t>Spreads Only</a:t>
             </a:r>
           </a:p>
           <a:p>
             <a:pPr lvl="1"/>
             <a:r>
-              <a:rPr lang="en-US"/>
-              <a:t>Affect the minimum and maximum area filters, respectively. Tune these to prevent small and large artifacts from being counted as cells.</a:t>
-            </a:r>
-          </a:p>
-          <a:p>
-            <a:r>
-              <a:rPr lang="en-US"/>
-              <a:t>Circularity Threshold</a:t>
+              <a:rPr lang="en-US" dirty="0"/>
+              <a:t>Causes Batch mode to forgo counting cells, instead only reporting the background brightness and the difference between background and cell brightness of each image. Use to quickly get a report on image properties.</a:t>
+            </a:r>
+          </a:p>
+          <a:p>
+            <a:r>
+              <a:rPr lang="en-US" dirty="0"/>
+              <a:t>Output Image Files</a:t>
             </a:r>
           </a:p>
           <a:p>
             <a:pPr lvl="1"/>
             <a:r>
-              <a:rPr lang="en-US"/>
-              <a:t>Range [0.0,1.0]. Affects the circularity filter. The higher the value, the more circular a contour must be to be counted as a cell.</a:t>
+              <a:rPr lang="en-US" dirty="0"/>
+              <a:t>Causes Batch mode to generate images files with counted cells and uncounted contours marked.</a:t>
             </a:r>
           </a:p>
         </p:txBody>
@@ -5615,7 +6257,7 @@
     </p:spTree>
     <p:extLst>
       <p:ext uri="{BB962C8B-B14F-4D97-AF65-F5344CB8AC3E}">
-        <p14:creationId xmlns:p14="http://schemas.microsoft.com/office/powerpoint/2010/main" val="3454217184"/>
+        <p14:creationId xmlns:p14="http://schemas.microsoft.com/office/powerpoint/2010/main" val="2523626175"/>
       </p:ext>
     </p:extLst>
   </p:cSld>
@@ -5669,14 +6311,14 @@
           <a:lstStyle/>
           <a:p>
             <a:r>
-              <a:rPr lang="en-US"/>
-              <a:t>Running – </a:t>
-            </a:r>
-            <a:r>
-              <a:rPr lang="en-US" err="1"/>
-              <a:t>Coexpression</a:t>
-            </a:r>
-            <a:endParaRPr lang="en-US"/>
+              <a:rPr lang="en-US" dirty="0"/>
+              <a:t>Running – Configs </a:t>
+            </a:r>
+            <a:r>
+              <a:rPr lang="en-US" i="1" dirty="0"/>
+              <a:t>cont.</a:t>
+            </a:r>
+            <a:endParaRPr lang="en-US" dirty="0"/>
           </a:p>
         </p:txBody>
       </p:sp>
@@ -5704,141 +6346,72 @@
         </p:spPr>
         <p:txBody>
           <a:bodyPr>
-            <a:normAutofit fontScale="85000" lnSpcReduction="20000"/>
+            <a:normAutofit fontScale="92500" lnSpcReduction="10000"/>
           </a:bodyPr>
           <a:lstStyle/>
           <a:p>
             <a:r>
               <a:rPr lang="en-US" dirty="0"/>
-              <a:t>The </a:t>
-            </a:r>
-            <a:r>
-              <a:rPr lang="en-US" dirty="0" err="1"/>
-              <a:t>coexpression</a:t>
-            </a:r>
-            <a:r>
-              <a:rPr lang="en-US" dirty="0"/>
-              <a:t> tab should only be used if counting cells in images taken from multiple staining channels.</a:t>
-            </a:r>
-          </a:p>
-          <a:p>
-            <a:r>
-              <a:rPr lang="en-US" dirty="0"/>
-              <a:t>To use, image files of the same sections must share the exact same name, with only the channel identifier differing between them.</a:t>
+              <a:t>Selection Strength</a:t>
             </a:r>
           </a:p>
           <a:p>
             <a:pPr lvl="1"/>
             <a:r>
-              <a:rPr lang="en-US" dirty="0" err="1"/>
-              <a:t>Eg</a:t>
-            </a:r>
-            <a:r>
-              <a:rPr lang="en-US" dirty="0"/>
-              <a:t>: “subjR4_PFC_mCherry.tif” and “subjR4_PFC_DAPI.tif”</a:t>
-            </a:r>
-          </a:p>
-          <a:p>
-            <a:r>
-              <a:rPr lang="en-US" dirty="0"/>
-              <a:t>To analyze </a:t>
-            </a:r>
-            <a:r>
-              <a:rPr lang="en-US" dirty="0" err="1"/>
-              <a:t>coexpression</a:t>
-            </a:r>
-            <a:r>
-              <a:rPr lang="en-US" dirty="0"/>
-              <a:t>, first run SCC on each of the channels to be assessed. When running, fill in the Channel Identifier field with the name of the channel used in the image file names.</a:t>
+              <a:rPr lang="en-US" dirty="0"/>
+              <a:t>Affects how much cells must stand out from the surrounding tissue to be outlined.</a:t>
+            </a:r>
+          </a:p>
+          <a:p>
+            <a:r>
+              <a:rPr lang="en-US" dirty="0"/>
+              <a:t>Fluorescent</a:t>
             </a:r>
           </a:p>
           <a:p>
             <a:pPr lvl="1"/>
             <a:r>
               <a:rPr lang="en-US" dirty="0"/>
-              <a:t>SCC will only find image files with the channel identifier in their names.</a:t>
+              <a:t>Check if counting fluorescent images (SCC will not work on brightfield and fluorescent images simultaneously!).</a:t>
+            </a:r>
+          </a:p>
+          <a:p>
+            <a:r>
+              <a:rPr lang="en-US" dirty="0"/>
+              <a:t>Size</a:t>
             </a:r>
           </a:p>
           <a:p>
             <a:pPr lvl="1"/>
             <a:r>
               <a:rPr lang="en-US" dirty="0"/>
-              <a:t>It will generate an excel file with counts as well as a ‘.</a:t>
-            </a:r>
-            <a:r>
-              <a:rPr lang="en-US" dirty="0" err="1"/>
-              <a:t>npz</a:t>
-            </a:r>
-            <a:r>
-              <a:rPr lang="en-US" dirty="0"/>
-              <a:t>’ file, which stores the outline of counted cells in each image.</a:t>
-            </a:r>
-          </a:p>
-          <a:p>
-            <a:r>
-              <a:rPr lang="en-US" dirty="0"/>
-              <a:t>On the </a:t>
-            </a:r>
-            <a:r>
-              <a:rPr lang="en-US" dirty="0" err="1"/>
-              <a:t>Coexpression</a:t>
-            </a:r>
-            <a:r>
-              <a:rPr lang="en-US" dirty="0"/>
-              <a:t> tab, choose Select Contour Files and select the files for the channels you want to compare.</a:t>
+              <a:t>Affects the minimum radius of cells and the minimum and maximum area filters. Value is the approximate radius, in pixels, of the smallest cells that will be counted.</a:t>
+            </a:r>
+          </a:p>
+          <a:p>
+            <a:r>
+              <a:rPr lang="en-US" dirty="0"/>
+              <a:t>Min/Max Area</a:t>
             </a:r>
           </a:p>
           <a:p>
             <a:pPr lvl="1"/>
             <a:r>
               <a:rPr lang="en-US" dirty="0"/>
-              <a:t>SCC will look for </a:t>
-            </a:r>
-            <a:r>
-              <a:rPr lang="en-US" dirty="0" err="1"/>
-              <a:t>coexpression</a:t>
-            </a:r>
-            <a:r>
-              <a:rPr lang="en-US" dirty="0"/>
-              <a:t> among </a:t>
-            </a:r>
-            <a:r>
-              <a:rPr lang="en-US" i="1" dirty="0"/>
-              <a:t>all</a:t>
-            </a:r>
-            <a:r>
-              <a:rPr lang="en-US" dirty="0"/>
-              <a:t> selected channels. E.g., if three channels are selected, </a:t>
-            </a:r>
-            <a:r>
-              <a:rPr lang="en-US" dirty="0" err="1"/>
-              <a:t>coexpressing</a:t>
-            </a:r>
-            <a:r>
-              <a:rPr lang="en-US" dirty="0"/>
-              <a:t> cells will be those that appear in </a:t>
-            </a:r>
-            <a:r>
-              <a:rPr lang="en-US" i="1" dirty="0"/>
-              <a:t>all three</a:t>
-            </a:r>
-            <a:r>
-              <a:rPr lang="en-US" dirty="0"/>
-              <a:t> channels.</a:t>
-            </a:r>
-          </a:p>
-          <a:p>
-            <a:r>
-              <a:rPr lang="en-US" dirty="0"/>
-              <a:t>If ‘Add contours…’ is selected, </a:t>
-            </a:r>
-            <a:r>
-              <a:rPr lang="en-US" dirty="0" err="1"/>
-              <a:t>coexpressing</a:t>
-            </a:r>
-            <a:r>
-              <a:rPr lang="en-US" dirty="0"/>
-              <a:t> cells will be marked in white on output images.</a:t>
+              <a:t>Affect the minimum and maximum area filters, respectively. Tune these to prevent small and large artifacts from being counted as cells.</a:t>
+            </a:r>
+          </a:p>
+          <a:p>
+            <a:r>
+              <a:rPr lang="en-US" dirty="0"/>
+              <a:t>Circularity Threshold</a:t>
+            </a:r>
+          </a:p>
+          <a:p>
+            <a:pPr lvl="1"/>
+            <a:r>
+              <a:rPr lang="en-US" dirty="0"/>
+              <a:t>Range [0.0,1.0]. Affects the circularity filter. The higher the value, the more circular a contour must be to be counted as a cell.</a:t>
             </a:r>
           </a:p>
         </p:txBody>
@@ -5846,7 +6419,7 @@
     </p:spTree>
     <p:extLst>
       <p:ext uri="{BB962C8B-B14F-4D97-AF65-F5344CB8AC3E}">
-        <p14:creationId xmlns:p14="http://schemas.microsoft.com/office/powerpoint/2010/main" val="3290658582"/>
+        <p14:creationId xmlns:p14="http://schemas.microsoft.com/office/powerpoint/2010/main" val="3454217184"/>
       </p:ext>
     </p:extLst>
   </p:cSld>
@@ -5935,26 +6508,27 @@
         </p:spPr>
         <p:txBody>
           <a:bodyPr>
-            <a:normAutofit lnSpcReduction="10000"/>
+            <a:normAutofit fontScale="85000" lnSpcReduction="20000"/>
           </a:bodyPr>
           <a:lstStyle/>
           <a:p>
             <a:r>
               <a:rPr lang="en-US" dirty="0"/>
-              <a:t>To count cells that appear on multiple fluorescent channels, contour files for each channel must be made first.</a:t>
-            </a:r>
-          </a:p>
-          <a:p>
-            <a:pPr lvl="1"/>
-            <a:r>
-              <a:rPr lang="en-US" dirty="0"/>
-              <a:t>If a Channel Identifier is present, SCC will automatically generate a contour file when it runs.</a:t>
-            </a:r>
-          </a:p>
-          <a:p>
-            <a:r>
-              <a:rPr lang="en-US" dirty="0"/>
-              <a:t>Image files of the same sections must share the exact same name, with only the Channel Identifier differing between them.</a:t>
+              <a:t>The </a:t>
+            </a:r>
+            <a:r>
+              <a:rPr lang="en-US" dirty="0" err="1"/>
+              <a:t>coexpression</a:t>
+            </a:r>
+            <a:r>
+              <a:rPr lang="en-US" dirty="0"/>
+              <a:t> tab should only be used if counting cells in images taken from multiple staining channels.</a:t>
+            </a:r>
+          </a:p>
+          <a:p>
+            <a:r>
+              <a:rPr lang="en-US" dirty="0"/>
+              <a:t>To use, image files of the same sections must share the exact same name, with only the channel identifier differing between them.</a:t>
             </a:r>
           </a:p>
           <a:p>
@@ -5965,60 +6539,134 @@
             </a:r>
             <a:r>
               <a:rPr lang="en-US" dirty="0"/>
-              <a:t>: “subjR4_PFC_mCherry.tif” and “subjR4_PFC_DAPI.tif”</a:t>
-            </a:r>
-          </a:p>
-          <a:p>
-            <a:r>
-              <a:rPr lang="en-US" dirty="0"/>
-              <a:t>Tune SCC to the specific cell parameters of the channel you plan to analyze, enter the Channel Identifier, and run.</a:t>
+              <a:t>: “</a:t>
+            </a:r>
+            <a:r>
+              <a:rPr lang="en-US" i="1" dirty="0"/>
+              <a:t>subjR4_PFC_mCherry.tif</a:t>
+            </a:r>
+            <a:r>
+              <a:rPr lang="en-US" dirty="0"/>
+              <a:t>” and “</a:t>
+            </a:r>
+            <a:r>
+              <a:rPr lang="en-US" i="1" dirty="0"/>
+              <a:t>subjR4_PFC_DAPI.tif</a:t>
+            </a:r>
+            <a:r>
+              <a:rPr lang="en-US" dirty="0"/>
+              <a:t>”</a:t>
+            </a:r>
+          </a:p>
+          <a:p>
+            <a:r>
+              <a:rPr lang="en-US" dirty="0"/>
+              <a:t>To analyze </a:t>
+            </a:r>
+            <a:r>
+              <a:rPr lang="en-US" dirty="0" err="1"/>
+              <a:t>coexpression</a:t>
+            </a:r>
+            <a:r>
+              <a:rPr lang="en-US" dirty="0"/>
+              <a:t>, first run SCC on each of the channels to be assessed. When running, fill in the Channel Identifier field with the name of the channel used in the image file names.</a:t>
             </a:r>
           </a:p>
           <a:p>
             <a:pPr lvl="1"/>
             <a:r>
               <a:rPr lang="en-US" dirty="0"/>
-              <a:t>Double check the output csv file to make sure only images from the desired channel were analyzed.</a:t>
-            </a:r>
-          </a:p>
-          <a:p>
-            <a:r>
-              <a:rPr lang="en-US" dirty="0"/>
-              <a:t>Repeat for each channel.</a:t>
-            </a:r>
-          </a:p>
-          <a:p>
-            <a:r>
-              <a:rPr lang="en-US" dirty="0"/>
-              <a:t>Switch to the </a:t>
+              <a:t>SCC will only find image files with the channel identifier in their names.</a:t>
+            </a:r>
+          </a:p>
+          <a:p>
+            <a:pPr lvl="1"/>
+            <a:r>
+              <a:rPr lang="en-US" dirty="0"/>
+              <a:t>It will generate an excel file with counts as well as a ‘.</a:t>
+            </a:r>
+            <a:r>
+              <a:rPr lang="en-US" dirty="0" err="1"/>
+              <a:t>npz</a:t>
+            </a:r>
+            <a:r>
+              <a:rPr lang="en-US" dirty="0"/>
+              <a:t>’ file, which stores the outline of counted cells in each image.</a:t>
+            </a:r>
+          </a:p>
+          <a:p>
+            <a:r>
+              <a:rPr lang="en-US" dirty="0"/>
+              <a:t>On the </a:t>
             </a:r>
             <a:r>
               <a:rPr lang="en-US" dirty="0" err="1"/>
               <a:t>Coexpression</a:t>
             </a:r>
             <a:r>
-              <a:rPr lang="en-US"/>
-              <a:t> tab, and </a:t>
-            </a:r>
-            <a:r>
-              <a:rPr lang="en-US" dirty="0"/>
-              <a:t>select the desired contour </a:t>
-            </a:r>
-            <a:r>
-              <a:rPr lang="en-US"/>
-              <a:t>files.</a:t>
+              <a:rPr lang="en-US" dirty="0"/>
+              <a:t> tab, choose Select Contour Files and select the files for the channels you want to compare.</a:t>
             </a:r>
           </a:p>
           <a:p>
             <a:pPr lvl="1"/>
-            <a:endParaRPr lang="en-US" dirty="0"/>
+            <a:r>
+              <a:rPr lang="en-US" dirty="0"/>
+              <a:t>SCC will look for </a:t>
+            </a:r>
+            <a:r>
+              <a:rPr lang="en-US" dirty="0" err="1"/>
+              <a:t>coexpression</a:t>
+            </a:r>
+            <a:r>
+              <a:rPr lang="en-US" dirty="0"/>
+              <a:t> among </a:t>
+            </a:r>
+            <a:r>
+              <a:rPr lang="en-US" i="1" dirty="0"/>
+              <a:t>all</a:t>
+            </a:r>
+            <a:r>
+              <a:rPr lang="en-US" dirty="0"/>
+              <a:t> selected channels. E.g., if three channels are selected, </a:t>
+            </a:r>
+            <a:r>
+              <a:rPr lang="en-US" dirty="0" err="1"/>
+              <a:t>coexpressing</a:t>
+            </a:r>
+            <a:r>
+              <a:rPr lang="en-US" dirty="0"/>
+              <a:t> cells will be those that appear in </a:t>
+            </a:r>
+            <a:r>
+              <a:rPr lang="en-US" i="1" dirty="0"/>
+              <a:t>all three</a:t>
+            </a:r>
+            <a:r>
+              <a:rPr lang="en-US" dirty="0"/>
+              <a:t> channels.</a:t>
+            </a:r>
+          </a:p>
+          <a:p>
+            <a:r>
+              <a:rPr lang="en-US" dirty="0"/>
+              <a:t>If ‘Add contours…’ is selected, </a:t>
+            </a:r>
+            <a:r>
+              <a:rPr lang="en-US" dirty="0" err="1"/>
+              <a:t>coexpressing</a:t>
+            </a:r>
+            <a:r>
+              <a:rPr lang="en-US" dirty="0"/>
+              <a:t> cells will be marked in white on output images.</a:t>
+            </a:r>
           </a:p>
         </p:txBody>
       </p:sp>
     </p:spTree>
     <p:extLst>
       <p:ext uri="{BB962C8B-B14F-4D97-AF65-F5344CB8AC3E}">
-        <p14:creationId xmlns:p14="http://schemas.microsoft.com/office/powerpoint/2010/main" val="3608004787"/>
+        <p14:creationId xmlns:p14="http://schemas.microsoft.com/office/powerpoint/2010/main" val="3290658582"/>
       </p:ext>
     </p:extLst>
   </p:cSld>
@@ -6072,9 +6720,22 @@
           <a:lstStyle/>
           <a:p>
             <a:r>
-              <a:rPr lang="en-US"/>
-              <a:t>Output Data</a:t>
-            </a:r>
+              <a:rPr lang="en-US" dirty="0"/>
+              <a:t>Running – </a:t>
+            </a:r>
+            <a:r>
+              <a:rPr lang="en-US" dirty="0" err="1"/>
+              <a:t>Coexpression</a:t>
+            </a:r>
+            <a:r>
+              <a:rPr lang="en-US" dirty="0"/>
+              <a:t> </a:t>
+            </a:r>
+            <a:r>
+              <a:rPr lang="en-US" i="1" dirty="0"/>
+              <a:t>cont.</a:t>
+            </a:r>
+            <a:endParaRPr lang="en-US" dirty="0"/>
           </a:p>
         </p:txBody>
       </p:sp>
@@ -6096,120 +6757,96 @@
         </p:nvSpPr>
         <p:spPr>
           <a:xfrm>
-            <a:off x="492968" y="1513128"/>
-            <a:ext cx="5124061" cy="5273335"/>
+            <a:off x="838200" y="1411550"/>
+            <a:ext cx="10515600" cy="5273335"/>
           </a:xfrm>
         </p:spPr>
         <p:txBody>
           <a:bodyPr>
-            <a:normAutofit fontScale="92500" lnSpcReduction="10000"/>
+            <a:normAutofit lnSpcReduction="10000"/>
           </a:bodyPr>
           <a:lstStyle/>
           <a:p>
             <a:r>
+              <a:rPr lang="en-US" dirty="0"/>
+              <a:t>To count cells that appear on multiple fluorescent channels, contour files for each channel must be made first.</a:t>
+            </a:r>
+          </a:p>
+          <a:p>
+            <a:pPr lvl="1"/>
+            <a:r>
+              <a:rPr lang="en-US" dirty="0"/>
+              <a:t>If a Channel Identifier is present, SCC will automatically generate a contour file when it runs.</a:t>
+            </a:r>
+          </a:p>
+          <a:p>
+            <a:r>
+              <a:rPr lang="en-US" dirty="0"/>
+              <a:t>Image files of the same sections must share the exact same name, with only the Channel Identifier differing between them.</a:t>
+            </a:r>
+          </a:p>
+          <a:p>
+            <a:pPr lvl="1"/>
+            <a:r>
+              <a:rPr lang="en-US" dirty="0" err="1"/>
+              <a:t>Eg</a:t>
+            </a:r>
+            <a:r>
+              <a:rPr lang="en-US" dirty="0"/>
+              <a:t>: “subjR4_PFC_mCherry.tif” and “subjR4_PFC_DAPI.tif”</a:t>
+            </a:r>
+          </a:p>
+          <a:p>
+            <a:r>
+              <a:rPr lang="en-US" dirty="0"/>
+              <a:t>Tune SCC to the specific cell parameters of the channel you plan to analyze, enter the Channel Identifier, and run.</a:t>
+            </a:r>
+          </a:p>
+          <a:p>
+            <a:pPr lvl="1"/>
+            <a:r>
+              <a:rPr lang="en-US" dirty="0"/>
+              <a:t>Double check the output csv file to make sure only images from the desired channel were analyzed.</a:t>
+            </a:r>
+          </a:p>
+          <a:p>
+            <a:r>
+              <a:rPr lang="en-US" dirty="0"/>
+              <a:t>Repeat for each channel.</a:t>
+            </a:r>
+          </a:p>
+          <a:p>
+            <a:r>
+              <a:rPr lang="en-US" dirty="0"/>
+              <a:t>Switch to the </a:t>
+            </a:r>
+            <a:r>
+              <a:rPr lang="en-US" dirty="0" err="1"/>
+              <a:t>Coexpression</a:t>
+            </a:r>
+            <a:r>
               <a:rPr lang="en-US"/>
-              <a:t>Image: Full path to and name of image</a:t>
-            </a:r>
-          </a:p>
-          <a:p>
+              <a:t> tab, and </a:t>
+            </a:r>
+            <a:r>
+              <a:rPr lang="en-US" dirty="0"/>
+              <a:t>select the desired contour </a:t>
+            </a:r>
             <a:r>
               <a:rPr lang="en-US"/>
-              <a:t>Count: Counted cells in image</a:t>
-            </a:r>
-          </a:p>
-          <a:p>
-            <a:r>
-              <a:rPr lang="en-US" err="1"/>
-              <a:t>coCount</a:t>
-            </a:r>
-            <a:r>
-              <a:rPr lang="en-US"/>
-              <a:t>: </a:t>
-            </a:r>
-            <a:r>
-              <a:rPr lang="en-US" err="1"/>
-              <a:t>Coexpressing</a:t>
-            </a:r>
-            <a:r>
-              <a:rPr lang="en-US"/>
-              <a:t> cells in image</a:t>
-            </a:r>
-          </a:p>
-          <a:p>
-            <a:r>
-              <a:rPr lang="en-US"/>
-              <a:t>Background: Background brightness of image</a:t>
-            </a:r>
-          </a:p>
-          <a:p>
-            <a:r>
-              <a:rPr lang="en-US" err="1"/>
-              <a:t>ImageThreshold</a:t>
-            </a:r>
-            <a:r>
-              <a:rPr lang="en-US"/>
-              <a:t>: The image threshold used</a:t>
-            </a:r>
-          </a:p>
-          <a:p>
-            <a:r>
-              <a:rPr lang="en-US" err="1"/>
-              <a:t>CellThreshold</a:t>
-            </a:r>
-            <a:r>
-              <a:rPr lang="en-US"/>
-              <a:t>: The cell threshold used</a:t>
-            </a:r>
-          </a:p>
-          <a:p>
-            <a:r>
-              <a:rPr lang="en-US" err="1"/>
-              <a:t>AverageArea</a:t>
-            </a:r>
-            <a:r>
-              <a:rPr lang="en-US"/>
-              <a:t>: The Average area of all cells in image</a:t>
-            </a:r>
-          </a:p>
-          <a:p>
-            <a:endParaRPr lang="en-US"/>
-          </a:p>
-        </p:txBody>
-      </p:sp>
-      <p:pic>
-        <p:nvPicPr>
-          <p:cNvPr id="7" name="Picture 6">
-            <a:extLst>
-              <a:ext uri="{FF2B5EF4-FFF2-40B4-BE49-F238E27FC236}">
-                <a16:creationId xmlns:a16="http://schemas.microsoft.com/office/drawing/2014/main" id="{712295E4-2C80-2F5B-4B16-6F647ABBABDE}"/>
-              </a:ext>
-            </a:extLst>
-          </p:cNvPr>
-          <p:cNvPicPr>
-            <a:picLocks noChangeAspect="1"/>
-          </p:cNvPicPr>
-          <p:nvPr/>
-        </p:nvPicPr>
-        <p:blipFill>
-          <a:blip r:embed="rId2"/>
-          <a:stretch>
-            <a:fillRect/>
-          </a:stretch>
-        </p:blipFill>
-        <p:spPr>
-          <a:xfrm>
-            <a:off x="5406425" y="1737122"/>
-            <a:ext cx="6685291" cy="3383756"/>
-          </a:xfrm>
-          <a:prstGeom prst="rect">
-            <a:avLst/>
-          </a:prstGeom>
-        </p:spPr>
-      </p:pic>
+              <a:t>files.</a:t>
+            </a:r>
+          </a:p>
+          <a:p>
+            <a:pPr lvl="1"/>
+            <a:endParaRPr lang="en-US" dirty="0"/>
+          </a:p>
+        </p:txBody>
+      </p:sp>
     </p:spTree>
     <p:extLst>
       <p:ext uri="{BB962C8B-B14F-4D97-AF65-F5344CB8AC3E}">
-        <p14:creationId xmlns:p14="http://schemas.microsoft.com/office/powerpoint/2010/main" val="1581745544"/>
+        <p14:creationId xmlns:p14="http://schemas.microsoft.com/office/powerpoint/2010/main" val="3608004787"/>
       </p:ext>
     </p:extLst>
   </p:cSld>
@@ -6241,7 +6878,7 @@
           <p:cNvPr id="2" name="Title 1">
             <a:extLst>
               <a:ext uri="{FF2B5EF4-FFF2-40B4-BE49-F238E27FC236}">
-                <a16:creationId xmlns:a16="http://schemas.microsoft.com/office/drawing/2014/main" id="{87AE82EE-4424-0197-AD6A-625D41474F3F}"/>
+                <a16:creationId xmlns:a16="http://schemas.microsoft.com/office/drawing/2014/main" id="{93E913FC-AF7C-4F31-8CCF-0C042D810AED}"/>
               </a:ext>
             </a:extLst>
           </p:cNvPr>
@@ -6252,20 +6889,20 @@
             <p:ph type="title"/>
           </p:nvPr>
         </p:nvSpPr>
-        <p:spPr/>
+        <p:spPr>
+          <a:xfrm>
+            <a:off x="838200" y="187565"/>
+            <a:ext cx="10515600" cy="1325563"/>
+          </a:xfrm>
+        </p:spPr>
         <p:txBody>
           <a:bodyPr/>
           <a:lstStyle/>
           <a:p>
             <a:r>
               <a:rPr lang="en-US"/>
-              <a:t>Output Data </a:t>
-            </a:r>
-            <a:r>
-              <a:rPr lang="en-US" i="1"/>
-              <a:t>cont.</a:t>
-            </a:r>
-            <a:endParaRPr lang="en-US"/>
+              <a:t>Output Data</a:t>
+            </a:r>
           </a:p>
         </p:txBody>
       </p:sp>
@@ -6274,7 +6911,7 @@
           <p:cNvPr id="3" name="Content Placeholder 2">
             <a:extLst>
               <a:ext uri="{FF2B5EF4-FFF2-40B4-BE49-F238E27FC236}">
-                <a16:creationId xmlns:a16="http://schemas.microsoft.com/office/drawing/2014/main" id="{33014443-6033-F7C3-A071-D69CA0D5FDE5}"/>
+                <a16:creationId xmlns:a16="http://schemas.microsoft.com/office/drawing/2014/main" id="{F9E1C5AD-92AF-4AAB-8F58-2133C24B60C4}"/>
               </a:ext>
             </a:extLst>
           </p:cNvPr>
@@ -6287,71 +6924,60 @@
         </p:nvSpPr>
         <p:spPr>
           <a:xfrm>
-            <a:off x="838200" y="1825624"/>
-            <a:ext cx="5609253" cy="4667251"/>
+            <a:off x="229012" y="1513128"/>
+            <a:ext cx="5124061" cy="5273335"/>
           </a:xfrm>
         </p:spPr>
         <p:txBody>
           <a:bodyPr>
-            <a:normAutofit lnSpcReduction="10000"/>
+            <a:normAutofit/>
           </a:bodyPr>
           <a:lstStyle/>
           <a:p>
             <a:r>
-              <a:rPr lang="en-US"/>
-              <a:t>Teal: Counted cells</a:t>
-            </a:r>
-          </a:p>
-          <a:p>
-            <a:r>
-              <a:rPr lang="en-US"/>
-              <a:t>Yellow: Contours not circular enough</a:t>
-            </a:r>
-          </a:p>
-          <a:p>
-            <a:r>
-              <a:rPr lang="en-US"/>
-              <a:t>Orange: Contours not dark enough</a:t>
-            </a:r>
-          </a:p>
-          <a:p>
-            <a:r>
-              <a:rPr lang="en-US"/>
-              <a:t>Pink: Contours too small or large</a:t>
-            </a:r>
-          </a:p>
-          <a:p>
-            <a:endParaRPr lang="en-US"/>
-          </a:p>
-          <a:p>
-            <a:r>
-              <a:rPr lang="en-US"/>
-              <a:t>Legend displays additive counts:</a:t>
-            </a:r>
-          </a:p>
-          <a:p>
-            <a:pPr lvl="1"/>
-            <a:r>
-              <a:rPr lang="en-US"/>
-              <a:t>Cell count is accurate, but each number above is the number below </a:t>
-            </a:r>
-            <a:r>
-              <a:rPr lang="en-US" i="1"/>
-              <a:t>plus</a:t>
-            </a:r>
-            <a:r>
-              <a:rPr lang="en-US"/>
-              <a:t> the number of contours that failed that filter</a:t>
-            </a:r>
+              <a:rPr lang="en-US" dirty="0"/>
+              <a:t>Image: Full path to and name of image</a:t>
+            </a:r>
+          </a:p>
+          <a:p>
+            <a:r>
+              <a:rPr lang="en-US" dirty="0"/>
+              <a:t>Count: Counted cells in image</a:t>
+            </a:r>
+          </a:p>
+          <a:p>
+            <a:r>
+              <a:rPr lang="en-US" dirty="0"/>
+              <a:t>Background: Background brightness of image</a:t>
+            </a:r>
+          </a:p>
+          <a:p>
+            <a:r>
+              <a:rPr lang="en-US" dirty="0"/>
+              <a:t>Spread: Difference between background and cell brightness</a:t>
+            </a:r>
+          </a:p>
+          <a:p>
+            <a:r>
+              <a:rPr lang="en-US" dirty="0" err="1"/>
+              <a:t>AverageArea</a:t>
+            </a:r>
+            <a:r>
+              <a:rPr lang="en-US" dirty="0"/>
+              <a:t>: Average area of all cells in image</a:t>
+            </a:r>
+          </a:p>
+          <a:p>
+            <a:endParaRPr lang="en-US" dirty="0"/>
           </a:p>
         </p:txBody>
       </p:sp>
       <p:pic>
         <p:nvPicPr>
-          <p:cNvPr id="9" name="Picture 8" descr="A picture containing fabric&#10;&#10;Description automatically generated">
+          <p:cNvPr id="5" name="Picture 4">
             <a:extLst>
               <a:ext uri="{FF2B5EF4-FFF2-40B4-BE49-F238E27FC236}">
-                <a16:creationId xmlns:a16="http://schemas.microsoft.com/office/drawing/2014/main" id="{21BD06D9-97EF-FBA7-0895-687CB72EBD7C}"/>
+                <a16:creationId xmlns:a16="http://schemas.microsoft.com/office/drawing/2014/main" id="{0431546A-A40C-678D-BD6A-16D9818C87CD}"/>
               </a:ext>
             </a:extLst>
           </p:cNvPr>
@@ -6361,21 +6987,15 @@
           <p:nvPr/>
         </p:nvPicPr>
         <p:blipFill>
-          <a:blip r:embed="rId2">
-            <a:extLst>
-              <a:ext uri="{28A0092B-C50C-407E-A947-70E740481C1C}">
-                <a14:useLocalDpi xmlns:a14="http://schemas.microsoft.com/office/drawing/2010/main" val="0"/>
-              </a:ext>
-            </a:extLst>
-          </a:blip>
+          <a:blip r:embed="rId2"/>
           <a:stretch>
             <a:fillRect/>
           </a:stretch>
         </p:blipFill>
         <p:spPr>
           <a:xfrm>
-            <a:off x="6447453" y="1690688"/>
-            <a:ext cx="5501525" cy="4183451"/>
+            <a:off x="5353423" y="1282628"/>
+            <a:ext cx="6782015" cy="4532877"/>
           </a:xfrm>
           <a:prstGeom prst="rect">
             <a:avLst/>
@@ -6385,7 +7005,7 @@
     </p:spTree>
     <p:extLst>
       <p:ext uri="{BB962C8B-B14F-4D97-AF65-F5344CB8AC3E}">
-        <p14:creationId xmlns:p14="http://schemas.microsoft.com/office/powerpoint/2010/main" val="4262189219"/>
+        <p14:creationId xmlns:p14="http://schemas.microsoft.com/office/powerpoint/2010/main" val="1581745544"/>
       </p:ext>
     </p:extLst>
   </p:cSld>

</xml_diff>